<commit_message>
Updated the slides Still not up to date
</commit_message>
<xml_diff>
--- a/scratch/trnltk.pptx
+++ b/scratch/trnltk.pptx
@@ -58,13 +58,15 @@
     <p:sldId id="321" r:id="rId52"/>
     <p:sldId id="322" r:id="rId53"/>
     <p:sldId id="323" r:id="rId54"/>
-    <p:sldId id="324" r:id="rId55"/>
-    <p:sldId id="301" r:id="rId56"/>
-    <p:sldId id="286" r:id="rId57"/>
-    <p:sldId id="272" r:id="rId58"/>
-    <p:sldId id="302" r:id="rId59"/>
-    <p:sldId id="273" r:id="rId60"/>
-    <p:sldId id="257" r:id="rId61"/>
+    <p:sldId id="326" r:id="rId55"/>
+    <p:sldId id="327" r:id="rId56"/>
+    <p:sldId id="324" r:id="rId57"/>
+    <p:sldId id="301" r:id="rId58"/>
+    <p:sldId id="286" r:id="rId59"/>
+    <p:sldId id="272" r:id="rId60"/>
+    <p:sldId id="302" r:id="rId61"/>
+    <p:sldId id="273" r:id="rId62"/>
+    <p:sldId id="257" r:id="rId63"/>
   </p:sldIdLst>
   <p:sldSz cx="9144000" cy="6858000" type="screen4x3"/>
   <p:notesSz cx="6858000" cy="9144000"/>
@@ -253,22 +255,22 @@
                 <c:formatCode>General</c:formatCode>
                 <c:ptCount val="7"/>
                 <c:pt idx="0">
-                  <c:v>5.7142857142857155E-2</c:v>
+                  <c:v>5.7142857142857162E-2</c:v>
                 </c:pt>
                 <c:pt idx="1">
-                  <c:v>0.57142857142857195</c:v>
+                  <c:v>0.57142857142857229</c:v>
                 </c:pt>
                 <c:pt idx="2">
-                  <c:v>5.7142857142857155E-2</c:v>
+                  <c:v>5.7142857142857162E-2</c:v>
                 </c:pt>
                 <c:pt idx="3">
-                  <c:v>2.8571428571428595E-2</c:v>
+                  <c:v>2.8571428571428605E-2</c:v>
                 </c:pt>
                 <c:pt idx="4">
                   <c:v>0.17142857142857137</c:v>
                 </c:pt>
                 <c:pt idx="5">
-                  <c:v>0.11428571428571439</c:v>
+                  <c:v>0.11428571428571445</c:v>
                 </c:pt>
                 <c:pt idx="6">
                   <c:v>0</c:v>
@@ -278,11 +280,11 @@
           </c:yVal>
           <c:smooth val="1"/>
         </c:ser>
-        <c:axId val="112686592"/>
-        <c:axId val="112688128"/>
+        <c:axId val="79596544"/>
+        <c:axId val="85496576"/>
       </c:scatterChart>
       <c:valAx>
-        <c:axId val="112686592"/>
+        <c:axId val="79596544"/>
         <c:scaling>
           <c:orientation val="minMax"/>
         </c:scaling>
@@ -291,12 +293,12 @@
         <c:numFmt formatCode="General" sourceLinked="1"/>
         <c:majorTickMark val="none"/>
         <c:tickLblPos val="nextTo"/>
-        <c:crossAx val="112688128"/>
+        <c:crossAx val="85496576"/>
         <c:crosses val="autoZero"/>
         <c:crossBetween val="midCat"/>
       </c:valAx>
       <c:valAx>
-        <c:axId val="112688128"/>
+        <c:axId val="85496576"/>
         <c:scaling>
           <c:orientation val="minMax"/>
         </c:scaling>
@@ -305,7 +307,7 @@
         <c:numFmt formatCode="General" sourceLinked="1"/>
         <c:majorTickMark val="none"/>
         <c:tickLblPos val="nextTo"/>
-        <c:crossAx val="112686592"/>
+        <c:crossAx val="79596544"/>
         <c:crosses val="autoZero"/>
         <c:crossBetween val="midCat"/>
       </c:valAx>
@@ -386,22 +388,22 @@
                 <c:formatCode>General</c:formatCode>
                 <c:ptCount val="7"/>
                 <c:pt idx="0">
-                  <c:v>0.1171428571428571</c:v>
+                  <c:v>0.11714285714285708</c:v>
                 </c:pt>
                 <c:pt idx="1">
-                  <c:v>0.27142857142857152</c:v>
+                  <c:v>0.27142857142857163</c:v>
                 </c:pt>
                 <c:pt idx="2">
-                  <c:v>0.1171428571428571</c:v>
+                  <c:v>0.11714285714285708</c:v>
                 </c:pt>
                 <c:pt idx="3">
-                  <c:v>0.1085714285714286</c:v>
+                  <c:v>0.10857142857142862</c:v>
                 </c:pt>
                 <c:pt idx="4">
                   <c:v>0.15142857142857138</c:v>
                 </c:pt>
                 <c:pt idx="5">
-                  <c:v>0.13428571428571423</c:v>
+                  <c:v>0.13428571428571418</c:v>
                 </c:pt>
                 <c:pt idx="6">
                   <c:v>0.10000000000000003</c:v>
@@ -465,22 +467,22 @@
                 <c:formatCode>General</c:formatCode>
                 <c:ptCount val="7"/>
                 <c:pt idx="0">
-                  <c:v>0.1171428571428571</c:v>
+                  <c:v>0.11714285714285708</c:v>
                 </c:pt>
                 <c:pt idx="1">
-                  <c:v>0.27142857142857152</c:v>
+                  <c:v>0.27142857142857163</c:v>
                 </c:pt>
                 <c:pt idx="2">
-                  <c:v>0.1171428571428571</c:v>
+                  <c:v>0.11714285714285708</c:v>
                 </c:pt>
                 <c:pt idx="3">
-                  <c:v>0.1085714285714286</c:v>
+                  <c:v>0.10857142857142862</c:v>
                 </c:pt>
                 <c:pt idx="4">
                   <c:v>0.15142857142857138</c:v>
                 </c:pt>
                 <c:pt idx="5">
-                  <c:v>0.13428571428571423</c:v>
+                  <c:v>0.13428571428571418</c:v>
                 </c:pt>
                 <c:pt idx="6">
                   <c:v>0.10000000000000003</c:v>
@@ -490,11 +492,11 @@
           </c:yVal>
           <c:smooth val="1"/>
         </c:ser>
-        <c:axId val="113003520"/>
-        <c:axId val="113005312"/>
+        <c:axId val="86811392"/>
+        <c:axId val="86812928"/>
       </c:scatterChart>
       <c:valAx>
-        <c:axId val="113003520"/>
+        <c:axId val="86811392"/>
         <c:scaling>
           <c:orientation val="minMax"/>
         </c:scaling>
@@ -503,12 +505,12 @@
         <c:numFmt formatCode="General" sourceLinked="1"/>
         <c:majorTickMark val="none"/>
         <c:tickLblPos val="nextTo"/>
-        <c:crossAx val="113005312"/>
+        <c:crossAx val="86812928"/>
         <c:crosses val="autoZero"/>
         <c:crossBetween val="midCat"/>
       </c:valAx>
       <c:valAx>
-        <c:axId val="113005312"/>
+        <c:axId val="86812928"/>
         <c:scaling>
           <c:orientation val="minMax"/>
         </c:scaling>
@@ -517,7 +519,7 @@
         <c:numFmt formatCode="General" sourceLinked="1"/>
         <c:majorTickMark val="none"/>
         <c:tickLblPos val="nextTo"/>
-        <c:crossAx val="113003520"/>
+        <c:crossAx val="86811392"/>
         <c:crosses val="autoZero"/>
         <c:crossBetween val="midCat"/>
       </c:valAx>
@@ -4791,7 +4793,7 @@
             <a:fld id="{E9E14A0E-4D41-7A46-83F1-807FC5B5C537}" type="datetimeFigureOut">
               <a:rPr lang="en-US" smtClean="0"/>
               <a:pPr/>
-              <a:t>14-Nov-12</a:t>
+              <a:t>21-Nov-12</a:t>
             </a:fld>
             <a:endParaRPr lang="en-US"/>
           </a:p>
@@ -4958,7 +4960,7 @@
             <a:fld id="{E9E14A0E-4D41-7A46-83F1-807FC5B5C537}" type="datetimeFigureOut">
               <a:rPr lang="en-US" smtClean="0"/>
               <a:pPr/>
-              <a:t>14-Nov-12</a:t>
+              <a:t>21-Nov-12</a:t>
             </a:fld>
             <a:endParaRPr lang="en-US"/>
           </a:p>
@@ -5135,7 +5137,7 @@
             <a:fld id="{E9E14A0E-4D41-7A46-83F1-807FC5B5C537}" type="datetimeFigureOut">
               <a:rPr lang="en-US" smtClean="0"/>
               <a:pPr/>
-              <a:t>14-Nov-12</a:t>
+              <a:t>21-Nov-12</a:t>
             </a:fld>
             <a:endParaRPr lang="en-US"/>
           </a:p>
@@ -5302,7 +5304,7 @@
             <a:fld id="{E9E14A0E-4D41-7A46-83F1-807FC5B5C537}" type="datetimeFigureOut">
               <a:rPr lang="en-US" smtClean="0"/>
               <a:pPr/>
-              <a:t>14-Nov-12</a:t>
+              <a:t>21-Nov-12</a:t>
             </a:fld>
             <a:endParaRPr lang="en-US"/>
           </a:p>
@@ -5545,7 +5547,7 @@
             <a:fld id="{E9E14A0E-4D41-7A46-83F1-807FC5B5C537}" type="datetimeFigureOut">
               <a:rPr lang="en-US" smtClean="0"/>
               <a:pPr/>
-              <a:t>14-Nov-12</a:t>
+              <a:t>21-Nov-12</a:t>
             </a:fld>
             <a:endParaRPr lang="en-US"/>
           </a:p>
@@ -5830,7 +5832,7 @@
             <a:fld id="{E9E14A0E-4D41-7A46-83F1-807FC5B5C537}" type="datetimeFigureOut">
               <a:rPr lang="en-US" smtClean="0"/>
               <a:pPr/>
-              <a:t>14-Nov-12</a:t>
+              <a:t>21-Nov-12</a:t>
             </a:fld>
             <a:endParaRPr lang="en-US"/>
           </a:p>
@@ -6249,7 +6251,7 @@
             <a:fld id="{E9E14A0E-4D41-7A46-83F1-807FC5B5C537}" type="datetimeFigureOut">
               <a:rPr lang="en-US" smtClean="0"/>
               <a:pPr/>
-              <a:t>14-Nov-12</a:t>
+              <a:t>21-Nov-12</a:t>
             </a:fld>
             <a:endParaRPr lang="en-US"/>
           </a:p>
@@ -6364,7 +6366,7 @@
             <a:fld id="{E9E14A0E-4D41-7A46-83F1-807FC5B5C537}" type="datetimeFigureOut">
               <a:rPr lang="en-US" smtClean="0"/>
               <a:pPr/>
-              <a:t>14-Nov-12</a:t>
+              <a:t>21-Nov-12</a:t>
             </a:fld>
             <a:endParaRPr lang="en-US"/>
           </a:p>
@@ -6456,7 +6458,7 @@
             <a:fld id="{E9E14A0E-4D41-7A46-83F1-807FC5B5C537}" type="datetimeFigureOut">
               <a:rPr lang="en-US" smtClean="0"/>
               <a:pPr/>
-              <a:t>14-Nov-12</a:t>
+              <a:t>21-Nov-12</a:t>
             </a:fld>
             <a:endParaRPr lang="en-US"/>
           </a:p>
@@ -6730,7 +6732,7 @@
             <a:fld id="{E9E14A0E-4D41-7A46-83F1-807FC5B5C537}" type="datetimeFigureOut">
               <a:rPr lang="en-US" smtClean="0"/>
               <a:pPr/>
-              <a:t>14-Nov-12</a:t>
+              <a:t>21-Nov-12</a:t>
             </a:fld>
             <a:endParaRPr lang="en-US"/>
           </a:p>
@@ -6980,7 +6982,7 @@
             <a:fld id="{E9E14A0E-4D41-7A46-83F1-807FC5B5C537}" type="datetimeFigureOut">
               <a:rPr lang="en-US" smtClean="0"/>
               <a:pPr/>
-              <a:t>14-Nov-12</a:t>
+              <a:t>21-Nov-12</a:t>
             </a:fld>
             <a:endParaRPr lang="en-US"/>
           </a:p>
@@ -7190,7 +7192,7 @@
             <a:fld id="{E9E14A0E-4D41-7A46-83F1-807FC5B5C537}" type="datetimeFigureOut">
               <a:rPr lang="en-US" smtClean="0"/>
               <a:pPr/>
-              <a:t>14-Nov-12</a:t>
+              <a:t>21-Nov-12</a:t>
             </a:fld>
             <a:endParaRPr lang="en-US"/>
           </a:p>
@@ -13139,19 +13141,7 @@
             <a:pPr lvl="2"/>
             <a:r>
               <a:rPr lang="en-GB" dirty="0" smtClean="0"/>
-              <a:t>Fast enough </a:t>
-            </a:r>
-            <a:r>
-              <a:rPr lang="en-GB" dirty="0" smtClean="0"/>
-              <a:t>-</a:t>
-            </a:r>
-            <a:r>
-              <a:rPr lang="en-GB" dirty="0" smtClean="0"/>
-              <a:t>for </a:t>
-            </a:r>
-            <a:r>
-              <a:rPr lang="en-GB" dirty="0" smtClean="0"/>
-              <a:t>now- : would take 3.3 hours to parse a 1M word corpus</a:t>
+              <a:t>Fast enough -for now- : would take 3.3 hours to parse a 1M word corpus</a:t>
             </a:r>
           </a:p>
         </p:txBody>
@@ -13230,13 +13220,8 @@
           <a:p>
             <a:r>
               <a:rPr lang="en-GB" dirty="0" smtClean="0"/>
-              <a:t>Annotated dictionary </a:t>
-            </a:r>
-            <a:r>
-              <a:rPr lang="en-GB" dirty="0" smtClean="0"/>
-              <a:t>(lexicon): </a:t>
-            </a:r>
-            <a:endParaRPr lang="en-GB" dirty="0" smtClean="0"/>
+              <a:t>Annotated dictionary (lexicon): </a:t>
+            </a:r>
           </a:p>
           <a:p>
             <a:pPr lvl="1"/>
@@ -15031,6 +15016,97 @@
             <a:r>
               <a:rPr lang="en-GB" dirty="0" err="1" smtClean="0"/>
               <a:t>isimlendir</a:t>
+            </a:r>
+            <a:endParaRPr lang="en-GB" dirty="0" smtClean="0"/>
+          </a:p>
+          <a:p>
+            <a:pPr marL="514350" indent="-514350">
+              <a:buFont typeface="+mj-lt"/>
+              <a:buAutoNum type="arabicPeriod"/>
+            </a:pPr>
+            <a:r>
+              <a:rPr lang="en-GB" dirty="0" err="1" smtClean="0"/>
+              <a:t>Kelime</a:t>
+            </a:r>
+            <a:r>
+              <a:rPr lang="en-GB" dirty="0" smtClean="0"/>
+              <a:t> </a:t>
+            </a:r>
+            <a:r>
+              <a:rPr lang="en-GB" dirty="0" err="1" smtClean="0"/>
+              <a:t>icin</a:t>
+            </a:r>
+            <a:r>
+              <a:rPr lang="en-GB" dirty="0" smtClean="0"/>
+              <a:t> parse result </a:t>
+            </a:r>
+            <a:r>
+              <a:rPr lang="en-GB" dirty="0" err="1" smtClean="0"/>
+              <a:t>daha</a:t>
+            </a:r>
+            <a:r>
+              <a:rPr lang="en-GB" dirty="0" smtClean="0"/>
+              <a:t> once </a:t>
+            </a:r>
+            <a:r>
+              <a:rPr lang="en-GB" dirty="0" err="1" smtClean="0"/>
+              <a:t>olmus</a:t>
+            </a:r>
+            <a:r>
+              <a:rPr lang="en-GB" dirty="0" smtClean="0"/>
+              <a:t> mu? </a:t>
+            </a:r>
+            <a:r>
+              <a:rPr lang="en-GB" dirty="0" err="1" smtClean="0"/>
+              <a:t>Tek</a:t>
+            </a:r>
+            <a:r>
+              <a:rPr lang="en-GB" dirty="0" smtClean="0"/>
+              <a:t> </a:t>
+            </a:r>
+            <a:r>
+              <a:rPr lang="en-GB" dirty="0" err="1" smtClean="0"/>
+              <a:t>kelime</a:t>
+            </a:r>
+            <a:r>
+              <a:rPr lang="en-GB" dirty="0" smtClean="0"/>
+              <a:t> </a:t>
+            </a:r>
+            <a:r>
+              <a:rPr lang="en-GB" dirty="0" err="1" smtClean="0"/>
+              <a:t>verildiginde</a:t>
+            </a:r>
+            <a:r>
+              <a:rPr lang="en-GB" dirty="0" smtClean="0"/>
+              <a:t> </a:t>
+            </a:r>
+            <a:r>
+              <a:rPr lang="en-GB" dirty="0" err="1" smtClean="0"/>
+              <a:t>uygulamak</a:t>
+            </a:r>
+            <a:r>
+              <a:rPr lang="en-GB" dirty="0" smtClean="0"/>
+              <a:t> </a:t>
+            </a:r>
+            <a:r>
+              <a:rPr lang="en-GB" dirty="0" err="1" smtClean="0"/>
+              <a:t>icin</a:t>
+            </a:r>
+            <a:r>
+              <a:rPr lang="en-GB" dirty="0" smtClean="0"/>
+              <a:t> de </a:t>
+            </a:r>
+            <a:r>
+              <a:rPr lang="en-GB" dirty="0" err="1" smtClean="0"/>
+              <a:t>iyi</a:t>
+            </a:r>
+            <a:r>
+              <a:rPr lang="en-GB" dirty="0" smtClean="0"/>
+              <a:t> </a:t>
+            </a:r>
+            <a:r>
+              <a:rPr lang="en-GB" dirty="0" err="1" smtClean="0"/>
+              <a:t>olur</a:t>
             </a:r>
             <a:endParaRPr lang="en-GB" dirty="0" smtClean="0"/>
           </a:p>
@@ -21737,7 +21813,7 @@
         <p:spPr>
           <a:xfrm>
             <a:off x="911116" y="5958978"/>
-            <a:ext cx="4310732" cy="369332"/>
+            <a:ext cx="6530570" cy="646331"/>
           </a:xfrm>
           <a:prstGeom prst="rect">
             <a:avLst/>
@@ -21761,6 +21837,25 @@
             <a:r>
               <a:rPr lang="el-GR" dirty="0" smtClean="0"/>
               <a:t>α</a:t>
+            </a:r>
+            <a:endParaRPr lang="en-GB" dirty="0" smtClean="0"/>
+          </a:p>
+          <a:p>
+            <a:pPr>
+              <a:buFont typeface="Arial" pitchFamily="34" charset="0"/>
+              <a:buChar char="•"/>
+            </a:pPr>
+            <a:r>
+              <a:rPr lang="en-GB" dirty="0" smtClean="0"/>
+              <a:t> Note: for multiple context words, need to </a:t>
+            </a:r>
+            <a:r>
+              <a:rPr lang="en-GB" smtClean="0"/>
+              <a:t>apply weighted </a:t>
+            </a:r>
+            <a:r>
+              <a:rPr lang="en-GB" dirty="0" smtClean="0"/>
+              <a:t>addition</a:t>
             </a:r>
             <a:endParaRPr lang="en-US" dirty="0"/>
           </a:p>
@@ -25118,13 +25213,7 @@
               <a:rPr lang="en-GB" sz="3200" dirty="0" smtClean="0">
                 <a:sym typeface="Wingdings" pitchFamily="2" charset="2"/>
               </a:rPr>
-              <a:t>Occurrence of x and y used </a:t>
-            </a:r>
-            <a:r>
-              <a:rPr lang="en-GB" sz="3200" dirty="0" smtClean="0">
-                <a:sym typeface="Wingdings" pitchFamily="2" charset="2"/>
-              </a:rPr>
-              <a:t>together (</a:t>
+              <a:t>Occurrence of x and y used together (</a:t>
             </a:r>
             <a:r>
               <a:rPr lang="en-GB" sz="3200" dirty="0" err="1" smtClean="0">
@@ -25270,11 +25359,7 @@
             </a:pPr>
             <a:r>
               <a:rPr lang="en-GB" sz="3200" dirty="0" smtClean="0"/>
-              <a:t>Instead, use </a:t>
-            </a:r>
-            <a:r>
-              <a:rPr lang="en-GB" sz="3200" dirty="0" smtClean="0"/>
-              <a:t>weighted interpolation with weights as cumulative distribution</a:t>
+              <a:t>Instead, use weighted interpolation with weights as cumulative distribution</a:t>
             </a:r>
             <a:r>
               <a:rPr lang="en-GB" sz="3200" dirty="0" smtClean="0">
@@ -25282,9 +25367,6 @@
               </a:rPr>
               <a:t> </a:t>
             </a:r>
-            <a:endParaRPr lang="en-GB" sz="3200" dirty="0" smtClean="0">
-              <a:sym typeface="Wingdings" pitchFamily="2" charset="2"/>
-            </a:endParaRPr>
           </a:p>
           <a:p>
             <a:pPr marL="800100" lvl="1" indent="-342900">
@@ -34017,7 +34099,9 @@
         </p:nvSpPr>
         <p:spPr/>
         <p:txBody>
-          <a:bodyPr/>
+          <a:bodyPr>
+            <a:normAutofit lnSpcReduction="10000"/>
+          </a:bodyPr>
           <a:lstStyle/>
           <a:p>
             <a:pPr lvl="0">
@@ -34027,31 +34111,7 @@
               <a:rPr lang="en-GB" dirty="0" smtClean="0">
                 <a:sym typeface="Wingdings" pitchFamily="2" charset="2"/>
               </a:rPr>
-              <a:t>Need smoothing for estimating the collocation likelihood of a </a:t>
-            </a:r>
-            <a:r>
-              <a:rPr lang="en-GB" dirty="0" smtClean="0">
-                <a:sym typeface="Wingdings" pitchFamily="2" charset="2"/>
-              </a:rPr>
-              <a:t>co-occurrence which </a:t>
-            </a:r>
-            <a:r>
-              <a:rPr lang="en-GB" dirty="0" smtClean="0">
-                <a:sym typeface="Wingdings" pitchFamily="2" charset="2"/>
-              </a:rPr>
-              <a:t>doesn’t </a:t>
-            </a:r>
-            <a:r>
-              <a:rPr lang="en-GB" dirty="0" smtClean="0">
-                <a:sym typeface="Wingdings" pitchFamily="2" charset="2"/>
-              </a:rPr>
-              <a:t>exist in the previous </a:t>
-            </a:r>
-            <a:r>
-              <a:rPr lang="en-GB" dirty="0" err="1" smtClean="0">
-                <a:sym typeface="Wingdings" pitchFamily="2" charset="2"/>
-              </a:rPr>
-              <a:t>knowled</a:t>
+              <a:t>Need smoothing for estimating the collocation likelihood of a co-occurrence which doesn’t exist in the previous knowledge</a:t>
             </a:r>
             <a:endParaRPr lang="en-US" dirty="0" smtClean="0"/>
           </a:p>
@@ -34071,15 +34131,7 @@
             </a:pPr>
             <a:r>
               <a:rPr lang="en-US" dirty="0" smtClean="0"/>
-              <a:t>“</a:t>
-            </a:r>
-            <a:r>
-              <a:rPr lang="en-US" dirty="0" smtClean="0"/>
-              <a:t>Use count of things you’ve seen once to help estimate the count of things you’ve never seen</a:t>
-            </a:r>
-            <a:r>
-              <a:rPr lang="en-US" dirty="0" smtClean="0"/>
-              <a:t>.”</a:t>
+              <a:t>“Use count of things you’ve seen once to help estimate the count of things you’ve never seen.”</a:t>
             </a:r>
           </a:p>
           <a:p>
@@ -34103,10 +34155,64 @@
               </a:rPr>
               <a:t>page</a:t>
             </a:r>
-            <a:endParaRPr lang="en-US" dirty="0" smtClean="0"/>
-          </a:p>
-          <a:p>
-            <a:endParaRPr lang="en-US" dirty="0"/>
+            <a:endParaRPr lang="en-GB" dirty="0" smtClean="0">
+              <a:sym typeface="Wingdings" pitchFamily="2" charset="2"/>
+            </a:endParaRPr>
+          </a:p>
+          <a:p>
+            <a:pPr lvl="1">
+              <a:defRPr/>
+            </a:pPr>
+            <a:r>
+              <a:rPr lang="en-GB" dirty="0" smtClean="0">
+                <a:sym typeface="Wingdings" pitchFamily="2" charset="2"/>
+              </a:rPr>
+              <a:t>N</a:t>
+            </a:r>
+            <a:r>
+              <a:rPr lang="en-GB" baseline="-25000" dirty="0" smtClean="0">
+                <a:sym typeface="Wingdings" pitchFamily="2" charset="2"/>
+              </a:rPr>
+              <a:t>0</a:t>
+            </a:r>
+            <a:r>
+              <a:rPr lang="en-GB" dirty="0" smtClean="0">
+                <a:sym typeface="Wingdings" pitchFamily="2" charset="2"/>
+              </a:rPr>
+              <a:t> = V</a:t>
+            </a:r>
+            <a:r>
+              <a:rPr lang="en-GB" baseline="30000" dirty="0" smtClean="0">
+                <a:sym typeface="Wingdings" pitchFamily="2" charset="2"/>
+              </a:rPr>
+              <a:t>N</a:t>
+            </a:r>
+            <a:r>
+              <a:rPr lang="en-GB" dirty="0" smtClean="0">
+                <a:sym typeface="Wingdings" pitchFamily="2" charset="2"/>
+              </a:rPr>
+              <a:t> minus </a:t>
+            </a:r>
+            <a:r>
+              <a:rPr lang="en-GB" dirty="0" err="1" smtClean="0">
+                <a:sym typeface="Wingdings" pitchFamily="2" charset="2"/>
+              </a:rPr>
+              <a:t>CountOfDistinctNGrams</a:t>
+            </a:r>
+            <a:endParaRPr lang="en-GB" dirty="0" smtClean="0">
+              <a:sym typeface="Wingdings" pitchFamily="2" charset="2"/>
+            </a:endParaRPr>
+          </a:p>
+          <a:p>
+            <a:pPr lvl="1">
+              <a:defRPr/>
+            </a:pPr>
+            <a:r>
+              <a:rPr lang="en-GB" dirty="0" smtClean="0">
+                <a:sym typeface="Wingdings" pitchFamily="2" charset="2"/>
+              </a:rPr>
+              <a:t>V: vocabulary size (distinct unigram count)</a:t>
+            </a:r>
           </a:p>
         </p:txBody>
       </p:sp>
@@ -34147,12 +34253,18 @@
         </p:nvSpPr>
         <p:spPr/>
         <p:txBody>
-          <a:bodyPr/>
+          <a:bodyPr>
+            <a:normAutofit fontScale="90000"/>
+          </a:bodyPr>
           <a:lstStyle/>
           <a:p>
             <a:r>
               <a:rPr lang="en-GB" dirty="0" smtClean="0"/>
-              <a:t>Putting it all together</a:t>
+              <a:t>Improved Good-Turing smoothing for </a:t>
+            </a:r>
+            <a:r>
+              <a:rPr lang="en-GB" dirty="0" err="1" smtClean="0"/>
+              <a:t>NGrams</a:t>
             </a:r>
             <a:endParaRPr lang="en-US" dirty="0"/>
           </a:p>
@@ -34160,7 +34272,7 @@
       </p:sp>
       <p:sp>
         <p:nvSpPr>
-          <p:cNvPr id="5" name="Content Placeholder 4"/>
+          <p:cNvPr id="3" name="Content Placeholder 2"/>
           <p:cNvSpPr>
             <a:spLocks noGrp="1"/>
           </p:cNvSpPr>
@@ -34171,743 +34283,149 @@
         <p:spPr>
           <a:xfrm>
             <a:off x="457200" y="1600200"/>
-            <a:ext cx="8229600" cy="4614882"/>
+            <a:ext cx="8229600" cy="4525963"/>
           </a:xfrm>
         </p:spPr>
         <p:txBody>
           <a:bodyPr>
-            <a:noAutofit/>
+            <a:normAutofit lnSpcReduction="10000"/>
           </a:bodyPr>
           <a:lstStyle/>
           <a:p>
             <a:pPr>
-              <a:buNone/>
+              <a:defRPr/>
             </a:pPr>
             <a:r>
-              <a:rPr lang="en-GB" sz="1200" dirty="0" smtClean="0">
+              <a:rPr lang="en-GB" dirty="0" smtClean="0">
+                <a:sym typeface="Wingdings" pitchFamily="2" charset="2"/>
+              </a:rPr>
+              <a:t>However, definition of Good-Turing as written in Wikipedia is not very efficient</a:t>
+            </a:r>
+            <a:endParaRPr lang="en-GB" dirty="0" smtClean="0"/>
+          </a:p>
+          <a:p>
+            <a:pPr>
+              <a:defRPr/>
+            </a:pPr>
+            <a:r>
+              <a:rPr lang="en-GB" dirty="0" smtClean="0"/>
+              <a:t>How about the zero frequency of frequencies?</a:t>
+            </a:r>
+          </a:p>
+          <a:p>
+            <a:pPr lvl="1">
+              <a:defRPr/>
+            </a:pPr>
+            <a:r>
+              <a:rPr lang="en-GB" dirty="0" smtClean="0"/>
+              <a:t>Use log linear regression : </a:t>
+            </a:r>
+            <a:r>
+              <a:rPr lang="en-US" sz="2000" dirty="0" smtClean="0">
                 <a:latin typeface="Courier New" pitchFamily="49" charset="0"/>
                 <a:cs typeface="Courier New" pitchFamily="49" charset="0"/>
               </a:rPr>
-              <a:t>// Returns List&lt;</a:t>
-            </a:r>
-            <a:r>
-              <a:rPr lang="en-GB" sz="1200" dirty="0" err="1" smtClean="0">
+              <a:t>log(</a:t>
+            </a:r>
+            <a:r>
+              <a:rPr lang="en-US" sz="2000" i="1" dirty="0" err="1" smtClean="0">
                 <a:latin typeface="Courier New" pitchFamily="49" charset="0"/>
                 <a:cs typeface="Courier New" pitchFamily="49" charset="0"/>
               </a:rPr>
-              <a:t>ParseResult</a:t>
-            </a:r>
-            <a:r>
-              <a:rPr lang="en-GB" sz="1200" dirty="0" smtClean="0">
+              <a:t>N</a:t>
+            </a:r>
+            <a:r>
+              <a:rPr lang="en-US" sz="2000" i="1" baseline="-25000" dirty="0" err="1" smtClean="0">
                 <a:latin typeface="Courier New" pitchFamily="49" charset="0"/>
                 <a:cs typeface="Courier New" pitchFamily="49" charset="0"/>
               </a:rPr>
-              <a:t>, </a:t>
-            </a:r>
-            <a:r>
-              <a:rPr lang="en-GB" sz="1200" dirty="0" err="1" smtClean="0">
+              <a:t>c</a:t>
+            </a:r>
+            <a:r>
+              <a:rPr lang="en-US" sz="2000" i="1" dirty="0" smtClean="0">
                 <a:latin typeface="Courier New" pitchFamily="49" charset="0"/>
                 <a:cs typeface="Courier New" pitchFamily="49" charset="0"/>
               </a:rPr>
-              <a:t>CollocationLikelihoodValue</a:t>
-            </a:r>
-            <a:r>
-              <a:rPr lang="en-GB" sz="1200" dirty="0" smtClean="0">
-                <a:latin typeface="Courier New" pitchFamily="49" charset="0"/>
-                <a:cs typeface="Courier New" pitchFamily="49" charset="0"/>
-              </a:rPr>
-              <a:t>&gt;</a:t>
-            </a:r>
-          </a:p>
-          <a:p>
-            <a:pPr>
-              <a:buNone/>
-            </a:pPr>
-            <a:r>
-              <a:rPr lang="en-GB" sz="1200" dirty="0" err="1" smtClean="0">
-                <a:latin typeface="Courier New" pitchFamily="49" charset="0"/>
-                <a:cs typeface="Courier New" pitchFamily="49" charset="0"/>
-              </a:rPr>
-              <a:t>FindCollocationLikelihoods</a:t>
-            </a:r>
-            <a:r>
-              <a:rPr lang="en-GB" sz="1200" dirty="0" smtClean="0">
-                <a:latin typeface="Courier New" pitchFamily="49" charset="0"/>
-                <a:cs typeface="Courier New" pitchFamily="49" charset="0"/>
-              </a:rPr>
-              <a:t>(</a:t>
-            </a:r>
-            <a:r>
-              <a:rPr lang="en-US" sz="1200" dirty="0" smtClean="0">
-                <a:latin typeface="Courier New" pitchFamily="49" charset="0"/>
-                <a:cs typeface="Courier New" pitchFamily="49" charset="0"/>
-              </a:rPr>
-              <a:t>target </a:t>
-            </a:r>
-            <a:r>
-              <a:rPr lang="en-US" sz="1200" dirty="0" smtClean="0">
-                <a:latin typeface="Courier New" pitchFamily="49" charset="0"/>
-                <a:cs typeface="Courier New" pitchFamily="49" charset="0"/>
-              </a:rPr>
-              <a:t>word, leading context, following context</a:t>
-            </a:r>
-            <a:r>
-              <a:rPr lang="en-GB" sz="1200" dirty="0" smtClean="0">
-                <a:latin typeface="Courier New" pitchFamily="49" charset="0"/>
-                <a:cs typeface="Courier New" pitchFamily="49" charset="0"/>
-              </a:rPr>
-              <a:t>):</a:t>
-            </a:r>
-          </a:p>
-          <a:p>
-            <a:pPr>
-              <a:buNone/>
-            </a:pPr>
-            <a:r>
-              <a:rPr lang="en-US" sz="1200" dirty="0" smtClean="0">
-                <a:latin typeface="Courier New" pitchFamily="49" charset="0"/>
-                <a:cs typeface="Courier New" pitchFamily="49" charset="0"/>
-              </a:rPr>
-              <a:t>  TWPRs </a:t>
-            </a:r>
-            <a:r>
-              <a:rPr lang="en-US" sz="1200" dirty="0" smtClean="0">
-                <a:latin typeface="Courier New" pitchFamily="49" charset="0"/>
-                <a:cs typeface="Courier New" pitchFamily="49" charset="0"/>
-                <a:sym typeface="Wingdings" pitchFamily="2" charset="2"/>
-              </a:rPr>
-              <a:t> </a:t>
-            </a:r>
-            <a:r>
-              <a:rPr lang="en-US" sz="1200" dirty="0" smtClean="0">
-                <a:latin typeface="Courier New" pitchFamily="49" charset="0"/>
-                <a:cs typeface="Courier New" pitchFamily="49" charset="0"/>
-              </a:rPr>
-              <a:t>parse target word</a:t>
-            </a:r>
-          </a:p>
-          <a:p>
-            <a:pPr>
-              <a:buNone/>
-            </a:pPr>
-            <a:r>
-              <a:rPr lang="en-US" sz="1200" dirty="0" smtClean="0">
-                <a:latin typeface="Courier New" pitchFamily="49" charset="0"/>
-                <a:cs typeface="Courier New" pitchFamily="49" charset="0"/>
-              </a:rPr>
-              <a:t>  CPLs  </a:t>
-            </a:r>
-            <a:r>
-              <a:rPr lang="en-US" sz="1200" dirty="0" smtClean="0">
-                <a:latin typeface="Courier New" pitchFamily="49" charset="0"/>
-                <a:cs typeface="Courier New" pitchFamily="49" charset="0"/>
-                <a:sym typeface="Wingdings" pitchFamily="2" charset="2"/>
-              </a:rPr>
-              <a:t> </a:t>
-            </a:r>
-            <a:r>
-              <a:rPr lang="en-US" sz="1200" dirty="0" smtClean="0">
-                <a:latin typeface="Courier New" pitchFamily="49" charset="0"/>
-                <a:cs typeface="Courier New" pitchFamily="49" charset="0"/>
-              </a:rPr>
-              <a:t>parse </a:t>
-            </a:r>
-            <a:r>
-              <a:rPr lang="en-US" sz="1200" dirty="0" smtClean="0">
-                <a:latin typeface="Courier New" pitchFamily="49" charset="0"/>
-                <a:cs typeface="Courier New" pitchFamily="49" charset="0"/>
-              </a:rPr>
-              <a:t>leading context</a:t>
-            </a:r>
-          </a:p>
-          <a:p>
-            <a:pPr>
-              <a:buNone/>
-            </a:pPr>
-            <a:r>
-              <a:rPr lang="en-US" sz="1200" dirty="0" smtClean="0">
-                <a:latin typeface="Courier New" pitchFamily="49" charset="0"/>
-                <a:cs typeface="Courier New" pitchFamily="49" charset="0"/>
-              </a:rPr>
-              <a:t>  CPFs  </a:t>
-            </a:r>
-            <a:r>
-              <a:rPr lang="en-US" sz="1200" dirty="0" smtClean="0">
-                <a:latin typeface="Courier New" pitchFamily="49" charset="0"/>
-                <a:cs typeface="Courier New" pitchFamily="49" charset="0"/>
-                <a:sym typeface="Wingdings" pitchFamily="2" charset="2"/>
-              </a:rPr>
-              <a:t> </a:t>
-            </a:r>
-            <a:r>
-              <a:rPr lang="en-US" sz="1200" dirty="0" smtClean="0">
-                <a:latin typeface="Courier New" pitchFamily="49" charset="0"/>
-                <a:cs typeface="Courier New" pitchFamily="49" charset="0"/>
-              </a:rPr>
-              <a:t>parse </a:t>
-            </a:r>
-            <a:r>
-              <a:rPr lang="en-US" sz="1200" dirty="0" smtClean="0">
-                <a:latin typeface="Courier New" pitchFamily="49" charset="0"/>
-                <a:cs typeface="Courier New" pitchFamily="49" charset="0"/>
-              </a:rPr>
-              <a:t>following context</a:t>
-            </a:r>
-          </a:p>
-          <a:p>
-            <a:pPr>
-              <a:buNone/>
-            </a:pPr>
-            <a:r>
-              <a:rPr lang="en-US" sz="1200" dirty="0" smtClean="0">
-                <a:latin typeface="Courier New" pitchFamily="49" charset="0"/>
-                <a:cs typeface="Courier New" pitchFamily="49" charset="0"/>
-              </a:rPr>
-              <a:t>  CCPL  </a:t>
-            </a:r>
-            <a:r>
-              <a:rPr lang="en-US" sz="1200" dirty="0" smtClean="0">
-                <a:latin typeface="Courier New" pitchFamily="49" charset="0"/>
-                <a:cs typeface="Courier New" pitchFamily="49" charset="0"/>
-                <a:sym typeface="Wingdings" pitchFamily="2" charset="2"/>
-              </a:rPr>
-              <a:t> </a:t>
-            </a:r>
-            <a:r>
-              <a:rPr lang="en-US" sz="1200" dirty="0" smtClean="0">
-                <a:latin typeface="Courier New" pitchFamily="49" charset="0"/>
-                <a:cs typeface="Courier New" pitchFamily="49" charset="0"/>
-              </a:rPr>
-              <a:t>create </a:t>
-            </a:r>
-            <a:r>
-              <a:rPr lang="en-US" sz="1200" dirty="0" err="1" smtClean="0">
-                <a:latin typeface="Courier New" pitchFamily="49" charset="0"/>
-                <a:cs typeface="Courier New" pitchFamily="49" charset="0"/>
-              </a:rPr>
-              <a:t>cartesian</a:t>
-            </a:r>
-            <a:r>
-              <a:rPr lang="en-US" sz="1200" dirty="0" smtClean="0">
-                <a:latin typeface="Courier New" pitchFamily="49" charset="0"/>
-                <a:cs typeface="Courier New" pitchFamily="49" charset="0"/>
-              </a:rPr>
-              <a:t> product of </a:t>
-            </a:r>
-            <a:r>
-              <a:rPr lang="en-US" sz="1200" dirty="0" smtClean="0">
-                <a:latin typeface="Courier New" pitchFamily="49" charset="0"/>
-                <a:cs typeface="Courier New" pitchFamily="49" charset="0"/>
-              </a:rPr>
-              <a:t>CPLs</a:t>
-            </a:r>
-            <a:endParaRPr lang="en-US" sz="1200" dirty="0" smtClean="0">
+              <a:t>)=a + b*log(c)</a:t>
+            </a:r>
+            <a:endParaRPr lang="en-US" dirty="0" smtClean="0">
               <a:latin typeface="Courier New" pitchFamily="49" charset="0"/>
               <a:cs typeface="Courier New" pitchFamily="49" charset="0"/>
             </a:endParaRPr>
           </a:p>
           <a:p>
-            <a:pPr>
-              <a:buNone/>
-            </a:pPr>
-            <a:r>
-              <a:rPr lang="en-US" sz="1200" dirty="0" smtClean="0">
-                <a:latin typeface="Courier New" pitchFamily="49" charset="0"/>
-                <a:cs typeface="Courier New" pitchFamily="49" charset="0"/>
-              </a:rPr>
-              <a:t>  CCPF  </a:t>
-            </a:r>
-            <a:r>
-              <a:rPr lang="en-US" sz="1200" dirty="0" smtClean="0">
-                <a:latin typeface="Courier New" pitchFamily="49" charset="0"/>
-                <a:cs typeface="Courier New" pitchFamily="49" charset="0"/>
-                <a:sym typeface="Wingdings" pitchFamily="2" charset="2"/>
-              </a:rPr>
-              <a:t> </a:t>
-            </a:r>
-            <a:r>
-              <a:rPr lang="en-US" sz="1200" dirty="0" smtClean="0">
-                <a:latin typeface="Courier New" pitchFamily="49" charset="0"/>
-                <a:cs typeface="Courier New" pitchFamily="49" charset="0"/>
-              </a:rPr>
-              <a:t>create </a:t>
-            </a:r>
-            <a:r>
-              <a:rPr lang="en-US" sz="1200" dirty="0" err="1" smtClean="0">
-                <a:latin typeface="Courier New" pitchFamily="49" charset="0"/>
-                <a:cs typeface="Courier New" pitchFamily="49" charset="0"/>
-              </a:rPr>
-              <a:t>cartesian</a:t>
-            </a:r>
-            <a:r>
-              <a:rPr lang="en-US" sz="1200" dirty="0" smtClean="0">
-                <a:latin typeface="Courier New" pitchFamily="49" charset="0"/>
-                <a:cs typeface="Courier New" pitchFamily="49" charset="0"/>
-              </a:rPr>
-              <a:t> product of </a:t>
-            </a:r>
-            <a:r>
-              <a:rPr lang="en-US" sz="1200" dirty="0" smtClean="0">
-                <a:latin typeface="Courier New" pitchFamily="49" charset="0"/>
-                <a:cs typeface="Courier New" pitchFamily="49" charset="0"/>
-              </a:rPr>
-              <a:t>CPFs</a:t>
-            </a:r>
-            <a:endParaRPr lang="en-US" sz="1200" dirty="0" smtClean="0">
-              <a:latin typeface="Courier New" pitchFamily="49" charset="0"/>
-              <a:cs typeface="Courier New" pitchFamily="49" charset="0"/>
-            </a:endParaRPr>
-          </a:p>
-          <a:p>
-            <a:pPr>
-              <a:buNone/>
-            </a:pPr>
-            <a:r>
-              <a:rPr lang="en-US" sz="1200" dirty="0" smtClean="0">
-                <a:latin typeface="Courier New" pitchFamily="49" charset="0"/>
-                <a:cs typeface="Courier New" pitchFamily="49" charset="0"/>
-              </a:rPr>
-              <a:t>  for </a:t>
-            </a:r>
-            <a:r>
-              <a:rPr lang="en-US" sz="1200" dirty="0" smtClean="0">
-                <a:latin typeface="Courier New" pitchFamily="49" charset="0"/>
-                <a:cs typeface="Courier New" pitchFamily="49" charset="0"/>
-              </a:rPr>
-              <a:t>each parse result TWPR in TWPRs:</a:t>
-            </a:r>
-          </a:p>
-          <a:p>
-            <a:pPr>
-              <a:buNone/>
-            </a:pPr>
-            <a:r>
-              <a:rPr lang="en-GB" sz="1200" dirty="0" smtClean="0">
-                <a:latin typeface="Courier New" pitchFamily="49" charset="0"/>
-                <a:cs typeface="Courier New" pitchFamily="49" charset="0"/>
-              </a:rPr>
-              <a:t>    LCTWPRCLs </a:t>
-            </a:r>
-            <a:r>
-              <a:rPr lang="en-GB" sz="1200" dirty="0" smtClean="0">
-                <a:latin typeface="Courier New" pitchFamily="49" charset="0"/>
-                <a:cs typeface="Courier New" pitchFamily="49" charset="0"/>
-                <a:sym typeface="Wingdings" pitchFamily="2" charset="2"/>
-              </a:rPr>
-              <a:t> &lt;leading </a:t>
-            </a:r>
-            <a:r>
-              <a:rPr lang="en-GB" sz="1200" dirty="0" err="1" smtClean="0">
-                <a:latin typeface="Courier New" pitchFamily="49" charset="0"/>
-                <a:cs typeface="Courier New" pitchFamily="49" charset="0"/>
-                <a:sym typeface="Wingdings" pitchFamily="2" charset="2"/>
-              </a:rPr>
-              <a:t>context,target</a:t>
-            </a:r>
-            <a:r>
-              <a:rPr lang="en-GB" sz="1200" dirty="0" smtClean="0">
-                <a:latin typeface="Courier New" pitchFamily="49" charset="0"/>
-                <a:cs typeface="Courier New" pitchFamily="49" charset="0"/>
-                <a:sym typeface="Wingdings" pitchFamily="2" charset="2"/>
-              </a:rPr>
-              <a:t> word&gt; parse results collocation likelihoods</a:t>
-            </a:r>
-          </a:p>
-          <a:p>
-            <a:pPr>
-              <a:buNone/>
-            </a:pPr>
-            <a:r>
-              <a:rPr lang="en-US" sz="1200" dirty="0" smtClean="0">
-                <a:latin typeface="Courier New" pitchFamily="49" charset="0"/>
-                <a:cs typeface="Courier New" pitchFamily="49" charset="0"/>
-              </a:rPr>
-              <a:t>      for </a:t>
-            </a:r>
-            <a:r>
-              <a:rPr lang="en-US" sz="1200" dirty="0" smtClean="0">
-                <a:latin typeface="Courier New" pitchFamily="49" charset="0"/>
-                <a:cs typeface="Courier New" pitchFamily="49" charset="0"/>
-              </a:rPr>
-              <a:t>each parse result sequence CPRS in CCPL:</a:t>
-            </a:r>
-          </a:p>
-          <a:p>
-            <a:pPr>
-              <a:buNone/>
-            </a:pPr>
-            <a:r>
-              <a:rPr lang="en-GB" sz="1200" dirty="0" smtClean="0">
-                <a:latin typeface="Courier New" pitchFamily="49" charset="0"/>
-                <a:cs typeface="Courier New" pitchFamily="49" charset="0"/>
-              </a:rPr>
-              <a:t>        LCTWPRCLs</a:t>
-            </a:r>
-            <a:r>
-              <a:rPr lang="en-GB" sz="1200" dirty="0" smtClean="0">
-                <a:latin typeface="Courier New" pitchFamily="49" charset="0"/>
-                <a:cs typeface="Courier New" pitchFamily="49" charset="0"/>
-                <a:sym typeface="Wingdings" pitchFamily="2" charset="2"/>
-              </a:rPr>
-              <a:t> += </a:t>
-            </a:r>
-            <a:r>
-              <a:rPr lang="en-GB" sz="1200" dirty="0" err="1" smtClean="0">
-                <a:latin typeface="Courier New" pitchFamily="49" charset="0"/>
-                <a:cs typeface="Courier New" pitchFamily="49" charset="0"/>
-                <a:sym typeface="Wingdings" pitchFamily="2" charset="2"/>
-              </a:rPr>
-              <a:t>FindParseResultsCollocationLikelihood</a:t>
-            </a:r>
-            <a:r>
-              <a:rPr lang="en-GB" sz="1200" dirty="0" smtClean="0">
-                <a:latin typeface="Courier New" pitchFamily="49" charset="0"/>
-                <a:cs typeface="Courier New" pitchFamily="49" charset="0"/>
-                <a:sym typeface="Wingdings" pitchFamily="2" charset="2"/>
-              </a:rPr>
-              <a:t>(CPRS, TWPR)</a:t>
-            </a:r>
-            <a:endParaRPr lang="en-GB" sz="1200" dirty="0" smtClean="0">
-              <a:latin typeface="Courier New" pitchFamily="49" charset="0"/>
-              <a:cs typeface="Courier New" pitchFamily="49" charset="0"/>
-              <a:sym typeface="Wingdings" pitchFamily="2" charset="2"/>
-            </a:endParaRPr>
-          </a:p>
-          <a:p>
-            <a:pPr>
-              <a:buNone/>
-            </a:pPr>
-            <a:r>
-              <a:rPr lang="en-GB" sz="1200" dirty="0" smtClean="0">
-                <a:latin typeface="Courier New" pitchFamily="49" charset="0"/>
-                <a:cs typeface="Courier New" pitchFamily="49" charset="0"/>
-                <a:sym typeface="Wingdings" pitchFamily="2" charset="2"/>
-              </a:rPr>
-              <a:t>    LCTWPRCLs  </a:t>
-            </a:r>
-            <a:r>
-              <a:rPr lang="en-GB" sz="1200" dirty="0" err="1" smtClean="0">
-                <a:latin typeface="Courier New" pitchFamily="49" charset="0"/>
-                <a:cs typeface="Courier New" pitchFamily="49" charset="0"/>
-                <a:sym typeface="Wingdings" pitchFamily="2" charset="2"/>
-              </a:rPr>
-              <a:t>SmoothParseResultsCollocationLikelihoods</a:t>
-            </a:r>
-            <a:r>
-              <a:rPr lang="en-GB" sz="1200" dirty="0" smtClean="0">
-                <a:latin typeface="Courier New" pitchFamily="49" charset="0"/>
-                <a:cs typeface="Courier New" pitchFamily="49" charset="0"/>
-                <a:sym typeface="Wingdings" pitchFamily="2" charset="2"/>
-              </a:rPr>
-              <a:t>(</a:t>
-            </a:r>
-            <a:r>
-              <a:rPr lang="en-GB" sz="1200" dirty="0" smtClean="0">
-                <a:latin typeface="Courier New" pitchFamily="49" charset="0"/>
-                <a:cs typeface="Courier New" pitchFamily="49" charset="0"/>
-              </a:rPr>
-              <a:t>LCTWPRCLs</a:t>
-            </a:r>
-            <a:r>
-              <a:rPr lang="en-GB" sz="1200" dirty="0" smtClean="0">
-                <a:latin typeface="Courier New" pitchFamily="49" charset="0"/>
-                <a:cs typeface="Courier New" pitchFamily="49" charset="0"/>
-                <a:sym typeface="Wingdings" pitchFamily="2" charset="2"/>
-              </a:rPr>
-              <a:t>)</a:t>
-            </a:r>
-          </a:p>
-          <a:p>
-            <a:pPr>
-              <a:buNone/>
-            </a:pPr>
-            <a:endParaRPr lang="en-GB" sz="1200" dirty="0" smtClean="0">
-              <a:latin typeface="Courier New" pitchFamily="49" charset="0"/>
-              <a:cs typeface="Courier New" pitchFamily="49" charset="0"/>
-              <a:sym typeface="Wingdings" pitchFamily="2" charset="2"/>
-            </a:endParaRPr>
-          </a:p>
-          <a:p>
-            <a:pPr>
-              <a:buNone/>
-            </a:pPr>
-            <a:r>
-              <a:rPr lang="en-GB" sz="1200" dirty="0" smtClean="0">
-                <a:latin typeface="Courier New" pitchFamily="49" charset="0"/>
-                <a:cs typeface="Courier New" pitchFamily="49" charset="0"/>
-                <a:sym typeface="Wingdings" pitchFamily="2" charset="2"/>
-              </a:rPr>
+            <a:pPr lvl="1"/>
+            <a:r>
+              <a:rPr lang="en-GB" dirty="0" smtClean="0"/>
+              <a:t>That will give an estimation</a:t>
+            </a:r>
+          </a:p>
+          <a:p>
+            <a:pPr lvl="1"/>
+            <a:r>
+              <a:rPr lang="en-GB" dirty="0" smtClean="0"/>
+              <a:t>Called “Simple Good-Turing”</a:t>
+            </a:r>
+          </a:p>
+          <a:p>
+            <a:r>
+              <a:rPr lang="en-GB" dirty="0" smtClean="0"/>
+              <a:t>Don’t need to apply it to bigger frequencies</a:t>
+            </a:r>
+          </a:p>
+          <a:p>
+            <a:pPr lvl="1"/>
+            <a:r>
+              <a:rPr lang="en-GB" dirty="0" smtClean="0"/>
               <a:t> </a:t>
             </a:r>
-            <a:r>
-              <a:rPr lang="en-GB" sz="1200" dirty="0" smtClean="0">
-                <a:latin typeface="Courier New" pitchFamily="49" charset="0"/>
-                <a:cs typeface="Courier New" pitchFamily="49" charset="0"/>
-                <a:sym typeface="Wingdings" pitchFamily="2" charset="2"/>
-              </a:rPr>
-              <a:t> </a:t>
-            </a:r>
-            <a:r>
-              <a:rPr lang="en-GB" sz="1200" dirty="0" smtClean="0">
-                <a:latin typeface="Courier New" pitchFamily="49" charset="0"/>
-                <a:cs typeface="Courier New" pitchFamily="49" charset="0"/>
-              </a:rPr>
-              <a:t> </a:t>
-            </a:r>
-            <a:r>
-              <a:rPr lang="en-GB" sz="1200" dirty="0" smtClean="0">
-                <a:latin typeface="Courier New" pitchFamily="49" charset="0"/>
-                <a:cs typeface="Courier New" pitchFamily="49" charset="0"/>
-              </a:rPr>
-              <a:t> FCTWPRCLs </a:t>
-            </a:r>
-            <a:r>
-              <a:rPr lang="en-GB" sz="1200" dirty="0" smtClean="0">
-                <a:latin typeface="Courier New" pitchFamily="49" charset="0"/>
-                <a:cs typeface="Courier New" pitchFamily="49" charset="0"/>
-                <a:sym typeface="Wingdings" pitchFamily="2" charset="2"/>
-              </a:rPr>
-              <a:t> </a:t>
-            </a:r>
-            <a:r>
-              <a:rPr lang="en-GB" sz="1200" dirty="0" smtClean="0">
-                <a:latin typeface="Courier New" pitchFamily="49" charset="0"/>
-                <a:cs typeface="Courier New" pitchFamily="49" charset="0"/>
-                <a:sym typeface="Wingdings" pitchFamily="2" charset="2"/>
-              </a:rPr>
-              <a:t>&lt;following </a:t>
-            </a:r>
-            <a:r>
-              <a:rPr lang="en-GB" sz="1200" dirty="0" err="1" smtClean="0">
-                <a:latin typeface="Courier New" pitchFamily="49" charset="0"/>
-                <a:cs typeface="Courier New" pitchFamily="49" charset="0"/>
-                <a:sym typeface="Wingdings" pitchFamily="2" charset="2"/>
-              </a:rPr>
-              <a:t>context,target</a:t>
-            </a:r>
-            <a:r>
-              <a:rPr lang="en-GB" sz="1200" dirty="0" smtClean="0">
-                <a:latin typeface="Courier New" pitchFamily="49" charset="0"/>
-                <a:cs typeface="Courier New" pitchFamily="49" charset="0"/>
-                <a:sym typeface="Wingdings" pitchFamily="2" charset="2"/>
-              </a:rPr>
-              <a:t> word&gt; parse results collocation likelihoods</a:t>
-            </a:r>
-          </a:p>
-          <a:p>
-            <a:pPr>
-              <a:buNone/>
-            </a:pPr>
-            <a:r>
-              <a:rPr lang="en-US" sz="1200" dirty="0" smtClean="0">
-                <a:latin typeface="Courier New" pitchFamily="49" charset="0"/>
-                <a:cs typeface="Courier New" pitchFamily="49" charset="0"/>
-              </a:rPr>
-              <a:t>      for each parse result sequence CPRS in </a:t>
-            </a:r>
-            <a:r>
-              <a:rPr lang="en-US" sz="1200" dirty="0" smtClean="0">
-                <a:latin typeface="Courier New" pitchFamily="49" charset="0"/>
-                <a:cs typeface="Courier New" pitchFamily="49" charset="0"/>
-              </a:rPr>
-              <a:t>CCPF:</a:t>
-            </a:r>
-          </a:p>
-          <a:p>
-            <a:pPr>
-              <a:buNone/>
-            </a:pPr>
-            <a:r>
-              <a:rPr lang="en-US" sz="1200" dirty="0" smtClean="0">
-                <a:latin typeface="Courier New" pitchFamily="49" charset="0"/>
-                <a:cs typeface="Courier New" pitchFamily="49" charset="0"/>
-              </a:rPr>
-              <a:t> </a:t>
-            </a:r>
-            <a:r>
-              <a:rPr lang="en-US" sz="1200" dirty="0" smtClean="0">
-                <a:latin typeface="Courier New" pitchFamily="49" charset="0"/>
-                <a:cs typeface="Courier New" pitchFamily="49" charset="0"/>
-              </a:rPr>
-              <a:t>       </a:t>
-            </a:r>
-            <a:r>
-              <a:rPr lang="en-GB" sz="1200" dirty="0" smtClean="0">
-                <a:latin typeface="Courier New" pitchFamily="49" charset="0"/>
-                <a:cs typeface="Courier New" pitchFamily="49" charset="0"/>
-              </a:rPr>
-              <a:t>FCTWPRCLs </a:t>
-            </a:r>
-            <a:r>
-              <a:rPr lang="en-GB" sz="1200" dirty="0" smtClean="0">
-                <a:latin typeface="Courier New" pitchFamily="49" charset="0"/>
-                <a:cs typeface="Courier New" pitchFamily="49" charset="0"/>
-                <a:sym typeface="Wingdings" pitchFamily="2" charset="2"/>
-              </a:rPr>
-              <a:t>+= </a:t>
-            </a:r>
-            <a:r>
-              <a:rPr lang="en-GB" sz="1200" dirty="0" err="1" smtClean="0">
-                <a:latin typeface="Courier New" pitchFamily="49" charset="0"/>
-                <a:cs typeface="Courier New" pitchFamily="49" charset="0"/>
-                <a:sym typeface="Wingdings" pitchFamily="2" charset="2"/>
-              </a:rPr>
-              <a:t>FindParseResultsCollocationLikelihood</a:t>
-            </a:r>
-            <a:r>
-              <a:rPr lang="en-GB" sz="1200" dirty="0" smtClean="0">
-                <a:latin typeface="Courier New" pitchFamily="49" charset="0"/>
-                <a:cs typeface="Courier New" pitchFamily="49" charset="0"/>
-                <a:sym typeface="Wingdings" pitchFamily="2" charset="2"/>
-              </a:rPr>
-              <a:t>(TWPR, CPRS)</a:t>
-            </a:r>
-          </a:p>
-          <a:p>
-            <a:pPr>
-              <a:buNone/>
-            </a:pPr>
-            <a:r>
-              <a:rPr lang="en-GB" sz="1200" dirty="0" smtClean="0">
-                <a:latin typeface="Courier New" pitchFamily="49" charset="0"/>
-                <a:cs typeface="Courier New" pitchFamily="49" charset="0"/>
-                <a:sym typeface="Wingdings" pitchFamily="2" charset="2"/>
-              </a:rPr>
-              <a:t>    </a:t>
-            </a:r>
-            <a:r>
-              <a:rPr lang="en-GB" sz="1200" dirty="0" smtClean="0">
-                <a:latin typeface="Courier New" pitchFamily="49" charset="0"/>
-                <a:cs typeface="Courier New" pitchFamily="49" charset="0"/>
-                <a:sym typeface="Wingdings" pitchFamily="2" charset="2"/>
-              </a:rPr>
-              <a:t>FCTWPRCLs </a:t>
-            </a:r>
-            <a:r>
-              <a:rPr lang="en-GB" sz="1200" dirty="0" smtClean="0">
-                <a:latin typeface="Courier New" pitchFamily="49" charset="0"/>
-                <a:cs typeface="Courier New" pitchFamily="49" charset="0"/>
-                <a:sym typeface="Wingdings" pitchFamily="2" charset="2"/>
-              </a:rPr>
-              <a:t> </a:t>
-            </a:r>
-            <a:r>
-              <a:rPr lang="en-GB" sz="1200" dirty="0" err="1" smtClean="0">
-                <a:latin typeface="Courier New" pitchFamily="49" charset="0"/>
-                <a:cs typeface="Courier New" pitchFamily="49" charset="0"/>
-                <a:sym typeface="Wingdings" pitchFamily="2" charset="2"/>
-              </a:rPr>
-              <a:t>SmoothParseResultsCollocationLikelihoods</a:t>
-            </a:r>
-            <a:r>
-              <a:rPr lang="en-GB" sz="1200" dirty="0" smtClean="0">
-                <a:latin typeface="Courier New" pitchFamily="49" charset="0"/>
-                <a:cs typeface="Courier New" pitchFamily="49" charset="0"/>
-                <a:sym typeface="Wingdings" pitchFamily="2" charset="2"/>
-              </a:rPr>
-              <a:t>(</a:t>
-            </a:r>
-            <a:r>
-              <a:rPr lang="en-GB" sz="1200" dirty="0" smtClean="0">
-                <a:latin typeface="Courier New" pitchFamily="49" charset="0"/>
-                <a:cs typeface="Courier New" pitchFamily="49" charset="0"/>
-              </a:rPr>
-              <a:t>FCTWPRCLs</a:t>
-            </a:r>
-            <a:r>
-              <a:rPr lang="en-GB" sz="1200" dirty="0" smtClean="0">
-                <a:latin typeface="Courier New" pitchFamily="49" charset="0"/>
-                <a:cs typeface="Courier New" pitchFamily="49" charset="0"/>
-                <a:sym typeface="Wingdings" pitchFamily="2" charset="2"/>
-              </a:rPr>
-              <a:t>)</a:t>
-            </a:r>
-          </a:p>
-          <a:p>
-            <a:pPr>
-              <a:buNone/>
-            </a:pPr>
-            <a:r>
-              <a:rPr lang="en-GB" sz="1200" dirty="0" smtClean="0">
-                <a:latin typeface="Courier New" pitchFamily="49" charset="0"/>
-                <a:cs typeface="Courier New" pitchFamily="49" charset="0"/>
-                <a:sym typeface="Wingdings" pitchFamily="2" charset="2"/>
-              </a:rPr>
-              <a:t> </a:t>
-            </a:r>
-            <a:r>
-              <a:rPr lang="en-GB" sz="1200" dirty="0" smtClean="0">
-                <a:latin typeface="Courier New" pitchFamily="49" charset="0"/>
-                <a:cs typeface="Courier New" pitchFamily="49" charset="0"/>
-                <a:sym typeface="Wingdings" pitchFamily="2" charset="2"/>
-              </a:rPr>
-              <a:t>   </a:t>
-            </a:r>
-          </a:p>
-          <a:p>
-            <a:pPr>
-              <a:buNone/>
-            </a:pPr>
-            <a:r>
-              <a:rPr lang="en-GB" sz="1200" dirty="0" smtClean="0">
-                <a:latin typeface="Courier New" pitchFamily="49" charset="0"/>
-                <a:cs typeface="Courier New" pitchFamily="49" charset="0"/>
-                <a:sym typeface="Wingdings" pitchFamily="2" charset="2"/>
-              </a:rPr>
-              <a:t> </a:t>
-            </a:r>
-            <a:r>
-              <a:rPr lang="en-GB" sz="1200" dirty="0" smtClean="0">
-                <a:latin typeface="Courier New" pitchFamily="49" charset="0"/>
-                <a:cs typeface="Courier New" pitchFamily="49" charset="0"/>
-                <a:sym typeface="Wingdings" pitchFamily="2" charset="2"/>
-              </a:rPr>
-              <a:t> Ls += </a:t>
-            </a:r>
-            <a:r>
-              <a:rPr lang="en-GB" sz="1200" dirty="0" err="1" smtClean="0">
-                <a:latin typeface="Courier New" pitchFamily="49" charset="0"/>
-                <a:cs typeface="Courier New" pitchFamily="49" charset="0"/>
-                <a:sym typeface="Wingdings" pitchFamily="2" charset="2"/>
-              </a:rPr>
-              <a:t>WeightedSummingMergeOfContextLikelihoods</a:t>
-            </a:r>
-            <a:r>
-              <a:rPr lang="en-GB" sz="1200" dirty="0" smtClean="0">
-                <a:latin typeface="Courier New" pitchFamily="49" charset="0"/>
-                <a:cs typeface="Courier New" pitchFamily="49" charset="0"/>
-                <a:sym typeface="Wingdings" pitchFamily="2" charset="2"/>
-              </a:rPr>
-              <a:t>(weighted sum of LCTPRCLs, weighted sum of FCTPRCLs)</a:t>
-            </a:r>
-          </a:p>
-          <a:p>
-            <a:pPr>
-              <a:buNone/>
-            </a:pPr>
-            <a:r>
-              <a:rPr lang="en-GB" sz="1200" dirty="0" smtClean="0">
-                <a:latin typeface="Courier New" pitchFamily="49" charset="0"/>
-                <a:cs typeface="Courier New" pitchFamily="49" charset="0"/>
-                <a:sym typeface="Wingdings" pitchFamily="2" charset="2"/>
-              </a:rPr>
-              <a:t> </a:t>
-            </a:r>
-            <a:r>
-              <a:rPr lang="en-GB" sz="1200" dirty="0" smtClean="0">
-                <a:latin typeface="Courier New" pitchFamily="49" charset="0"/>
-                <a:cs typeface="Courier New" pitchFamily="49" charset="0"/>
-                <a:sym typeface="Wingdings" pitchFamily="2" charset="2"/>
-              </a:rPr>
-              <a:t> return Ls</a:t>
-            </a:r>
-            <a:endParaRPr lang="en-US" sz="1200" dirty="0">
-              <a:latin typeface="Courier New" pitchFamily="49" charset="0"/>
-              <a:cs typeface="Courier New" pitchFamily="49" charset="0"/>
-            </a:endParaRPr>
+          </a:p>
+          <a:p>
+            <a:pPr lvl="1"/>
+            <a:r>
+              <a:rPr lang="en-GB" dirty="0" smtClean="0"/>
+              <a:t>Threshold: k=5</a:t>
+            </a:r>
+          </a:p>
+          <a:p>
+            <a:pPr lvl="1"/>
+            <a:endParaRPr lang="en-US" dirty="0"/>
           </a:p>
         </p:txBody>
       </p:sp>
+      <p:pic>
+        <p:nvPicPr>
+          <p:cNvPr id="1026" name="Picture 2"/>
+          <p:cNvPicPr>
+            <a:picLocks noChangeAspect="1" noChangeArrowheads="1"/>
+          </p:cNvPicPr>
+          <p:nvPr/>
+        </p:nvPicPr>
+        <p:blipFill>
+          <a:blip r:embed="rId2"/>
+          <a:srcRect/>
+          <a:stretch>
+            <a:fillRect/>
+          </a:stretch>
+        </p:blipFill>
+        <p:spPr bwMode="auto">
+          <a:xfrm>
+            <a:off x="3929058" y="5012379"/>
+            <a:ext cx="3857652" cy="845513"/>
+          </a:xfrm>
+          <a:prstGeom prst="rect">
+            <a:avLst/>
+          </a:prstGeom>
+          <a:noFill/>
+          <a:ln w="9525">
+            <a:noFill/>
+            <a:miter lim="800000"/>
+            <a:headEnd/>
+            <a:tailEnd/>
+          </a:ln>
+          <a:effectLst/>
+        </p:spPr>
+      </p:pic>
     </p:spTree>
   </p:cSld>
   <p:clrMapOvr>
@@ -34945,12 +34463,18 @@
         </p:nvSpPr>
         <p:spPr/>
         <p:txBody>
-          <a:bodyPr/>
+          <a:bodyPr>
+            <a:normAutofit fontScale="90000"/>
+          </a:bodyPr>
           <a:lstStyle/>
           <a:p>
             <a:r>
               <a:rPr lang="en-GB" dirty="0" smtClean="0"/>
-              <a:t>Algorithm details</a:t>
+              <a:t>Improved Good-Turing smoothing for </a:t>
+            </a:r>
+            <a:r>
+              <a:rPr lang="en-GB" dirty="0" err="1" smtClean="0"/>
+              <a:t>NGrams</a:t>
             </a:r>
             <a:endParaRPr lang="en-US" dirty="0"/>
           </a:p>
@@ -34966,98 +34490,209 @@
             <p:ph idx="1"/>
           </p:nvPr>
         </p:nvSpPr>
-        <p:spPr/>
+        <p:spPr>
+          <a:xfrm>
+            <a:off x="457200" y="1600200"/>
+            <a:ext cx="8229600" cy="4525963"/>
+          </a:xfrm>
+        </p:spPr>
         <p:txBody>
           <a:bodyPr>
             <a:normAutofit fontScale="92500" lnSpcReduction="20000"/>
           </a:bodyPr>
           <a:lstStyle/>
           <a:p>
-            <a:r>
-              <a:rPr lang="en-GB" dirty="0" smtClean="0"/>
-              <a:t>Many coefficients to tweak the algorithm</a:t>
-            </a:r>
-          </a:p>
-          <a:p>
             <a:pPr lvl="1"/>
             <a:r>
+              <a:rPr lang="en-GB" dirty="0" smtClean="0"/>
+              <a:t>Inspecting </a:t>
+            </a:r>
+            <a:r>
               <a:rPr lang="en-GB" dirty="0" err="1" smtClean="0"/>
-              <a:t>WordForm</a:t>
-            </a:r>
-            <a:r>
-              <a:rPr lang="en-GB" dirty="0" smtClean="0"/>
-              <a:t> collocation weights: 6</a:t>
-            </a:r>
-          </a:p>
-          <a:p>
-            <a:pPr lvl="1"/>
-            <a:r>
-              <a:rPr lang="en-GB" dirty="0" smtClean="0"/>
-              <a:t>Leading-following context weights: 1</a:t>
-            </a:r>
-          </a:p>
-          <a:p>
-            <a:pPr lvl="1"/>
-            <a:r>
-              <a:rPr lang="en-GB" dirty="0" smtClean="0"/>
-              <a:t>Context-</a:t>
-            </a:r>
-            <a:r>
-              <a:rPr lang="en-GB" dirty="0" err="1" smtClean="0"/>
-              <a:t>targetWord</a:t>
-            </a:r>
-            <a:r>
-              <a:rPr lang="en-GB" dirty="0" smtClean="0"/>
-              <a:t> occurrence weight smoothing factor: 1</a:t>
-            </a:r>
-          </a:p>
-          <a:p>
-            <a:pPr lvl="1"/>
-            <a:r>
-              <a:rPr lang="en-GB" dirty="0" smtClean="0"/>
-              <a:t>Weighted interpolation for </a:t>
-            </a:r>
-            <a:r>
-              <a:rPr lang="en-GB" dirty="0" err="1" smtClean="0"/>
-              <a:t>Ngram</a:t>
-            </a:r>
-            <a:r>
-              <a:rPr lang="en-GB" dirty="0" smtClean="0"/>
-              <a:t> : 1+2+3 = 6</a:t>
-            </a:r>
-          </a:p>
-          <a:p>
-            <a:r>
-              <a:rPr lang="en-GB" dirty="0" smtClean="0"/>
-              <a:t>TOTAL : 14 parameters </a:t>
+              <a:t>wordform</a:t>
+            </a:r>
+            <a:r>
+              <a:rPr lang="en-GB" dirty="0" smtClean="0"/>
+              <a:t> collocations </a:t>
             </a:r>
             <a:r>
               <a:rPr lang="en-GB" dirty="0" smtClean="0">
                 <a:sym typeface="Wingdings" pitchFamily="2" charset="2"/>
               </a:rPr>
-              <a:t> Need to tweak well to make algorithm work better</a:t>
-            </a:r>
-          </a:p>
-          <a:p>
+              <a:t> we have different </a:t>
+            </a:r>
+            <a:r>
+              <a:rPr lang="en-GB" dirty="0" err="1" smtClean="0">
+                <a:sym typeface="Wingdings" pitchFamily="2" charset="2"/>
+              </a:rPr>
+              <a:t>NGram</a:t>
+            </a:r>
             <a:r>
               <a:rPr lang="en-GB" dirty="0" smtClean="0">
                 <a:sym typeface="Wingdings" pitchFamily="2" charset="2"/>
               </a:rPr>
-              <a:t>For the moment, they’re just instinctive</a:t>
-            </a:r>
-          </a:p>
-          <a:p>
+              <a:t> types</a:t>
+            </a:r>
+          </a:p>
+          <a:p>
+            <a:pPr lvl="1"/>
             <a:r>
               <a:rPr lang="en-GB" dirty="0" smtClean="0">
                 <a:sym typeface="Wingdings" pitchFamily="2" charset="2"/>
               </a:rPr>
-              <a:t>Need to work on a big annotated corpus to make them better  However, there is no any!</a:t>
-            </a:r>
-            <a:endParaRPr lang="en-GB" dirty="0" smtClean="0"/>
+              <a:t>Something special in TRNLTK</a:t>
+            </a:r>
           </a:p>
           <a:p>
             <a:pPr lvl="1"/>
-            <a:endParaRPr lang="en-GB" dirty="0" smtClean="0"/>
+            <a:r>
+              <a:rPr lang="en-GB" dirty="0" smtClean="0">
+                <a:sym typeface="Wingdings" pitchFamily="2" charset="2"/>
+              </a:rPr>
+              <a:t>E.g. trigrams</a:t>
+            </a:r>
+          </a:p>
+          <a:p>
+            <a:pPr lvl="2"/>
+            <a:r>
+              <a:rPr lang="en-GB" dirty="0" smtClean="0">
+                <a:sym typeface="Wingdings" pitchFamily="2" charset="2"/>
+              </a:rPr>
+              <a:t>surface </a:t>
+            </a:r>
+            <a:r>
+              <a:rPr lang="en-GB" dirty="0" err="1" smtClean="0">
+                <a:sym typeface="Wingdings" pitchFamily="2" charset="2"/>
+              </a:rPr>
+              <a:t>surface</a:t>
+            </a:r>
+            <a:r>
+              <a:rPr lang="en-GB" dirty="0" smtClean="0">
+                <a:sym typeface="Wingdings" pitchFamily="2" charset="2"/>
+              </a:rPr>
+              <a:t> </a:t>
+            </a:r>
+            <a:r>
+              <a:rPr lang="en-GB" dirty="0" err="1" smtClean="0">
+                <a:sym typeface="Wingdings" pitchFamily="2" charset="2"/>
+              </a:rPr>
+              <a:t>surface</a:t>
+            </a:r>
+            <a:endParaRPr lang="en-GB" dirty="0" smtClean="0">
+              <a:sym typeface="Wingdings" pitchFamily="2" charset="2"/>
+            </a:endParaRPr>
+          </a:p>
+          <a:p>
+            <a:pPr lvl="2"/>
+            <a:r>
+              <a:rPr lang="en-GB" dirty="0" smtClean="0">
+                <a:sym typeface="Wingdings" pitchFamily="2" charset="2"/>
+              </a:rPr>
+              <a:t>surface </a:t>
+            </a:r>
+            <a:r>
+              <a:rPr lang="en-GB" dirty="0" err="1" smtClean="0">
+                <a:sym typeface="Wingdings" pitchFamily="2" charset="2"/>
+              </a:rPr>
+              <a:t>surface</a:t>
+            </a:r>
+            <a:r>
+              <a:rPr lang="en-GB" dirty="0" smtClean="0">
+                <a:sym typeface="Wingdings" pitchFamily="2" charset="2"/>
+              </a:rPr>
+              <a:t> stem</a:t>
+            </a:r>
+          </a:p>
+          <a:p>
+            <a:pPr lvl="2"/>
+            <a:r>
+              <a:rPr lang="en-GB" dirty="0" smtClean="0">
+                <a:sym typeface="Wingdings" pitchFamily="2" charset="2"/>
+              </a:rPr>
+              <a:t>surface </a:t>
+            </a:r>
+            <a:r>
+              <a:rPr lang="en-GB" dirty="0" err="1" smtClean="0">
+                <a:sym typeface="Wingdings" pitchFamily="2" charset="2"/>
+              </a:rPr>
+              <a:t>surface</a:t>
+            </a:r>
+            <a:r>
+              <a:rPr lang="en-GB" dirty="0" smtClean="0">
+                <a:sym typeface="Wingdings" pitchFamily="2" charset="2"/>
+              </a:rPr>
+              <a:t> </a:t>
+            </a:r>
+            <a:r>
+              <a:rPr lang="en-GB" dirty="0" err="1" smtClean="0">
+                <a:sym typeface="Wingdings" pitchFamily="2" charset="2"/>
+              </a:rPr>
+              <a:t>lemma_root</a:t>
+            </a:r>
+            <a:endParaRPr lang="en-GB" dirty="0" smtClean="0">
+              <a:sym typeface="Wingdings" pitchFamily="2" charset="2"/>
+            </a:endParaRPr>
+          </a:p>
+          <a:p>
+            <a:pPr lvl="2"/>
+            <a:r>
+              <a:rPr lang="en-GB" dirty="0" smtClean="0">
+                <a:sym typeface="Wingdings" pitchFamily="2" charset="2"/>
+              </a:rPr>
+              <a:t>...</a:t>
+            </a:r>
+          </a:p>
+          <a:p>
+            <a:pPr lvl="2"/>
+            <a:r>
+              <a:rPr lang="en-GB" dirty="0" smtClean="0">
+                <a:sym typeface="Wingdings" pitchFamily="2" charset="2"/>
+              </a:rPr>
+              <a:t>surface stem </a:t>
+            </a:r>
+            <a:r>
+              <a:rPr lang="en-GB" dirty="0" err="1" smtClean="0">
+                <a:sym typeface="Wingdings" pitchFamily="2" charset="2"/>
+              </a:rPr>
+              <a:t>stem</a:t>
+            </a:r>
+            <a:endParaRPr lang="en-GB" dirty="0" smtClean="0">
+              <a:sym typeface="Wingdings" pitchFamily="2" charset="2"/>
+            </a:endParaRPr>
+          </a:p>
+          <a:p>
+            <a:pPr lvl="2"/>
+            <a:r>
+              <a:rPr lang="en-GB" dirty="0" smtClean="0">
+                <a:sym typeface="Wingdings" pitchFamily="2" charset="2"/>
+              </a:rPr>
+              <a:t>...</a:t>
+            </a:r>
+          </a:p>
+          <a:p>
+            <a:pPr lvl="1"/>
+            <a:r>
+              <a:rPr lang="en-GB" dirty="0" smtClean="0">
+                <a:sym typeface="Wingdings" pitchFamily="2" charset="2"/>
+              </a:rPr>
+              <a:t>Need to apply smoothing considering the </a:t>
+            </a:r>
+            <a:r>
+              <a:rPr lang="en-GB" dirty="0" err="1" smtClean="0">
+                <a:sym typeface="Wingdings" pitchFamily="2" charset="2"/>
+              </a:rPr>
+              <a:t>NGram</a:t>
+            </a:r>
+            <a:r>
+              <a:rPr lang="en-GB" dirty="0" smtClean="0">
+                <a:sym typeface="Wingdings" pitchFamily="2" charset="2"/>
+              </a:rPr>
+              <a:t> type for given count</a:t>
+            </a:r>
+          </a:p>
+          <a:p>
+            <a:pPr lvl="2"/>
+            <a:endParaRPr lang="en-US" dirty="0"/>
           </a:p>
         </p:txBody>
       </p:sp>
@@ -35066,13 +34701,6 @@
   <p:clrMapOvr>
     <a:masterClrMapping/>
   </p:clrMapOvr>
-  <p:timing>
-    <p:tnLst>
-      <p:par>
-        <p:cTn id="1" dur="indefinite" restart="never" nodeType="tmRoot"/>
-      </p:par>
-    </p:tnLst>
-  </p:timing>
 </p:sld>
 </file>
 
@@ -35108,13 +34736,17 @@
           <a:bodyPr/>
           <a:lstStyle/>
           <a:p>
-            <a:endParaRPr lang="en-US"/>
+            <a:r>
+              <a:rPr lang="en-GB" dirty="0" smtClean="0"/>
+              <a:t>Putting it all together</a:t>
+            </a:r>
+            <a:endParaRPr lang="en-US" dirty="0"/>
           </a:p>
         </p:txBody>
       </p:sp>
       <p:sp>
         <p:nvSpPr>
-          <p:cNvPr id="3" name="Content Placeholder 2"/>
+          <p:cNvPr id="5" name="Content Placeholder 4"/>
           <p:cNvSpPr>
             <a:spLocks noGrp="1"/>
           </p:cNvSpPr>
@@ -35122,653 +34754,604 @@
             <p:ph idx="1"/>
           </p:nvPr>
         </p:nvSpPr>
-        <p:spPr/>
+        <p:spPr>
+          <a:xfrm>
+            <a:off x="457200" y="1600200"/>
+            <a:ext cx="8229600" cy="4614882"/>
+          </a:xfrm>
+        </p:spPr>
         <p:txBody>
           <a:bodyPr>
-            <a:normAutofit fontScale="62500" lnSpcReduction="20000"/>
+            <a:noAutofit/>
           </a:bodyPr>
           <a:lstStyle/>
           <a:p>
-            <a:r>
-              <a:rPr lang="en-GB" dirty="0" smtClean="0"/>
-              <a:t>Implementation</a:t>
-            </a:r>
-          </a:p>
-          <a:p>
-            <a:pPr lvl="1"/>
-            <a:r>
-              <a:rPr lang="en-GB" dirty="0" err="1" smtClean="0"/>
-              <a:t>Mongodb</a:t>
-            </a:r>
-            <a:endParaRPr lang="en-GB" dirty="0" smtClean="0"/>
-          </a:p>
-          <a:p>
-            <a:pPr lvl="2"/>
-            <a:r>
-              <a:rPr lang="en-GB" dirty="0" smtClean="0"/>
-              <a:t>Why</a:t>
-            </a:r>
-          </a:p>
-          <a:p>
-            <a:pPr lvl="2"/>
-            <a:r>
-              <a:rPr lang="en-GB" dirty="0" smtClean="0"/>
-              <a:t>Capped collections</a:t>
-            </a:r>
-          </a:p>
-          <a:p>
-            <a:pPr lvl="2"/>
-            <a:r>
-              <a:rPr lang="en-GB" dirty="0" smtClean="0"/>
-              <a:t>Indexes</a:t>
-            </a:r>
-          </a:p>
-          <a:p>
-            <a:pPr lvl="1"/>
-            <a:r>
-              <a:rPr lang="en-GB" dirty="0" smtClean="0"/>
-              <a:t>100Gram’i bile </a:t>
-            </a:r>
-            <a:r>
-              <a:rPr lang="en-GB" dirty="0" err="1" smtClean="0"/>
-              <a:t>destekleyebilir</a:t>
-            </a:r>
-            <a:r>
-              <a:rPr lang="en-GB" dirty="0" smtClean="0"/>
-              <a:t> </a:t>
-            </a:r>
-            <a:r>
-              <a:rPr lang="en-GB" dirty="0" err="1" smtClean="0"/>
-              <a:t>kod</a:t>
-            </a:r>
-            <a:r>
-              <a:rPr lang="en-GB" dirty="0" smtClean="0"/>
-              <a:t>!</a:t>
-            </a:r>
-          </a:p>
-          <a:p>
-            <a:pPr lvl="1"/>
-            <a:r>
-              <a:rPr lang="en-GB" dirty="0" err="1" smtClean="0"/>
-              <a:t>Sadece</a:t>
-            </a:r>
-            <a:r>
-              <a:rPr lang="en-GB" dirty="0" smtClean="0"/>
-              <a:t> </a:t>
-            </a:r>
-            <a:r>
-              <a:rPr lang="en-GB" dirty="0" err="1" smtClean="0"/>
-              <a:t>bu</a:t>
-            </a:r>
-            <a:r>
-              <a:rPr lang="en-GB" dirty="0" smtClean="0"/>
-              <a:t> context </a:t>
-            </a:r>
-            <a:r>
-              <a:rPr lang="en-GB" dirty="0" err="1" smtClean="0"/>
-              <a:t>bulma</a:t>
-            </a:r>
-            <a:r>
-              <a:rPr lang="en-GB" dirty="0" smtClean="0"/>
-              <a:t> </a:t>
-            </a:r>
-            <a:r>
-              <a:rPr lang="en-GB" dirty="0" err="1" smtClean="0"/>
-              <a:t>islemi</a:t>
-            </a:r>
-            <a:r>
-              <a:rPr lang="en-GB" dirty="0" smtClean="0"/>
-              <a:t> </a:t>
-            </a:r>
-            <a:r>
-              <a:rPr lang="en-GB" dirty="0" err="1" smtClean="0"/>
-              <a:t>icin</a:t>
-            </a:r>
-            <a:r>
-              <a:rPr lang="en-GB" dirty="0" smtClean="0"/>
-              <a:t> </a:t>
-            </a:r>
-            <a:r>
-              <a:rPr lang="en-GB" dirty="0" err="1" smtClean="0"/>
-              <a:t>bir</a:t>
-            </a:r>
-            <a:r>
-              <a:rPr lang="en-GB" dirty="0" smtClean="0"/>
-              <a:t> </a:t>
-            </a:r>
-            <a:r>
-              <a:rPr lang="en-GB" dirty="0" err="1" smtClean="0"/>
-              <a:t>Ngram</a:t>
-            </a:r>
-            <a:r>
-              <a:rPr lang="en-GB" dirty="0" smtClean="0"/>
-              <a:t> collection </a:t>
-            </a:r>
-            <a:r>
-              <a:rPr lang="en-GB" dirty="0" err="1" smtClean="0"/>
-              <a:t>hazirlandi</a:t>
-            </a:r>
-            <a:r>
-              <a:rPr lang="en-GB" dirty="0" smtClean="0"/>
-              <a:t>. </a:t>
-            </a:r>
-            <a:r>
-              <a:rPr lang="en-GB" dirty="0" err="1" smtClean="0"/>
-              <a:t>Tum</a:t>
-            </a:r>
-            <a:r>
-              <a:rPr lang="en-GB" dirty="0" smtClean="0"/>
-              <a:t> morpheme container (parse result)</a:t>
-            </a:r>
-            <a:r>
-              <a:rPr lang="en-GB" dirty="0" err="1" smtClean="0"/>
-              <a:t>lari</a:t>
-            </a:r>
-            <a:r>
-              <a:rPr lang="en-GB" dirty="0" smtClean="0"/>
-              <a:t> </a:t>
-            </a:r>
-            <a:r>
-              <a:rPr lang="en-GB" dirty="0" err="1" smtClean="0"/>
-              <a:t>koymak</a:t>
-            </a:r>
-            <a:r>
-              <a:rPr lang="en-GB" dirty="0" smtClean="0"/>
-              <a:t> </a:t>
-            </a:r>
-            <a:r>
-              <a:rPr lang="en-GB" dirty="0" err="1" smtClean="0"/>
-              <a:t>yerine</a:t>
-            </a:r>
-            <a:r>
-              <a:rPr lang="en-GB" dirty="0" smtClean="0"/>
-              <a:t> </a:t>
-            </a:r>
-            <a:r>
-              <a:rPr lang="en-GB" dirty="0" smtClean="0">
+            <a:pPr>
+              <a:buNone/>
+            </a:pPr>
+            <a:r>
+              <a:rPr lang="en-GB" sz="1200" dirty="0" smtClean="0">
+                <a:latin typeface="Courier New" pitchFamily="49" charset="0"/>
+                <a:cs typeface="Courier New" pitchFamily="49" charset="0"/>
+              </a:rPr>
+              <a:t>// Returns List&lt;</a:t>
+            </a:r>
+            <a:r>
+              <a:rPr lang="en-GB" sz="1200" dirty="0" err="1" smtClean="0">
+                <a:latin typeface="Courier New" pitchFamily="49" charset="0"/>
+                <a:cs typeface="Courier New" pitchFamily="49" charset="0"/>
+              </a:rPr>
+              <a:t>ParseResult</a:t>
+            </a:r>
+            <a:r>
+              <a:rPr lang="en-GB" sz="1200" dirty="0" smtClean="0">
+                <a:latin typeface="Courier New" pitchFamily="49" charset="0"/>
+                <a:cs typeface="Courier New" pitchFamily="49" charset="0"/>
+              </a:rPr>
+              <a:t>, </a:t>
+            </a:r>
+            <a:r>
+              <a:rPr lang="en-GB" sz="1200" dirty="0" err="1" smtClean="0">
+                <a:latin typeface="Courier New" pitchFamily="49" charset="0"/>
+                <a:cs typeface="Courier New" pitchFamily="49" charset="0"/>
+              </a:rPr>
+              <a:t>CollocationLikelihoodValue</a:t>
+            </a:r>
+            <a:r>
+              <a:rPr lang="en-GB" sz="1200" dirty="0" smtClean="0">
+                <a:latin typeface="Courier New" pitchFamily="49" charset="0"/>
+                <a:cs typeface="Courier New" pitchFamily="49" charset="0"/>
+              </a:rPr>
+              <a:t>&gt;</a:t>
+            </a:r>
+          </a:p>
+          <a:p>
+            <a:pPr>
+              <a:buNone/>
+            </a:pPr>
+            <a:r>
+              <a:rPr lang="en-GB" sz="1200" dirty="0" err="1" smtClean="0">
+                <a:latin typeface="Courier New" pitchFamily="49" charset="0"/>
+                <a:cs typeface="Courier New" pitchFamily="49" charset="0"/>
+              </a:rPr>
+              <a:t>FindCollocationLikelihoods</a:t>
+            </a:r>
+            <a:r>
+              <a:rPr lang="en-GB" sz="1200" dirty="0" smtClean="0">
+                <a:latin typeface="Courier New" pitchFamily="49" charset="0"/>
+                <a:cs typeface="Courier New" pitchFamily="49" charset="0"/>
+              </a:rPr>
+              <a:t>(</a:t>
+            </a:r>
+            <a:r>
+              <a:rPr lang="en-US" sz="1200" dirty="0" smtClean="0">
+                <a:latin typeface="Courier New" pitchFamily="49" charset="0"/>
+                <a:cs typeface="Courier New" pitchFamily="49" charset="0"/>
+              </a:rPr>
+              <a:t>target word, leading context, following context</a:t>
+            </a:r>
+            <a:r>
+              <a:rPr lang="en-GB" sz="1200" dirty="0" smtClean="0">
+                <a:latin typeface="Courier New" pitchFamily="49" charset="0"/>
+                <a:cs typeface="Courier New" pitchFamily="49" charset="0"/>
+              </a:rPr>
+              <a:t>):</a:t>
+            </a:r>
+          </a:p>
+          <a:p>
+            <a:pPr>
+              <a:buNone/>
+            </a:pPr>
+            <a:r>
+              <a:rPr lang="en-US" sz="1200" dirty="0" smtClean="0">
+                <a:latin typeface="Courier New" pitchFamily="49" charset="0"/>
+                <a:cs typeface="Courier New" pitchFamily="49" charset="0"/>
+              </a:rPr>
+              <a:t>  TWPRs </a:t>
+            </a:r>
+            <a:r>
+              <a:rPr lang="en-US" sz="1200" dirty="0" smtClean="0">
+                <a:latin typeface="Courier New" pitchFamily="49" charset="0"/>
+                <a:cs typeface="Courier New" pitchFamily="49" charset="0"/>
                 <a:sym typeface="Wingdings" pitchFamily="2" charset="2"/>
               </a:rPr>
-              <a:t> </a:t>
-            </a:r>
-            <a:r>
-              <a:rPr lang="en-GB" dirty="0" err="1" smtClean="0">
+              <a:t> </a:t>
+            </a:r>
+            <a:r>
+              <a:rPr lang="en-US" sz="1200" dirty="0" smtClean="0">
+                <a:latin typeface="Courier New" pitchFamily="49" charset="0"/>
+                <a:cs typeface="Courier New" pitchFamily="49" charset="0"/>
+              </a:rPr>
+              <a:t>parse target word</a:t>
+            </a:r>
+          </a:p>
+          <a:p>
+            <a:pPr>
+              <a:buNone/>
+            </a:pPr>
+            <a:r>
+              <a:rPr lang="en-US" sz="1200" dirty="0" smtClean="0">
+                <a:latin typeface="Courier New" pitchFamily="49" charset="0"/>
+                <a:cs typeface="Courier New" pitchFamily="49" charset="0"/>
+              </a:rPr>
+              <a:t>  CPLs  </a:t>
+            </a:r>
+            <a:r>
+              <a:rPr lang="en-US" sz="1200" dirty="0" smtClean="0">
+                <a:latin typeface="Courier New" pitchFamily="49" charset="0"/>
+                <a:cs typeface="Courier New" pitchFamily="49" charset="0"/>
                 <a:sym typeface="Wingdings" pitchFamily="2" charset="2"/>
               </a:rPr>
-              <a:t>performans</a:t>
-            </a:r>
-            <a:endParaRPr lang="en-GB" dirty="0" smtClean="0">
+              <a:t> </a:t>
+            </a:r>
+            <a:r>
+              <a:rPr lang="en-US" sz="1200" dirty="0" smtClean="0">
+                <a:latin typeface="Courier New" pitchFamily="49" charset="0"/>
+                <a:cs typeface="Courier New" pitchFamily="49" charset="0"/>
+              </a:rPr>
+              <a:t>parse leading context</a:t>
+            </a:r>
+          </a:p>
+          <a:p>
+            <a:pPr>
+              <a:buNone/>
+            </a:pPr>
+            <a:r>
+              <a:rPr lang="en-US" sz="1200" dirty="0" smtClean="0">
+                <a:latin typeface="Courier New" pitchFamily="49" charset="0"/>
+                <a:cs typeface="Courier New" pitchFamily="49" charset="0"/>
+              </a:rPr>
+              <a:t>  CPFs  </a:t>
+            </a:r>
+            <a:r>
+              <a:rPr lang="en-US" sz="1200" dirty="0" smtClean="0">
+                <a:latin typeface="Courier New" pitchFamily="49" charset="0"/>
+                <a:cs typeface="Courier New" pitchFamily="49" charset="0"/>
+                <a:sym typeface="Wingdings" pitchFamily="2" charset="2"/>
+              </a:rPr>
+              <a:t> </a:t>
+            </a:r>
+            <a:r>
+              <a:rPr lang="en-US" sz="1200" dirty="0" smtClean="0">
+                <a:latin typeface="Courier New" pitchFamily="49" charset="0"/>
+                <a:cs typeface="Courier New" pitchFamily="49" charset="0"/>
+              </a:rPr>
+              <a:t>parse following context</a:t>
+            </a:r>
+          </a:p>
+          <a:p>
+            <a:pPr>
+              <a:buNone/>
+            </a:pPr>
+            <a:r>
+              <a:rPr lang="en-US" sz="1200" dirty="0" smtClean="0">
+                <a:latin typeface="Courier New" pitchFamily="49" charset="0"/>
+                <a:cs typeface="Courier New" pitchFamily="49" charset="0"/>
+              </a:rPr>
+              <a:t>  CCPL  </a:t>
+            </a:r>
+            <a:r>
+              <a:rPr lang="en-US" sz="1200" dirty="0" smtClean="0">
+                <a:latin typeface="Courier New" pitchFamily="49" charset="0"/>
+                <a:cs typeface="Courier New" pitchFamily="49" charset="0"/>
+                <a:sym typeface="Wingdings" pitchFamily="2" charset="2"/>
+              </a:rPr>
+              <a:t> </a:t>
+            </a:r>
+            <a:r>
+              <a:rPr lang="en-US" sz="1200" dirty="0" smtClean="0">
+                <a:latin typeface="Courier New" pitchFamily="49" charset="0"/>
+                <a:cs typeface="Courier New" pitchFamily="49" charset="0"/>
+              </a:rPr>
+              <a:t>create </a:t>
+            </a:r>
+            <a:r>
+              <a:rPr lang="en-US" sz="1200" dirty="0" err="1" smtClean="0">
+                <a:latin typeface="Courier New" pitchFamily="49" charset="0"/>
+                <a:cs typeface="Courier New" pitchFamily="49" charset="0"/>
+              </a:rPr>
+              <a:t>cartesian</a:t>
+            </a:r>
+            <a:r>
+              <a:rPr lang="en-US" sz="1200" dirty="0" smtClean="0">
+                <a:latin typeface="Courier New" pitchFamily="49" charset="0"/>
+                <a:cs typeface="Courier New" pitchFamily="49" charset="0"/>
+              </a:rPr>
+              <a:t> product of CPLs</a:t>
+            </a:r>
+          </a:p>
+          <a:p>
+            <a:pPr>
+              <a:buNone/>
+            </a:pPr>
+            <a:r>
+              <a:rPr lang="en-US" sz="1200" dirty="0" smtClean="0">
+                <a:latin typeface="Courier New" pitchFamily="49" charset="0"/>
+                <a:cs typeface="Courier New" pitchFamily="49" charset="0"/>
+              </a:rPr>
+              <a:t>  CCPF  </a:t>
+            </a:r>
+            <a:r>
+              <a:rPr lang="en-US" sz="1200" dirty="0" smtClean="0">
+                <a:latin typeface="Courier New" pitchFamily="49" charset="0"/>
+                <a:cs typeface="Courier New" pitchFamily="49" charset="0"/>
+                <a:sym typeface="Wingdings" pitchFamily="2" charset="2"/>
+              </a:rPr>
+              <a:t> </a:t>
+            </a:r>
+            <a:r>
+              <a:rPr lang="en-US" sz="1200" dirty="0" smtClean="0">
+                <a:latin typeface="Courier New" pitchFamily="49" charset="0"/>
+                <a:cs typeface="Courier New" pitchFamily="49" charset="0"/>
+              </a:rPr>
+              <a:t>create </a:t>
+            </a:r>
+            <a:r>
+              <a:rPr lang="en-US" sz="1200" dirty="0" err="1" smtClean="0">
+                <a:latin typeface="Courier New" pitchFamily="49" charset="0"/>
+                <a:cs typeface="Courier New" pitchFamily="49" charset="0"/>
+              </a:rPr>
+              <a:t>cartesian</a:t>
+            </a:r>
+            <a:r>
+              <a:rPr lang="en-US" sz="1200" dirty="0" smtClean="0">
+                <a:latin typeface="Courier New" pitchFamily="49" charset="0"/>
+                <a:cs typeface="Courier New" pitchFamily="49" charset="0"/>
+              </a:rPr>
+              <a:t> product of CPFs</a:t>
+            </a:r>
+          </a:p>
+          <a:p>
+            <a:pPr>
+              <a:buNone/>
+            </a:pPr>
+            <a:r>
+              <a:rPr lang="en-US" sz="1200" dirty="0" smtClean="0">
+                <a:latin typeface="Courier New" pitchFamily="49" charset="0"/>
+                <a:cs typeface="Courier New" pitchFamily="49" charset="0"/>
+              </a:rPr>
+              <a:t>  for each parse result TWPR in TWPRs:</a:t>
+            </a:r>
+          </a:p>
+          <a:p>
+            <a:pPr>
+              <a:buNone/>
+            </a:pPr>
+            <a:r>
+              <a:rPr lang="en-GB" sz="1200" dirty="0" smtClean="0">
+                <a:latin typeface="Courier New" pitchFamily="49" charset="0"/>
+                <a:cs typeface="Courier New" pitchFamily="49" charset="0"/>
+              </a:rPr>
+              <a:t>    LCTWPRCLs </a:t>
+            </a:r>
+            <a:r>
+              <a:rPr lang="en-GB" sz="1200" dirty="0" smtClean="0">
+                <a:latin typeface="Courier New" pitchFamily="49" charset="0"/>
+                <a:cs typeface="Courier New" pitchFamily="49" charset="0"/>
+                <a:sym typeface="Wingdings" pitchFamily="2" charset="2"/>
+              </a:rPr>
+              <a:t> &lt;leading </a:t>
+            </a:r>
+            <a:r>
+              <a:rPr lang="en-GB" sz="1200" dirty="0" err="1" smtClean="0">
+                <a:latin typeface="Courier New" pitchFamily="49" charset="0"/>
+                <a:cs typeface="Courier New" pitchFamily="49" charset="0"/>
+                <a:sym typeface="Wingdings" pitchFamily="2" charset="2"/>
+              </a:rPr>
+              <a:t>context,target</a:t>
+            </a:r>
+            <a:r>
+              <a:rPr lang="en-GB" sz="1200" dirty="0" smtClean="0">
+                <a:latin typeface="Courier New" pitchFamily="49" charset="0"/>
+                <a:cs typeface="Courier New" pitchFamily="49" charset="0"/>
+                <a:sym typeface="Wingdings" pitchFamily="2" charset="2"/>
+              </a:rPr>
+              <a:t> word&gt; parse results collocation likelihoods</a:t>
+            </a:r>
+          </a:p>
+          <a:p>
+            <a:pPr>
+              <a:buNone/>
+            </a:pPr>
+            <a:r>
+              <a:rPr lang="en-US" sz="1200" dirty="0" smtClean="0">
+                <a:latin typeface="Courier New" pitchFamily="49" charset="0"/>
+                <a:cs typeface="Courier New" pitchFamily="49" charset="0"/>
+              </a:rPr>
+              <a:t>      for each parse result sequence CPRS in CCPL:</a:t>
+            </a:r>
+          </a:p>
+          <a:p>
+            <a:pPr>
+              <a:buNone/>
+            </a:pPr>
+            <a:r>
+              <a:rPr lang="en-GB" sz="1200" dirty="0" smtClean="0">
+                <a:latin typeface="Courier New" pitchFamily="49" charset="0"/>
+                <a:cs typeface="Courier New" pitchFamily="49" charset="0"/>
+              </a:rPr>
+              <a:t>        LCTWPRCLs</a:t>
+            </a:r>
+            <a:r>
+              <a:rPr lang="en-GB" sz="1200" dirty="0" smtClean="0">
+                <a:latin typeface="Courier New" pitchFamily="49" charset="0"/>
+                <a:cs typeface="Courier New" pitchFamily="49" charset="0"/>
+                <a:sym typeface="Wingdings" pitchFamily="2" charset="2"/>
+              </a:rPr>
+              <a:t> += </a:t>
+            </a:r>
+            <a:r>
+              <a:rPr lang="en-GB" sz="1200" dirty="0" err="1" smtClean="0">
+                <a:latin typeface="Courier New" pitchFamily="49" charset="0"/>
+                <a:cs typeface="Courier New" pitchFamily="49" charset="0"/>
+                <a:sym typeface="Wingdings" pitchFamily="2" charset="2"/>
+              </a:rPr>
+              <a:t>FindParseResultsCollocationLikelihood</a:t>
+            </a:r>
+            <a:r>
+              <a:rPr lang="en-GB" sz="1200" dirty="0" smtClean="0">
+                <a:latin typeface="Courier New" pitchFamily="49" charset="0"/>
+                <a:cs typeface="Courier New" pitchFamily="49" charset="0"/>
+                <a:sym typeface="Wingdings" pitchFamily="2" charset="2"/>
+              </a:rPr>
+              <a:t>(CPRS, TWPR)</a:t>
+            </a:r>
+          </a:p>
+          <a:p>
+            <a:pPr>
+              <a:buNone/>
+            </a:pPr>
+            <a:r>
+              <a:rPr lang="en-GB" sz="1200" dirty="0" smtClean="0">
+                <a:latin typeface="Courier New" pitchFamily="49" charset="0"/>
+                <a:cs typeface="Courier New" pitchFamily="49" charset="0"/>
+                <a:sym typeface="Wingdings" pitchFamily="2" charset="2"/>
+              </a:rPr>
+              <a:t>    LCTWPRCLs  </a:t>
+            </a:r>
+            <a:r>
+              <a:rPr lang="en-GB" sz="1200" dirty="0" err="1" smtClean="0">
+                <a:latin typeface="Courier New" pitchFamily="49" charset="0"/>
+                <a:cs typeface="Courier New" pitchFamily="49" charset="0"/>
+                <a:sym typeface="Wingdings" pitchFamily="2" charset="2"/>
+              </a:rPr>
+              <a:t>SmoothParseResultsCollocationLikelihoods</a:t>
+            </a:r>
+            <a:r>
+              <a:rPr lang="en-GB" sz="1200" dirty="0" smtClean="0">
+                <a:latin typeface="Courier New" pitchFamily="49" charset="0"/>
+                <a:cs typeface="Courier New" pitchFamily="49" charset="0"/>
+                <a:sym typeface="Wingdings" pitchFamily="2" charset="2"/>
+              </a:rPr>
+              <a:t>(</a:t>
+            </a:r>
+            <a:r>
+              <a:rPr lang="en-GB" sz="1200" dirty="0" smtClean="0">
+                <a:latin typeface="Courier New" pitchFamily="49" charset="0"/>
+                <a:cs typeface="Courier New" pitchFamily="49" charset="0"/>
+              </a:rPr>
+              <a:t>LCTWPRCLs</a:t>
+            </a:r>
+            <a:r>
+              <a:rPr lang="en-GB" sz="1200" dirty="0" smtClean="0">
+                <a:latin typeface="Courier New" pitchFamily="49" charset="0"/>
+                <a:cs typeface="Courier New" pitchFamily="49" charset="0"/>
+                <a:sym typeface="Wingdings" pitchFamily="2" charset="2"/>
+              </a:rPr>
+              <a:t>)</a:t>
+            </a:r>
+          </a:p>
+          <a:p>
+            <a:pPr>
+              <a:buNone/>
+            </a:pPr>
+            <a:endParaRPr lang="en-GB" sz="1200" dirty="0" smtClean="0">
+              <a:latin typeface="Courier New" pitchFamily="49" charset="0"/>
+              <a:cs typeface="Courier New" pitchFamily="49" charset="0"/>
               <a:sym typeface="Wingdings" pitchFamily="2" charset="2"/>
             </a:endParaRPr>
           </a:p>
           <a:p>
-            <a:pPr lvl="1"/>
-            <a:r>
-              <a:rPr lang="en-GB" dirty="0" err="1" smtClean="0">
+            <a:pPr>
+              <a:buNone/>
+            </a:pPr>
+            <a:r>
+              <a:rPr lang="en-GB" sz="1200" dirty="0" smtClean="0">
+                <a:latin typeface="Courier New" pitchFamily="49" charset="0"/>
+                <a:cs typeface="Courier New" pitchFamily="49" charset="0"/>
                 <a:sym typeface="Wingdings" pitchFamily="2" charset="2"/>
               </a:rPr>
-              <a:t>Zaman</a:t>
-            </a:r>
-            <a:r>
-              <a:rPr lang="en-GB" dirty="0" smtClean="0">
+              <a:t>  </a:t>
+            </a:r>
+            <a:r>
+              <a:rPr lang="en-GB" sz="1200" dirty="0" smtClean="0">
+                <a:latin typeface="Courier New" pitchFamily="49" charset="0"/>
+                <a:cs typeface="Courier New" pitchFamily="49" charset="0"/>
+              </a:rPr>
+              <a:t>  FCTWPRCLs </a:t>
+            </a:r>
+            <a:r>
+              <a:rPr lang="en-GB" sz="1200" dirty="0" smtClean="0">
+                <a:latin typeface="Courier New" pitchFamily="49" charset="0"/>
+                <a:cs typeface="Courier New" pitchFamily="49" charset="0"/>
                 <a:sym typeface="Wingdings" pitchFamily="2" charset="2"/>
               </a:rPr>
-              <a:t> : 56000 </a:t>
-            </a:r>
-            <a:r>
-              <a:rPr lang="en-GB" dirty="0" err="1" smtClean="0">
+              <a:t> &lt;following </a:t>
+            </a:r>
+            <a:r>
+              <a:rPr lang="en-GB" sz="1200" dirty="0" err="1" smtClean="0">
+                <a:latin typeface="Courier New" pitchFamily="49" charset="0"/>
+                <a:cs typeface="Courier New" pitchFamily="49" charset="0"/>
                 <a:sym typeface="Wingdings" pitchFamily="2" charset="2"/>
               </a:rPr>
-              <a:t>kelime</a:t>
-            </a:r>
-            <a:r>
-              <a:rPr lang="en-GB" dirty="0" smtClean="0">
+              <a:t>context,target</a:t>
+            </a:r>
+            <a:r>
+              <a:rPr lang="en-GB" sz="1200" dirty="0" smtClean="0">
+                <a:latin typeface="Courier New" pitchFamily="49" charset="0"/>
+                <a:cs typeface="Courier New" pitchFamily="49" charset="0"/>
                 <a:sym typeface="Wingdings" pitchFamily="2" charset="2"/>
               </a:rPr>
-              <a:t> </a:t>
-            </a:r>
-            <a:r>
-              <a:rPr lang="en-GB" dirty="0" err="1" smtClean="0">
+              <a:t> word&gt; parse results collocation likelihoods</a:t>
+            </a:r>
+          </a:p>
+          <a:p>
+            <a:pPr>
+              <a:buNone/>
+            </a:pPr>
+            <a:r>
+              <a:rPr lang="en-US" sz="1200" dirty="0" smtClean="0">
+                <a:latin typeface="Courier New" pitchFamily="49" charset="0"/>
+                <a:cs typeface="Courier New" pitchFamily="49" charset="0"/>
+              </a:rPr>
+              <a:t>      for each parse result sequence CPRS in CCPF:</a:t>
+            </a:r>
+          </a:p>
+          <a:p>
+            <a:pPr>
+              <a:buNone/>
+            </a:pPr>
+            <a:r>
+              <a:rPr lang="en-US" sz="1200" dirty="0" smtClean="0">
+                <a:latin typeface="Courier New" pitchFamily="49" charset="0"/>
+                <a:cs typeface="Courier New" pitchFamily="49" charset="0"/>
+              </a:rPr>
+              <a:t>        </a:t>
+            </a:r>
+            <a:r>
+              <a:rPr lang="en-GB" sz="1200" dirty="0" smtClean="0">
+                <a:latin typeface="Courier New" pitchFamily="49" charset="0"/>
+                <a:cs typeface="Courier New" pitchFamily="49" charset="0"/>
+              </a:rPr>
+              <a:t>FCTWPRCLs </a:t>
+            </a:r>
+            <a:r>
+              <a:rPr lang="en-GB" sz="1200" dirty="0" smtClean="0">
+                <a:latin typeface="Courier New" pitchFamily="49" charset="0"/>
+                <a:cs typeface="Courier New" pitchFamily="49" charset="0"/>
                 <a:sym typeface="Wingdings" pitchFamily="2" charset="2"/>
               </a:rPr>
-              <a:t>icin</a:t>
-            </a:r>
-            <a:r>
-              <a:rPr lang="en-GB" dirty="0" smtClean="0">
+              <a:t>+= </a:t>
+            </a:r>
+            <a:r>
+              <a:rPr lang="en-GB" sz="1200" dirty="0" err="1" smtClean="0">
+                <a:latin typeface="Courier New" pitchFamily="49" charset="0"/>
+                <a:cs typeface="Courier New" pitchFamily="49" charset="0"/>
                 <a:sym typeface="Wingdings" pitchFamily="2" charset="2"/>
               </a:rPr>
-              <a:t> context </a:t>
-            </a:r>
-            <a:r>
-              <a:rPr lang="en-GB" dirty="0" err="1" smtClean="0">
+              <a:t>FindParseResultsCollocationLikelihood</a:t>
+            </a:r>
+            <a:r>
+              <a:rPr lang="en-GB" sz="1200" dirty="0" smtClean="0">
+                <a:latin typeface="Courier New" pitchFamily="49" charset="0"/>
+                <a:cs typeface="Courier New" pitchFamily="49" charset="0"/>
                 <a:sym typeface="Wingdings" pitchFamily="2" charset="2"/>
               </a:rPr>
-              <a:t>bulma</a:t>
-            </a:r>
-            <a:r>
-              <a:rPr lang="en-GB" dirty="0" smtClean="0">
+              <a:t>(TWPR, CPRS)</a:t>
+            </a:r>
+          </a:p>
+          <a:p>
+            <a:pPr>
+              <a:buNone/>
+            </a:pPr>
+            <a:r>
+              <a:rPr lang="en-GB" sz="1200" dirty="0" smtClean="0">
+                <a:latin typeface="Courier New" pitchFamily="49" charset="0"/>
+                <a:cs typeface="Courier New" pitchFamily="49" charset="0"/>
                 <a:sym typeface="Wingdings" pitchFamily="2" charset="2"/>
               </a:rPr>
-              <a:t> ne </a:t>
-            </a:r>
-            <a:r>
-              <a:rPr lang="en-GB" dirty="0" err="1" smtClean="0">
+              <a:t>    FCTWPRCLs  </a:t>
+            </a:r>
+            <a:r>
+              <a:rPr lang="en-GB" sz="1200" dirty="0" err="1" smtClean="0">
+                <a:latin typeface="Courier New" pitchFamily="49" charset="0"/>
+                <a:cs typeface="Courier New" pitchFamily="49" charset="0"/>
                 <a:sym typeface="Wingdings" pitchFamily="2" charset="2"/>
               </a:rPr>
-              <a:t>kadar</a:t>
-            </a:r>
-            <a:r>
-              <a:rPr lang="en-GB" dirty="0" smtClean="0">
+              <a:t>SmoothParseResultsCollocationLikelihoods</a:t>
+            </a:r>
+            <a:r>
+              <a:rPr lang="en-GB" sz="1200" dirty="0" smtClean="0">
+                <a:latin typeface="Courier New" pitchFamily="49" charset="0"/>
+                <a:cs typeface="Courier New" pitchFamily="49" charset="0"/>
                 <a:sym typeface="Wingdings" pitchFamily="2" charset="2"/>
               </a:rPr>
-              <a:t> </a:t>
-            </a:r>
-            <a:r>
-              <a:rPr lang="en-GB" dirty="0" err="1" smtClean="0">
+              <a:t>(</a:t>
+            </a:r>
+            <a:r>
+              <a:rPr lang="en-GB" sz="1200" dirty="0" smtClean="0">
+                <a:latin typeface="Courier New" pitchFamily="49" charset="0"/>
+                <a:cs typeface="Courier New" pitchFamily="49" charset="0"/>
+              </a:rPr>
+              <a:t>FCTWPRCLs</a:t>
+            </a:r>
+            <a:r>
+              <a:rPr lang="en-GB" sz="1200" dirty="0" smtClean="0">
+                <a:latin typeface="Courier New" pitchFamily="49" charset="0"/>
+                <a:cs typeface="Courier New" pitchFamily="49" charset="0"/>
                 <a:sym typeface="Wingdings" pitchFamily="2" charset="2"/>
               </a:rPr>
-              <a:t>zaman</a:t>
-            </a:r>
-            <a:r>
-              <a:rPr lang="en-GB" dirty="0" smtClean="0">
+              <a:t>)</a:t>
+            </a:r>
+          </a:p>
+          <a:p>
+            <a:pPr>
+              <a:buNone/>
+            </a:pPr>
+            <a:r>
+              <a:rPr lang="en-GB" sz="1200" dirty="0" smtClean="0">
+                <a:latin typeface="Courier New" pitchFamily="49" charset="0"/>
+                <a:cs typeface="Courier New" pitchFamily="49" charset="0"/>
                 <a:sym typeface="Wingdings" pitchFamily="2" charset="2"/>
               </a:rPr>
-              <a:t> </a:t>
-            </a:r>
-            <a:r>
-              <a:rPr lang="en-GB" dirty="0" err="1" smtClean="0">
+              <a:t>    </a:t>
+            </a:r>
+          </a:p>
+          <a:p>
+            <a:pPr>
+              <a:buNone/>
+            </a:pPr>
+            <a:r>
+              <a:rPr lang="en-GB" sz="1200" dirty="0" smtClean="0">
+                <a:latin typeface="Courier New" pitchFamily="49" charset="0"/>
+                <a:cs typeface="Courier New" pitchFamily="49" charset="0"/>
                 <a:sym typeface="Wingdings" pitchFamily="2" charset="2"/>
               </a:rPr>
-              <a:t>aliyor</a:t>
-            </a:r>
-            <a:r>
-              <a:rPr lang="en-GB" dirty="0" smtClean="0">
+              <a:t>  Ls += </a:t>
+            </a:r>
+            <a:r>
+              <a:rPr lang="en-GB" sz="1200" dirty="0" err="1" smtClean="0">
+                <a:latin typeface="Courier New" pitchFamily="49" charset="0"/>
+                <a:cs typeface="Courier New" pitchFamily="49" charset="0"/>
                 <a:sym typeface="Wingdings" pitchFamily="2" charset="2"/>
               </a:rPr>
-              <a:t>.</a:t>
-            </a:r>
-          </a:p>
-          <a:p>
-            <a:pPr lvl="2"/>
-            <a:r>
-              <a:rPr lang="en-GB" dirty="0" err="1" smtClean="0">
+              <a:t>WeightedSummingMergeOfContextLikelihoods</a:t>
+            </a:r>
+            <a:r>
+              <a:rPr lang="en-GB" sz="1200" dirty="0" smtClean="0">
+                <a:latin typeface="Courier New" pitchFamily="49" charset="0"/>
+                <a:cs typeface="Courier New" pitchFamily="49" charset="0"/>
                 <a:sym typeface="Wingdings" pitchFamily="2" charset="2"/>
               </a:rPr>
-              <a:t>Tek</a:t>
-            </a:r>
-            <a:r>
-              <a:rPr lang="en-GB" dirty="0" smtClean="0">
+              <a:t>(weighted sum of LCTPRCLs, weighted sum of FCTPRCLs)</a:t>
+            </a:r>
+          </a:p>
+          <a:p>
+            <a:pPr>
+              <a:buNone/>
+            </a:pPr>
+            <a:r>
+              <a:rPr lang="en-GB" sz="1200" dirty="0" smtClean="0">
+                <a:latin typeface="Courier New" pitchFamily="49" charset="0"/>
+                <a:cs typeface="Courier New" pitchFamily="49" charset="0"/>
                 <a:sym typeface="Wingdings" pitchFamily="2" charset="2"/>
               </a:rPr>
-              <a:t> </a:t>
-            </a:r>
-            <a:r>
-              <a:rPr lang="en-GB" dirty="0" err="1" smtClean="0">
-                <a:sym typeface="Wingdings" pitchFamily="2" charset="2"/>
-              </a:rPr>
-              <a:t>yonlu</a:t>
-            </a:r>
-            <a:r>
-              <a:rPr lang="en-GB" dirty="0" smtClean="0">
-                <a:sym typeface="Wingdings" pitchFamily="2" charset="2"/>
-              </a:rPr>
-              <a:t> (</a:t>
-            </a:r>
-            <a:r>
-              <a:rPr lang="en-GB" dirty="0" err="1" smtClean="0">
-                <a:sym typeface="Wingdings" pitchFamily="2" charset="2"/>
-              </a:rPr>
-              <a:t>onceki</a:t>
-            </a:r>
-            <a:r>
-              <a:rPr lang="en-GB" dirty="0" smtClean="0">
-                <a:sym typeface="Wingdings" pitchFamily="2" charset="2"/>
-              </a:rPr>
-              <a:t> </a:t>
-            </a:r>
-            <a:r>
-              <a:rPr lang="en-GB" dirty="0" err="1" smtClean="0">
-                <a:sym typeface="Wingdings" pitchFamily="2" charset="2"/>
-              </a:rPr>
-              <a:t>veya</a:t>
-            </a:r>
-            <a:r>
-              <a:rPr lang="en-GB" dirty="0" smtClean="0">
-                <a:sym typeface="Wingdings" pitchFamily="2" charset="2"/>
-              </a:rPr>
-              <a:t> </a:t>
-            </a:r>
-            <a:r>
-              <a:rPr lang="en-GB" dirty="0" err="1" smtClean="0">
-                <a:sym typeface="Wingdings" pitchFamily="2" charset="2"/>
-              </a:rPr>
-              <a:t>sonraki</a:t>
-            </a:r>
-            <a:r>
-              <a:rPr lang="en-GB" dirty="0" smtClean="0">
-                <a:sym typeface="Wingdings" pitchFamily="2" charset="2"/>
-              </a:rPr>
-              <a:t>)</a:t>
-            </a:r>
-          </a:p>
-          <a:p>
-            <a:pPr lvl="2"/>
-            <a:r>
-              <a:rPr lang="en-GB" dirty="0" err="1" smtClean="0"/>
-              <a:t>Cift</a:t>
-            </a:r>
-            <a:r>
-              <a:rPr lang="en-GB" dirty="0" smtClean="0"/>
-              <a:t> </a:t>
-            </a:r>
-            <a:r>
-              <a:rPr lang="en-GB" dirty="0" err="1" smtClean="0"/>
-              <a:t>yonlu</a:t>
-            </a:r>
-            <a:r>
-              <a:rPr lang="en-GB" dirty="0" smtClean="0"/>
-              <a:t> (</a:t>
-            </a:r>
-            <a:r>
-              <a:rPr lang="en-GB" dirty="0" err="1" smtClean="0"/>
-              <a:t>onceki</a:t>
-            </a:r>
-            <a:r>
-              <a:rPr lang="en-GB" dirty="0" smtClean="0"/>
-              <a:t> </a:t>
-            </a:r>
-            <a:r>
-              <a:rPr lang="en-GB" dirty="0" err="1" smtClean="0"/>
-              <a:t>ve</a:t>
-            </a:r>
-            <a:r>
-              <a:rPr lang="en-GB" dirty="0" smtClean="0"/>
-              <a:t> </a:t>
-            </a:r>
-            <a:r>
-              <a:rPr lang="en-GB" dirty="0" err="1" smtClean="0"/>
-              <a:t>sonraki</a:t>
-            </a:r>
-            <a:r>
-              <a:rPr lang="en-GB" dirty="0" smtClean="0"/>
-              <a:t>)</a:t>
-            </a:r>
-          </a:p>
-          <a:p>
-            <a:pPr lvl="2"/>
-            <a:r>
-              <a:rPr lang="en-GB" dirty="0" err="1" smtClean="0"/>
-              <a:t>Onceki</a:t>
-            </a:r>
-            <a:r>
-              <a:rPr lang="en-GB" dirty="0" smtClean="0"/>
-              <a:t> 1 </a:t>
-            </a:r>
-            <a:r>
-              <a:rPr lang="en-GB" dirty="0" err="1" smtClean="0"/>
-              <a:t>kelimeye</a:t>
-            </a:r>
-            <a:r>
-              <a:rPr lang="en-GB" dirty="0" smtClean="0"/>
-              <a:t> </a:t>
-            </a:r>
-            <a:r>
-              <a:rPr lang="en-GB" dirty="0" err="1" smtClean="0"/>
-              <a:t>bakinca</a:t>
-            </a:r>
-            <a:r>
-              <a:rPr lang="en-GB" dirty="0" smtClean="0"/>
-              <a:t> ne </a:t>
-            </a:r>
-            <a:r>
-              <a:rPr lang="en-GB" dirty="0" err="1" smtClean="0"/>
-              <a:t>oluyor</a:t>
-            </a:r>
-            <a:r>
-              <a:rPr lang="en-GB" dirty="0" smtClean="0"/>
-              <a:t>, </a:t>
-            </a:r>
-            <a:r>
-              <a:rPr lang="en-GB" dirty="0" err="1" smtClean="0"/>
-              <a:t>iki</a:t>
-            </a:r>
-            <a:r>
-              <a:rPr lang="en-GB" dirty="0" smtClean="0"/>
-              <a:t> </a:t>
-            </a:r>
-            <a:r>
-              <a:rPr lang="en-GB" dirty="0" err="1" smtClean="0"/>
-              <a:t>kelimeye</a:t>
-            </a:r>
-            <a:r>
-              <a:rPr lang="en-GB" dirty="0" smtClean="0"/>
-              <a:t> </a:t>
-            </a:r>
-            <a:r>
-              <a:rPr lang="en-GB" dirty="0" err="1" smtClean="0"/>
-              <a:t>bakinca</a:t>
-            </a:r>
-            <a:r>
-              <a:rPr lang="en-GB" dirty="0" smtClean="0"/>
-              <a:t> ne </a:t>
-            </a:r>
-            <a:r>
-              <a:rPr lang="en-GB" dirty="0" err="1" smtClean="0"/>
-              <a:t>oluyor</a:t>
-            </a:r>
-            <a:r>
-              <a:rPr lang="en-GB" dirty="0" smtClean="0"/>
-              <a:t> </a:t>
-            </a:r>
-            <a:r>
-              <a:rPr lang="en-GB" dirty="0" err="1" smtClean="0"/>
-              <a:t>zaman</a:t>
-            </a:r>
-            <a:r>
-              <a:rPr lang="en-GB" dirty="0" smtClean="0"/>
-              <a:t> </a:t>
-            </a:r>
-            <a:r>
-              <a:rPr lang="en-GB" dirty="0" err="1" smtClean="0"/>
-              <a:t>olarak</a:t>
-            </a:r>
-            <a:r>
-              <a:rPr lang="en-GB" dirty="0" smtClean="0"/>
-              <a:t>?</a:t>
-            </a:r>
-          </a:p>
-          <a:p>
-            <a:pPr lvl="1"/>
-            <a:r>
-              <a:rPr lang="en-GB" dirty="0" err="1" smtClean="0"/>
-              <a:t>Sadece</a:t>
-            </a:r>
-            <a:r>
-              <a:rPr lang="en-GB" dirty="0" smtClean="0"/>
-              <a:t> context </a:t>
-            </a:r>
-            <a:r>
-              <a:rPr lang="en-GB" dirty="0" err="1" smtClean="0"/>
-              <a:t>bulma</a:t>
-            </a:r>
-            <a:r>
-              <a:rPr lang="en-GB" dirty="0" smtClean="0"/>
-              <a:t> </a:t>
-            </a:r>
-            <a:r>
-              <a:rPr lang="en-GB" dirty="0" err="1" smtClean="0"/>
-              <a:t>ile</a:t>
-            </a:r>
-            <a:r>
-              <a:rPr lang="en-GB" dirty="0" smtClean="0"/>
-              <a:t> </a:t>
-            </a:r>
-            <a:r>
-              <a:rPr lang="en-GB" dirty="0" err="1" smtClean="0"/>
-              <a:t>dogru</a:t>
-            </a:r>
-            <a:r>
-              <a:rPr lang="en-GB" dirty="0" smtClean="0"/>
-              <a:t> parse result ne </a:t>
-            </a:r>
-            <a:r>
-              <a:rPr lang="en-GB" dirty="0" err="1" smtClean="0"/>
-              <a:t>kadar</a:t>
-            </a:r>
-            <a:r>
-              <a:rPr lang="en-GB" dirty="0" smtClean="0"/>
-              <a:t> </a:t>
-            </a:r>
-            <a:r>
-              <a:rPr lang="en-GB" dirty="0" err="1" smtClean="0"/>
-              <a:t>oranda</a:t>
-            </a:r>
-            <a:r>
-              <a:rPr lang="en-GB" dirty="0" smtClean="0"/>
-              <a:t> </a:t>
-            </a:r>
-            <a:r>
-              <a:rPr lang="en-GB" dirty="0" err="1" smtClean="0"/>
-              <a:t>tutturuluyor</a:t>
-            </a:r>
-            <a:r>
-              <a:rPr lang="en-GB" dirty="0" smtClean="0"/>
-              <a:t>? </a:t>
-            </a:r>
-            <a:r>
-              <a:rPr lang="en-GB" dirty="0" err="1" smtClean="0"/>
-              <a:t>Sabanci</a:t>
-            </a:r>
-            <a:r>
-              <a:rPr lang="en-GB" dirty="0" smtClean="0"/>
-              <a:t> </a:t>
-            </a:r>
-            <a:r>
-              <a:rPr lang="en-GB" dirty="0" err="1" smtClean="0"/>
-              <a:t>treebank’taki</a:t>
-            </a:r>
-            <a:r>
-              <a:rPr lang="en-GB" dirty="0" smtClean="0"/>
-              <a:t> </a:t>
-            </a:r>
-            <a:r>
-              <a:rPr lang="en-GB" dirty="0" err="1" smtClean="0"/>
-              <a:t>dogru</a:t>
-            </a:r>
-            <a:r>
-              <a:rPr lang="en-GB" dirty="0" smtClean="0"/>
-              <a:t> </a:t>
-            </a:r>
-            <a:r>
-              <a:rPr lang="en-GB" dirty="0" err="1" smtClean="0"/>
-              <a:t>sonucu</a:t>
-            </a:r>
-            <a:r>
-              <a:rPr lang="en-GB" dirty="0" smtClean="0"/>
-              <a:t> % </a:t>
-            </a:r>
-            <a:r>
-              <a:rPr lang="en-GB" dirty="0" err="1" smtClean="0"/>
-              <a:t>kac</a:t>
-            </a:r>
-            <a:r>
-              <a:rPr lang="en-GB" dirty="0" smtClean="0"/>
-              <a:t> </a:t>
-            </a:r>
-            <a:r>
-              <a:rPr lang="en-GB" dirty="0" err="1" smtClean="0"/>
-              <a:t>oraninda</a:t>
-            </a:r>
-            <a:r>
-              <a:rPr lang="en-GB" dirty="0" smtClean="0"/>
-              <a:t> </a:t>
-            </a:r>
-            <a:r>
-              <a:rPr lang="en-GB" dirty="0" err="1" smtClean="0"/>
-              <a:t>alabiliyoruz</a:t>
-            </a:r>
-            <a:r>
-              <a:rPr lang="en-GB" dirty="0" smtClean="0"/>
-              <a:t>?</a:t>
-            </a:r>
-          </a:p>
-          <a:p>
-            <a:pPr lvl="1"/>
-            <a:r>
-              <a:rPr lang="en-GB" dirty="0" smtClean="0"/>
-              <a:t>Bu </a:t>
-            </a:r>
-            <a:r>
-              <a:rPr lang="en-GB" dirty="0" err="1" smtClean="0"/>
-              <a:t>oran</a:t>
-            </a:r>
-            <a:r>
-              <a:rPr lang="en-GB" dirty="0" smtClean="0"/>
-              <a:t> </a:t>
-            </a:r>
-            <a:r>
-              <a:rPr lang="en-GB" dirty="0" err="1" smtClean="0"/>
-              <a:t>neden</a:t>
-            </a:r>
-            <a:r>
-              <a:rPr lang="en-GB" dirty="0" smtClean="0"/>
-              <a:t> </a:t>
-            </a:r>
-            <a:r>
-              <a:rPr lang="en-GB" dirty="0" err="1" smtClean="0"/>
-              <a:t>yeterli</a:t>
-            </a:r>
-            <a:r>
-              <a:rPr lang="en-GB" dirty="0" smtClean="0"/>
-              <a:t> </a:t>
-            </a:r>
-            <a:r>
-              <a:rPr lang="en-GB" dirty="0" err="1" smtClean="0"/>
-              <a:t>degil</a:t>
-            </a:r>
-            <a:r>
-              <a:rPr lang="en-GB" dirty="0" smtClean="0"/>
-              <a:t>? Ne </a:t>
-            </a:r>
-            <a:r>
-              <a:rPr lang="en-GB" dirty="0" err="1" smtClean="0"/>
-              <a:t>gibi</a:t>
-            </a:r>
-            <a:r>
-              <a:rPr lang="en-GB" dirty="0" smtClean="0"/>
-              <a:t> </a:t>
-            </a:r>
-            <a:r>
-              <a:rPr lang="en-GB" dirty="0" err="1" smtClean="0"/>
-              <a:t>degerli</a:t>
-            </a:r>
-            <a:r>
-              <a:rPr lang="en-GB" dirty="0" smtClean="0"/>
-              <a:t> </a:t>
-            </a:r>
-            <a:r>
-              <a:rPr lang="en-GB" dirty="0" err="1" smtClean="0"/>
-              <a:t>bilgileri</a:t>
-            </a:r>
-            <a:r>
-              <a:rPr lang="en-GB" dirty="0" smtClean="0"/>
-              <a:t> </a:t>
-            </a:r>
-            <a:r>
-              <a:rPr lang="en-GB" dirty="0" err="1" smtClean="0"/>
-              <a:t>kullanmiyoruz</a:t>
-            </a:r>
-            <a:r>
-              <a:rPr lang="en-GB" dirty="0" smtClean="0"/>
-              <a:t> (</a:t>
-            </a:r>
-            <a:r>
-              <a:rPr lang="en-GB" dirty="0" err="1" smtClean="0"/>
-              <a:t>henuz</a:t>
-            </a:r>
-            <a:r>
-              <a:rPr lang="en-GB" dirty="0" smtClean="0"/>
-              <a:t>)?</a:t>
-            </a:r>
+              <a:t>  return Ls</a:t>
+            </a:r>
+            <a:endParaRPr lang="en-US" sz="1200" dirty="0">
+              <a:latin typeface="Courier New" pitchFamily="49" charset="0"/>
+              <a:cs typeface="Courier New" pitchFamily="49" charset="0"/>
+            </a:endParaRPr>
           </a:p>
         </p:txBody>
       </p:sp>
@@ -35777,13 +35360,6 @@
   <p:clrMapOvr>
     <a:masterClrMapping/>
   </p:clrMapOvr>
-  <p:timing>
-    <p:tnLst>
-      <p:par>
-        <p:cTn id="1" dur="indefinite" restart="never" nodeType="tmRoot"/>
-      </p:par>
-    </p:tnLst>
-  </p:timing>
 </p:sld>
 </file>
 
@@ -35819,7 +35395,11 @@
           <a:bodyPr/>
           <a:lstStyle/>
           <a:p>
-            <a:endParaRPr lang="en-US"/>
+            <a:r>
+              <a:rPr lang="en-GB" dirty="0" smtClean="0"/>
+              <a:t>Algorithm details</a:t>
+            </a:r>
+            <a:endParaRPr lang="en-US" dirty="0"/>
           </a:p>
         </p:txBody>
       </p:sp>
@@ -35835,14 +35415,96 @@
         </p:nvSpPr>
         <p:spPr/>
         <p:txBody>
-          <a:bodyPr/>
+          <a:bodyPr>
+            <a:normAutofit fontScale="92500" lnSpcReduction="20000"/>
+          </a:bodyPr>
           <a:lstStyle/>
           <a:p>
             <a:r>
               <a:rPr lang="en-GB" dirty="0" smtClean="0"/>
-              <a:t>Big picture</a:t>
-            </a:r>
-            <a:endParaRPr lang="en-US" dirty="0"/>
+              <a:t>Many coefficients to tweak the algorithm</a:t>
+            </a:r>
+          </a:p>
+          <a:p>
+            <a:pPr lvl="1"/>
+            <a:r>
+              <a:rPr lang="en-GB" dirty="0" err="1" smtClean="0"/>
+              <a:t>WordForm</a:t>
+            </a:r>
+            <a:r>
+              <a:rPr lang="en-GB" dirty="0" smtClean="0"/>
+              <a:t> collocation weights: 6</a:t>
+            </a:r>
+          </a:p>
+          <a:p>
+            <a:pPr lvl="1"/>
+            <a:r>
+              <a:rPr lang="en-GB" dirty="0" smtClean="0"/>
+              <a:t>Leading-following context weights: 1</a:t>
+            </a:r>
+          </a:p>
+          <a:p>
+            <a:pPr lvl="1"/>
+            <a:r>
+              <a:rPr lang="en-GB" dirty="0" smtClean="0"/>
+              <a:t>Context-</a:t>
+            </a:r>
+            <a:r>
+              <a:rPr lang="en-GB" dirty="0" err="1" smtClean="0"/>
+              <a:t>targetWord</a:t>
+            </a:r>
+            <a:r>
+              <a:rPr lang="en-GB" dirty="0" smtClean="0"/>
+              <a:t> occurrence weight smoothing factor: 1</a:t>
+            </a:r>
+          </a:p>
+          <a:p>
+            <a:pPr lvl="1"/>
+            <a:r>
+              <a:rPr lang="en-GB" dirty="0" smtClean="0"/>
+              <a:t>Weighted interpolation for </a:t>
+            </a:r>
+            <a:r>
+              <a:rPr lang="en-GB" dirty="0" err="1" smtClean="0"/>
+              <a:t>Ngram</a:t>
+            </a:r>
+            <a:r>
+              <a:rPr lang="en-GB" dirty="0" smtClean="0"/>
+              <a:t> : 1+2+3 = 6</a:t>
+            </a:r>
+          </a:p>
+          <a:p>
+            <a:r>
+              <a:rPr lang="en-GB" dirty="0" smtClean="0"/>
+              <a:t>TOTAL : 14 parameters </a:t>
+            </a:r>
+            <a:r>
+              <a:rPr lang="en-GB" dirty="0" smtClean="0">
+                <a:sym typeface="Wingdings" pitchFamily="2" charset="2"/>
+              </a:rPr>
+              <a:t> Need to tweak well to make algorithm work better</a:t>
+            </a:r>
+          </a:p>
+          <a:p>
+            <a:r>
+              <a:rPr lang="en-GB" dirty="0" smtClean="0">
+                <a:sym typeface="Wingdings" pitchFamily="2" charset="2"/>
+              </a:rPr>
+              <a:t>For the moment, they’re just instinctive</a:t>
+            </a:r>
+          </a:p>
+          <a:p>
+            <a:r>
+              <a:rPr lang="en-GB" dirty="0" smtClean="0">
+                <a:sym typeface="Wingdings" pitchFamily="2" charset="2"/>
+              </a:rPr>
+              <a:t>Need to work on a big annotated corpus to make them better  However, there is no any!</a:t>
+            </a:r>
+            <a:endParaRPr lang="en-GB" dirty="0" smtClean="0"/>
+          </a:p>
+          <a:p>
+            <a:pPr lvl="1"/>
+            <a:endParaRPr lang="en-GB" dirty="0" smtClean="0"/>
           </a:p>
         </p:txBody>
       </p:sp>
@@ -35851,6 +35513,13 @@
   <p:clrMapOvr>
     <a:masterClrMapping/>
   </p:clrMapOvr>
+  <p:timing>
+    <p:tnLst>
+      <p:par>
+        <p:cTn id="1" dur="indefinite" restart="never" nodeType="tmRoot"/>
+      </p:par>
+    </p:tnLst>
+  </p:timing>
 </p:sld>
 </file>
 
@@ -35903,32 +35572,439 @@
         <p:spPr/>
         <p:txBody>
           <a:bodyPr>
-            <a:normAutofit fontScale="92500" lnSpcReduction="20000"/>
+            <a:normAutofit fontScale="62500" lnSpcReduction="20000"/>
           </a:bodyPr>
           <a:lstStyle/>
           <a:p>
             <a:r>
+              <a:rPr lang="en-GB" dirty="0" smtClean="0"/>
+              <a:t>Implementation</a:t>
+            </a:r>
+          </a:p>
+          <a:p>
+            <a:pPr lvl="1"/>
+            <a:r>
               <a:rPr lang="en-GB" dirty="0" err="1" smtClean="0"/>
-              <a:t>tscorpus</a:t>
-            </a:r>
-            <a:r>
-              <a:rPr lang="en-GB" dirty="0" smtClean="0"/>
-              <a:t> : </a:t>
+              <a:t>Mongodb</a:t>
+            </a:r>
+            <a:endParaRPr lang="en-GB" dirty="0" smtClean="0"/>
+          </a:p>
+          <a:p>
+            <a:pPr lvl="2"/>
+            <a:r>
+              <a:rPr lang="en-GB" dirty="0" smtClean="0"/>
+              <a:t>Why</a:t>
+            </a:r>
+          </a:p>
+          <a:p>
+            <a:pPr lvl="2"/>
+            <a:r>
+              <a:rPr lang="en-GB" dirty="0" smtClean="0"/>
+              <a:t>Capped collections</a:t>
+            </a:r>
+          </a:p>
+          <a:p>
+            <a:pPr lvl="2"/>
+            <a:r>
+              <a:rPr lang="en-GB" dirty="0" smtClean="0"/>
+              <a:t>Indexes</a:t>
             </a:r>
           </a:p>
           <a:p>
             <a:pPr lvl="1"/>
             <a:r>
               <a:rPr lang="en-GB" dirty="0" smtClean="0"/>
-              <a:t>“</a:t>
+              <a:t>100Gram’i bile </a:t>
             </a:r>
             <a:r>
               <a:rPr lang="en-GB" dirty="0" err="1" smtClean="0"/>
-              <a:t>Kalemini</a:t>
-            </a:r>
-            <a:r>
-              <a:rPr lang="en-GB" dirty="0" smtClean="0"/>
-              <a:t>” her </a:t>
+              <a:t>destekleyebilir</a:t>
+            </a:r>
+            <a:r>
+              <a:rPr lang="en-GB" dirty="0" smtClean="0"/>
+              <a:t> </a:t>
+            </a:r>
+            <a:r>
+              <a:rPr lang="en-GB" dirty="0" err="1" smtClean="0"/>
+              <a:t>kod</a:t>
+            </a:r>
+            <a:r>
+              <a:rPr lang="en-GB" dirty="0" smtClean="0"/>
+              <a:t>!</a:t>
+            </a:r>
+          </a:p>
+          <a:p>
+            <a:pPr lvl="1"/>
+            <a:r>
+              <a:rPr lang="en-GB" dirty="0" err="1" smtClean="0"/>
+              <a:t>Sadece</a:t>
+            </a:r>
+            <a:r>
+              <a:rPr lang="en-GB" dirty="0" smtClean="0"/>
+              <a:t> </a:t>
+            </a:r>
+            <a:r>
+              <a:rPr lang="en-GB" dirty="0" err="1" smtClean="0"/>
+              <a:t>bu</a:t>
+            </a:r>
+            <a:r>
+              <a:rPr lang="en-GB" dirty="0" smtClean="0"/>
+              <a:t> context </a:t>
+            </a:r>
+            <a:r>
+              <a:rPr lang="en-GB" dirty="0" err="1" smtClean="0"/>
+              <a:t>bulma</a:t>
+            </a:r>
+            <a:r>
+              <a:rPr lang="en-GB" dirty="0" smtClean="0"/>
+              <a:t> </a:t>
+            </a:r>
+            <a:r>
+              <a:rPr lang="en-GB" dirty="0" err="1" smtClean="0"/>
+              <a:t>islemi</a:t>
+            </a:r>
+            <a:r>
+              <a:rPr lang="en-GB" dirty="0" smtClean="0"/>
+              <a:t> </a:t>
+            </a:r>
+            <a:r>
+              <a:rPr lang="en-GB" dirty="0" err="1" smtClean="0"/>
+              <a:t>icin</a:t>
+            </a:r>
+            <a:r>
+              <a:rPr lang="en-GB" dirty="0" smtClean="0"/>
+              <a:t> </a:t>
+            </a:r>
+            <a:r>
+              <a:rPr lang="en-GB" dirty="0" err="1" smtClean="0"/>
+              <a:t>bir</a:t>
+            </a:r>
+            <a:r>
+              <a:rPr lang="en-GB" dirty="0" smtClean="0"/>
+              <a:t> </a:t>
+            </a:r>
+            <a:r>
+              <a:rPr lang="en-GB" dirty="0" err="1" smtClean="0"/>
+              <a:t>Ngram</a:t>
+            </a:r>
+            <a:r>
+              <a:rPr lang="en-GB" dirty="0" smtClean="0"/>
+              <a:t> collection </a:t>
+            </a:r>
+            <a:r>
+              <a:rPr lang="en-GB" dirty="0" err="1" smtClean="0"/>
+              <a:t>hazirlandi</a:t>
+            </a:r>
+            <a:r>
+              <a:rPr lang="en-GB" dirty="0" smtClean="0"/>
+              <a:t>. </a:t>
+            </a:r>
+            <a:r>
+              <a:rPr lang="en-GB" dirty="0" err="1" smtClean="0"/>
+              <a:t>Tum</a:t>
+            </a:r>
+            <a:r>
+              <a:rPr lang="en-GB" dirty="0" smtClean="0"/>
+              <a:t> morpheme container (parse result)</a:t>
+            </a:r>
+            <a:r>
+              <a:rPr lang="en-GB" dirty="0" err="1" smtClean="0"/>
+              <a:t>lari</a:t>
+            </a:r>
+            <a:r>
+              <a:rPr lang="en-GB" dirty="0" smtClean="0"/>
+              <a:t> </a:t>
+            </a:r>
+            <a:r>
+              <a:rPr lang="en-GB" dirty="0" err="1" smtClean="0"/>
+              <a:t>koymak</a:t>
+            </a:r>
+            <a:r>
+              <a:rPr lang="en-GB" dirty="0" smtClean="0"/>
+              <a:t> </a:t>
+            </a:r>
+            <a:r>
+              <a:rPr lang="en-GB" dirty="0" err="1" smtClean="0"/>
+              <a:t>yerine</a:t>
+            </a:r>
+            <a:r>
+              <a:rPr lang="en-GB" dirty="0" smtClean="0"/>
+              <a:t> </a:t>
+            </a:r>
+            <a:r>
+              <a:rPr lang="en-GB" dirty="0" smtClean="0">
+                <a:sym typeface="Wingdings" pitchFamily="2" charset="2"/>
+              </a:rPr>
+              <a:t> </a:t>
+            </a:r>
+            <a:r>
+              <a:rPr lang="en-GB" dirty="0" err="1" smtClean="0">
+                <a:sym typeface="Wingdings" pitchFamily="2" charset="2"/>
+              </a:rPr>
+              <a:t>performans</a:t>
+            </a:r>
+            <a:endParaRPr lang="en-GB" dirty="0" smtClean="0">
+              <a:sym typeface="Wingdings" pitchFamily="2" charset="2"/>
+            </a:endParaRPr>
+          </a:p>
+          <a:p>
+            <a:pPr lvl="1"/>
+            <a:r>
+              <a:rPr lang="en-GB" dirty="0" err="1" smtClean="0">
+                <a:sym typeface="Wingdings" pitchFamily="2" charset="2"/>
+              </a:rPr>
+              <a:t>Zaman</a:t>
+            </a:r>
+            <a:r>
+              <a:rPr lang="en-GB" dirty="0" smtClean="0">
+                <a:sym typeface="Wingdings" pitchFamily="2" charset="2"/>
+              </a:rPr>
+              <a:t> : 56000 </a:t>
+            </a:r>
+            <a:r>
+              <a:rPr lang="en-GB" dirty="0" err="1" smtClean="0">
+                <a:sym typeface="Wingdings" pitchFamily="2" charset="2"/>
+              </a:rPr>
+              <a:t>kelime</a:t>
+            </a:r>
+            <a:r>
+              <a:rPr lang="en-GB" dirty="0" smtClean="0">
+                <a:sym typeface="Wingdings" pitchFamily="2" charset="2"/>
+              </a:rPr>
+              <a:t> </a:t>
+            </a:r>
+            <a:r>
+              <a:rPr lang="en-GB" dirty="0" err="1" smtClean="0">
+                <a:sym typeface="Wingdings" pitchFamily="2" charset="2"/>
+              </a:rPr>
+              <a:t>icin</a:t>
+            </a:r>
+            <a:r>
+              <a:rPr lang="en-GB" dirty="0" smtClean="0">
+                <a:sym typeface="Wingdings" pitchFamily="2" charset="2"/>
+              </a:rPr>
+              <a:t> context </a:t>
+            </a:r>
+            <a:r>
+              <a:rPr lang="en-GB" dirty="0" err="1" smtClean="0">
+                <a:sym typeface="Wingdings" pitchFamily="2" charset="2"/>
+              </a:rPr>
+              <a:t>bulma</a:t>
+            </a:r>
+            <a:r>
+              <a:rPr lang="en-GB" dirty="0" smtClean="0">
+                <a:sym typeface="Wingdings" pitchFamily="2" charset="2"/>
+              </a:rPr>
+              <a:t> ne </a:t>
+            </a:r>
+            <a:r>
+              <a:rPr lang="en-GB" dirty="0" err="1" smtClean="0">
+                <a:sym typeface="Wingdings" pitchFamily="2" charset="2"/>
+              </a:rPr>
+              <a:t>kadar</a:t>
+            </a:r>
+            <a:r>
+              <a:rPr lang="en-GB" dirty="0" smtClean="0">
+                <a:sym typeface="Wingdings" pitchFamily="2" charset="2"/>
+              </a:rPr>
+              <a:t> </a:t>
+            </a:r>
+            <a:r>
+              <a:rPr lang="en-GB" dirty="0" err="1" smtClean="0">
+                <a:sym typeface="Wingdings" pitchFamily="2" charset="2"/>
+              </a:rPr>
+              <a:t>zaman</a:t>
+            </a:r>
+            <a:r>
+              <a:rPr lang="en-GB" dirty="0" smtClean="0">
+                <a:sym typeface="Wingdings" pitchFamily="2" charset="2"/>
+              </a:rPr>
+              <a:t> </a:t>
+            </a:r>
+            <a:r>
+              <a:rPr lang="en-GB" dirty="0" err="1" smtClean="0">
+                <a:sym typeface="Wingdings" pitchFamily="2" charset="2"/>
+              </a:rPr>
+              <a:t>aliyor</a:t>
+            </a:r>
+            <a:r>
+              <a:rPr lang="en-GB" dirty="0" smtClean="0">
+                <a:sym typeface="Wingdings" pitchFamily="2" charset="2"/>
+              </a:rPr>
+              <a:t>.</a:t>
+            </a:r>
+          </a:p>
+          <a:p>
+            <a:pPr lvl="2"/>
+            <a:r>
+              <a:rPr lang="en-GB" dirty="0" err="1" smtClean="0">
+                <a:sym typeface="Wingdings" pitchFamily="2" charset="2"/>
+              </a:rPr>
+              <a:t>Tek</a:t>
+            </a:r>
+            <a:r>
+              <a:rPr lang="en-GB" dirty="0" smtClean="0">
+                <a:sym typeface="Wingdings" pitchFamily="2" charset="2"/>
+              </a:rPr>
+              <a:t> </a:t>
+            </a:r>
+            <a:r>
+              <a:rPr lang="en-GB" dirty="0" err="1" smtClean="0">
+                <a:sym typeface="Wingdings" pitchFamily="2" charset="2"/>
+              </a:rPr>
+              <a:t>yonlu</a:t>
+            </a:r>
+            <a:r>
+              <a:rPr lang="en-GB" dirty="0" smtClean="0">
+                <a:sym typeface="Wingdings" pitchFamily="2" charset="2"/>
+              </a:rPr>
+              <a:t> (</a:t>
+            </a:r>
+            <a:r>
+              <a:rPr lang="en-GB" dirty="0" err="1" smtClean="0">
+                <a:sym typeface="Wingdings" pitchFamily="2" charset="2"/>
+              </a:rPr>
+              <a:t>onceki</a:t>
+            </a:r>
+            <a:r>
+              <a:rPr lang="en-GB" dirty="0" smtClean="0">
+                <a:sym typeface="Wingdings" pitchFamily="2" charset="2"/>
+              </a:rPr>
+              <a:t> </a:t>
+            </a:r>
+            <a:r>
+              <a:rPr lang="en-GB" dirty="0" err="1" smtClean="0">
+                <a:sym typeface="Wingdings" pitchFamily="2" charset="2"/>
+              </a:rPr>
+              <a:t>veya</a:t>
+            </a:r>
+            <a:r>
+              <a:rPr lang="en-GB" dirty="0" smtClean="0">
+                <a:sym typeface="Wingdings" pitchFamily="2" charset="2"/>
+              </a:rPr>
+              <a:t> </a:t>
+            </a:r>
+            <a:r>
+              <a:rPr lang="en-GB" dirty="0" err="1" smtClean="0">
+                <a:sym typeface="Wingdings" pitchFamily="2" charset="2"/>
+              </a:rPr>
+              <a:t>sonraki</a:t>
+            </a:r>
+            <a:r>
+              <a:rPr lang="en-GB" dirty="0" smtClean="0">
+                <a:sym typeface="Wingdings" pitchFamily="2" charset="2"/>
+              </a:rPr>
+              <a:t>)</a:t>
+            </a:r>
+          </a:p>
+          <a:p>
+            <a:pPr lvl="2"/>
+            <a:r>
+              <a:rPr lang="en-GB" dirty="0" err="1" smtClean="0"/>
+              <a:t>Cift</a:t>
+            </a:r>
+            <a:r>
+              <a:rPr lang="en-GB" dirty="0" smtClean="0"/>
+              <a:t> </a:t>
+            </a:r>
+            <a:r>
+              <a:rPr lang="en-GB" dirty="0" err="1" smtClean="0"/>
+              <a:t>yonlu</a:t>
+            </a:r>
+            <a:r>
+              <a:rPr lang="en-GB" dirty="0" smtClean="0"/>
+              <a:t> (</a:t>
+            </a:r>
+            <a:r>
+              <a:rPr lang="en-GB" dirty="0" err="1" smtClean="0"/>
+              <a:t>onceki</a:t>
+            </a:r>
+            <a:r>
+              <a:rPr lang="en-GB" dirty="0" smtClean="0"/>
+              <a:t> </a:t>
+            </a:r>
+            <a:r>
+              <a:rPr lang="en-GB" dirty="0" err="1" smtClean="0"/>
+              <a:t>ve</a:t>
+            </a:r>
+            <a:r>
+              <a:rPr lang="en-GB" dirty="0" smtClean="0"/>
+              <a:t> </a:t>
+            </a:r>
+            <a:r>
+              <a:rPr lang="en-GB" dirty="0" err="1" smtClean="0"/>
+              <a:t>sonraki</a:t>
+            </a:r>
+            <a:r>
+              <a:rPr lang="en-GB" dirty="0" smtClean="0"/>
+              <a:t>)</a:t>
+            </a:r>
+          </a:p>
+          <a:p>
+            <a:pPr lvl="2"/>
+            <a:r>
+              <a:rPr lang="en-GB" dirty="0" err="1" smtClean="0"/>
+              <a:t>Onceki</a:t>
+            </a:r>
+            <a:r>
+              <a:rPr lang="en-GB" dirty="0" smtClean="0"/>
+              <a:t> 1 </a:t>
+            </a:r>
+            <a:r>
+              <a:rPr lang="en-GB" dirty="0" err="1" smtClean="0"/>
+              <a:t>kelimeye</a:t>
+            </a:r>
+            <a:r>
+              <a:rPr lang="en-GB" dirty="0" smtClean="0"/>
+              <a:t> </a:t>
+            </a:r>
+            <a:r>
+              <a:rPr lang="en-GB" dirty="0" err="1" smtClean="0"/>
+              <a:t>bakinca</a:t>
+            </a:r>
+            <a:r>
+              <a:rPr lang="en-GB" dirty="0" smtClean="0"/>
+              <a:t> ne </a:t>
+            </a:r>
+            <a:r>
+              <a:rPr lang="en-GB" dirty="0" err="1" smtClean="0"/>
+              <a:t>oluyor</a:t>
+            </a:r>
+            <a:r>
+              <a:rPr lang="en-GB" dirty="0" smtClean="0"/>
+              <a:t>, </a:t>
+            </a:r>
+            <a:r>
+              <a:rPr lang="en-GB" dirty="0" err="1" smtClean="0"/>
+              <a:t>iki</a:t>
+            </a:r>
+            <a:r>
+              <a:rPr lang="en-GB" dirty="0" smtClean="0"/>
+              <a:t> </a:t>
+            </a:r>
+            <a:r>
+              <a:rPr lang="en-GB" dirty="0" err="1" smtClean="0"/>
+              <a:t>kelimeye</a:t>
+            </a:r>
+            <a:r>
+              <a:rPr lang="en-GB" dirty="0" smtClean="0"/>
+              <a:t> </a:t>
+            </a:r>
+            <a:r>
+              <a:rPr lang="en-GB" dirty="0" err="1" smtClean="0"/>
+              <a:t>bakinca</a:t>
+            </a:r>
+            <a:r>
+              <a:rPr lang="en-GB" dirty="0" smtClean="0"/>
+              <a:t> ne </a:t>
+            </a:r>
+            <a:r>
+              <a:rPr lang="en-GB" dirty="0" err="1" smtClean="0"/>
+              <a:t>oluyor</a:t>
+            </a:r>
+            <a:r>
+              <a:rPr lang="en-GB" dirty="0" smtClean="0"/>
+              <a:t> </a:t>
             </a:r>
             <a:r>
               <a:rPr lang="en-GB" dirty="0" err="1" smtClean="0"/>
@@ -35936,7 +36012,7 @@
             </a:r>
             <a:r>
               <a:rPr lang="en-GB" dirty="0" smtClean="0"/>
-              <a:t> p3sg </a:t>
+              <a:t> </a:t>
             </a:r>
             <a:r>
               <a:rPr lang="en-GB" dirty="0" err="1" smtClean="0"/>
@@ -35944,31 +36020,141 @@
             </a:r>
             <a:r>
               <a:rPr lang="en-GB" dirty="0" smtClean="0"/>
+              <a:t>?</a:t>
+            </a:r>
+          </a:p>
+          <a:p>
+            <a:pPr lvl="1"/>
+            <a:r>
+              <a:rPr lang="en-GB" dirty="0" err="1" smtClean="0"/>
+              <a:t>Sadece</a:t>
+            </a:r>
+            <a:r>
+              <a:rPr lang="en-GB" dirty="0" smtClean="0"/>
+              <a:t> context </a:t>
+            </a:r>
+            <a:r>
+              <a:rPr lang="en-GB" dirty="0" err="1" smtClean="0"/>
+              <a:t>bulma</a:t>
+            </a:r>
+            <a:r>
+              <a:rPr lang="en-GB" dirty="0" smtClean="0"/>
               <a:t> </a:t>
             </a:r>
             <a:r>
               <a:rPr lang="en-GB" dirty="0" err="1" smtClean="0"/>
-              <a:t>isaretlenmis</a:t>
-            </a:r>
-            <a:endParaRPr lang="en-GB" dirty="0" smtClean="0"/>
+              <a:t>ile</a:t>
+            </a:r>
+            <a:r>
+              <a:rPr lang="en-GB" dirty="0" smtClean="0"/>
+              <a:t> </a:t>
+            </a:r>
+            <a:r>
+              <a:rPr lang="en-GB" dirty="0" err="1" smtClean="0"/>
+              <a:t>dogru</a:t>
+            </a:r>
+            <a:r>
+              <a:rPr lang="en-GB" dirty="0" smtClean="0"/>
+              <a:t> parse result ne </a:t>
+            </a:r>
+            <a:r>
+              <a:rPr lang="en-GB" dirty="0" err="1" smtClean="0"/>
+              <a:t>kadar</a:t>
+            </a:r>
+            <a:r>
+              <a:rPr lang="en-GB" dirty="0" smtClean="0"/>
+              <a:t> </a:t>
+            </a:r>
+            <a:r>
+              <a:rPr lang="en-GB" dirty="0" err="1" smtClean="0"/>
+              <a:t>oranda</a:t>
+            </a:r>
+            <a:r>
+              <a:rPr lang="en-GB" dirty="0" smtClean="0"/>
+              <a:t> </a:t>
+            </a:r>
+            <a:r>
+              <a:rPr lang="en-GB" dirty="0" err="1" smtClean="0"/>
+              <a:t>tutturuluyor</a:t>
+            </a:r>
+            <a:r>
+              <a:rPr lang="en-GB" dirty="0" smtClean="0"/>
+              <a:t>? </a:t>
+            </a:r>
+            <a:r>
+              <a:rPr lang="en-GB" dirty="0" err="1" smtClean="0"/>
+              <a:t>Sabanci</a:t>
+            </a:r>
+            <a:r>
+              <a:rPr lang="en-GB" dirty="0" smtClean="0"/>
+              <a:t> </a:t>
+            </a:r>
+            <a:r>
+              <a:rPr lang="en-GB" dirty="0" err="1" smtClean="0"/>
+              <a:t>treebank’taki</a:t>
+            </a:r>
+            <a:r>
+              <a:rPr lang="en-GB" dirty="0" smtClean="0"/>
+              <a:t> </a:t>
+            </a:r>
+            <a:r>
+              <a:rPr lang="en-GB" dirty="0" err="1" smtClean="0"/>
+              <a:t>dogru</a:t>
+            </a:r>
+            <a:r>
+              <a:rPr lang="en-GB" dirty="0" smtClean="0"/>
+              <a:t> </a:t>
+            </a:r>
+            <a:r>
+              <a:rPr lang="en-GB" dirty="0" err="1" smtClean="0"/>
+              <a:t>sonucu</a:t>
+            </a:r>
+            <a:r>
+              <a:rPr lang="en-GB" dirty="0" smtClean="0"/>
+              <a:t> % </a:t>
+            </a:r>
+            <a:r>
+              <a:rPr lang="en-GB" dirty="0" err="1" smtClean="0"/>
+              <a:t>kac</a:t>
+            </a:r>
+            <a:r>
+              <a:rPr lang="en-GB" dirty="0" smtClean="0"/>
+              <a:t> </a:t>
+            </a:r>
+            <a:r>
+              <a:rPr lang="en-GB" dirty="0" err="1" smtClean="0"/>
+              <a:t>oraninda</a:t>
+            </a:r>
+            <a:r>
+              <a:rPr lang="en-GB" dirty="0" smtClean="0"/>
+              <a:t> </a:t>
+            </a:r>
+            <a:r>
+              <a:rPr lang="en-GB" dirty="0" err="1" smtClean="0"/>
+              <a:t>alabiliyoruz</a:t>
+            </a:r>
+            <a:r>
+              <a:rPr lang="en-GB" dirty="0" smtClean="0"/>
+              <a:t>?</a:t>
+            </a:r>
           </a:p>
           <a:p>
             <a:pPr lvl="1"/>
             <a:r>
               <a:rPr lang="en-GB" dirty="0" smtClean="0"/>
-              <a:t>“</a:t>
+              <a:t>Bu </a:t>
             </a:r>
             <a:r>
               <a:rPr lang="en-GB" dirty="0" err="1" smtClean="0"/>
-              <a:t>Onunla</a:t>
-            </a:r>
-            <a:r>
-              <a:rPr lang="en-GB" dirty="0" smtClean="0"/>
-              <a:t>” p2sg </a:t>
+              <a:t>oran</a:t>
+            </a:r>
+            <a:r>
+              <a:rPr lang="en-GB" dirty="0" smtClean="0"/>
+              <a:t> </a:t>
             </a:r>
             <a:r>
               <a:rPr lang="en-GB" dirty="0" err="1" smtClean="0"/>
-              <a:t>olarak</a:t>
+              <a:t>neden</a:t>
             </a:r>
             <a:r>
               <a:rPr lang="en-GB" dirty="0" smtClean="0"/>
@@ -35976,7 +36162,7 @@
             </a:r>
             <a:r>
               <a:rPr lang="en-GB" dirty="0" err="1" smtClean="0"/>
-              <a:t>isaretlenmis</a:t>
+              <a:t>yeterli</a:t>
             </a:r>
             <a:r>
               <a:rPr lang="en-GB" dirty="0" smtClean="0"/>
@@ -35984,100 +36170,11 @@
             </a:r>
             <a:r>
               <a:rPr lang="en-GB" dirty="0" err="1" smtClean="0"/>
-              <a:t>vs</a:t>
-            </a:r>
-            <a:endParaRPr lang="en-GB" dirty="0" smtClean="0"/>
-          </a:p>
-          <a:p>
-            <a:pPr lvl="1"/>
-            <a:r>
-              <a:rPr lang="en-GB" dirty="0" smtClean="0"/>
-              <a:t>491M </a:t>
-            </a:r>
-            <a:r>
-              <a:rPr lang="en-GB" dirty="0" err="1" smtClean="0"/>
-              <a:t>kelime</a:t>
-            </a:r>
-            <a:r>
-              <a:rPr lang="en-GB" dirty="0" smtClean="0"/>
-              <a:t> </a:t>
-            </a:r>
-            <a:r>
-              <a:rPr lang="en-GB" dirty="0" err="1" smtClean="0"/>
-              <a:t>var</a:t>
-            </a:r>
-            <a:r>
-              <a:rPr lang="en-GB" dirty="0" smtClean="0"/>
-              <a:t> </a:t>
-            </a:r>
-            <a:r>
-              <a:rPr lang="en-GB" dirty="0" err="1" smtClean="0"/>
-              <a:t>ama</a:t>
-            </a:r>
-            <a:r>
-              <a:rPr lang="en-GB" dirty="0" smtClean="0"/>
-              <a:t> </a:t>
-            </a:r>
-            <a:r>
-              <a:rPr lang="en-GB" dirty="0" err="1" smtClean="0"/>
-              <a:t>cok</a:t>
-            </a:r>
-            <a:r>
-              <a:rPr lang="en-GB" dirty="0" smtClean="0"/>
-              <a:t> </a:t>
-            </a:r>
-            <a:r>
-              <a:rPr lang="en-GB" dirty="0" err="1" smtClean="0"/>
-              <a:t>yanlis</a:t>
-            </a:r>
-            <a:r>
-              <a:rPr lang="en-GB" dirty="0" smtClean="0"/>
-              <a:t>!</a:t>
-            </a:r>
-          </a:p>
-          <a:p>
-            <a:pPr lvl="2"/>
-            <a:r>
-              <a:rPr lang="en-GB" dirty="0" err="1" smtClean="0"/>
-              <a:t>Gecen</a:t>
-            </a:r>
-            <a:r>
-              <a:rPr lang="en-GB" dirty="0" smtClean="0"/>
-              <a:t> :p2sg</a:t>
-            </a:r>
-          </a:p>
-          <a:p>
-            <a:pPr lvl="2"/>
-            <a:r>
-              <a:rPr lang="en-GB" dirty="0" err="1" smtClean="0"/>
-              <a:t>Turkiyenin</a:t>
-            </a:r>
-            <a:r>
-              <a:rPr lang="en-GB" dirty="0" smtClean="0"/>
-              <a:t> : p2sg+Gen</a:t>
-            </a:r>
-          </a:p>
-          <a:p>
-            <a:pPr lvl="2"/>
-            <a:r>
-              <a:rPr lang="en-GB" dirty="0" smtClean="0"/>
-              <a:t>Proper </a:t>
-            </a:r>
-            <a:r>
-              <a:rPr lang="en-GB" dirty="0" err="1" smtClean="0"/>
-              <a:t>nounlar</a:t>
-            </a:r>
-            <a:r>
-              <a:rPr lang="en-GB" dirty="0" smtClean="0"/>
-              <a:t> </a:t>
-            </a:r>
-            <a:r>
-              <a:rPr lang="en-GB" dirty="0" err="1" smtClean="0"/>
-              <a:t>yok</a:t>
-            </a:r>
-            <a:r>
-              <a:rPr lang="en-GB" dirty="0" smtClean="0"/>
-              <a:t> </a:t>
+              <a:t>degil</a:t>
+            </a:r>
+            <a:r>
+              <a:rPr lang="en-GB" dirty="0" smtClean="0"/>
+              <a:t>? Ne </a:t>
             </a:r>
             <a:r>
               <a:rPr lang="en-GB" dirty="0" err="1" smtClean="0"/>
@@ -36089,132 +36186,36 @@
             </a:r>
             <a:r>
               <a:rPr lang="en-GB" dirty="0" err="1" smtClean="0"/>
-              <a:t>bisey</a:t>
-            </a:r>
-            <a:r>
-              <a:rPr lang="en-GB" dirty="0" smtClean="0"/>
-              <a:t>!</a:t>
-            </a:r>
-          </a:p>
-          <a:p>
-            <a:r>
-              <a:rPr lang="en-GB" dirty="0" smtClean="0"/>
-              <a:t>Transformation </a:t>
+              <a:t>degerli</a:t>
+            </a:r>
+            <a:r>
+              <a:rPr lang="en-GB" dirty="0" smtClean="0"/>
+              <a:t> </a:t>
             </a:r>
             <a:r>
               <a:rPr lang="en-GB" dirty="0" err="1" smtClean="0"/>
-              <a:t>olayi</a:t>
-            </a:r>
-            <a:r>
-              <a:rPr lang="en-GB" dirty="0" smtClean="0"/>
-              <a:t>. </a:t>
+              <a:t>bilgileri</a:t>
+            </a:r>
+            <a:r>
+              <a:rPr lang="en-GB" dirty="0" smtClean="0"/>
+              <a:t> </a:t>
             </a:r>
             <a:r>
               <a:rPr lang="en-GB" dirty="0" err="1" smtClean="0"/>
-              <a:t>Corpusta</a:t>
-            </a:r>
-            <a:r>
-              <a:rPr lang="en-GB" dirty="0" smtClean="0"/>
-              <a:t> </a:t>
+              <a:t>kullanmiyoruz</a:t>
+            </a:r>
+            <a:r>
+              <a:rPr lang="en-GB" dirty="0" smtClean="0"/>
+              <a:t> (</a:t>
             </a:r>
             <a:r>
               <a:rPr lang="en-GB" dirty="0" err="1" smtClean="0"/>
-              <a:t>bir</a:t>
-            </a:r>
-            <a:r>
-              <a:rPr lang="en-GB" dirty="0" smtClean="0"/>
-              <a:t> </a:t>
-            </a:r>
-            <a:r>
-              <a:rPr lang="en-GB" dirty="0" err="1" smtClean="0"/>
-              <a:t>hata</a:t>
-            </a:r>
-            <a:r>
-              <a:rPr lang="en-GB" dirty="0" smtClean="0"/>
-              <a:t> </a:t>
-            </a:r>
-            <a:r>
-              <a:rPr lang="en-GB" dirty="0" err="1" smtClean="0"/>
-              <a:t>bulunca</a:t>
-            </a:r>
-            <a:r>
-              <a:rPr lang="en-GB" dirty="0" smtClean="0"/>
-              <a:t>, </a:t>
-            </a:r>
-            <a:r>
-              <a:rPr lang="en-GB" dirty="0" err="1" smtClean="0"/>
-              <a:t>diger</a:t>
-            </a:r>
-            <a:r>
-              <a:rPr lang="en-GB" dirty="0" smtClean="0"/>
-              <a:t> </a:t>
-            </a:r>
-            <a:r>
-              <a:rPr lang="en-GB" dirty="0" err="1" smtClean="0"/>
-              <a:t>yerlerde</a:t>
-            </a:r>
-            <a:r>
-              <a:rPr lang="en-GB" dirty="0" smtClean="0"/>
-              <a:t> de </a:t>
-            </a:r>
-            <a:r>
-              <a:rPr lang="en-GB" dirty="0" err="1" smtClean="0"/>
-              <a:t>bunu</a:t>
-            </a:r>
-            <a:r>
-              <a:rPr lang="en-GB" dirty="0" smtClean="0"/>
-              <a:t> </a:t>
-            </a:r>
-            <a:r>
-              <a:rPr lang="en-GB" dirty="0" err="1" smtClean="0"/>
-              <a:t>duzeltme</a:t>
-            </a:r>
-            <a:r>
-              <a:rPr lang="en-GB" dirty="0" smtClean="0"/>
-              <a:t>! </a:t>
-            </a:r>
-            <a:r>
-              <a:rPr lang="en-GB" dirty="0" err="1" smtClean="0"/>
-              <a:t>Otomatik</a:t>
-            </a:r>
-            <a:r>
-              <a:rPr lang="en-GB" dirty="0" smtClean="0"/>
-              <a:t> </a:t>
-            </a:r>
-            <a:r>
-              <a:rPr lang="en-GB" dirty="0" err="1" smtClean="0"/>
-              <a:t>veya</a:t>
-            </a:r>
-            <a:r>
-              <a:rPr lang="en-GB" dirty="0" smtClean="0"/>
-              <a:t> supervised!</a:t>
-            </a:r>
-          </a:p>
-          <a:p>
-            <a:pPr marL="342900" lvl="1" indent="-342900">
-              <a:buFont typeface="Arial"/>
-              <a:buChar char="•"/>
-            </a:pPr>
-            <a:r>
-              <a:rPr lang="en-GB" dirty="0" smtClean="0"/>
-              <a:t>Terimler.docx </a:t>
-            </a:r>
-            <a:r>
-              <a:rPr lang="en-GB" dirty="0" err="1" smtClean="0"/>
-              <a:t>dosyasina</a:t>
-            </a:r>
-            <a:r>
-              <a:rPr lang="en-GB" dirty="0" smtClean="0"/>
-              <a:t> </a:t>
-            </a:r>
-            <a:r>
-              <a:rPr lang="en-GB" dirty="0" err="1" smtClean="0"/>
-              <a:t>bak</a:t>
-            </a:r>
-            <a:endParaRPr lang="en-GB" dirty="0" smtClean="0"/>
-          </a:p>
-          <a:p>
-            <a:endParaRPr lang="en-US" dirty="0"/>
+              <a:t>henuz</a:t>
+            </a:r>
+            <a:r>
+              <a:rPr lang="en-GB" dirty="0" smtClean="0"/>
+              <a:t>)?</a:t>
+            </a:r>
           </a:p>
         </p:txBody>
       </p:sp>
@@ -36223,6 +36224,13 @@
   <p:clrMapOvr>
     <a:masterClrMapping/>
   </p:clrMapOvr>
+  <p:timing>
+    <p:tnLst>
+      <p:par>
+        <p:cTn id="1" dur="indefinite" restart="never" nodeType="tmRoot"/>
+      </p:par>
+    </p:tnLst>
+  </p:timing>
 </p:sld>
 </file>
 
@@ -36279,204 +36287,8 @@
           <a:p>
             <a:r>
               <a:rPr lang="en-GB" dirty="0" smtClean="0"/>
-              <a:t>Advanced topics</a:t>
-            </a:r>
-          </a:p>
-          <a:p>
-            <a:pPr lvl="1"/>
-            <a:r>
-              <a:rPr lang="en-GB" dirty="0" smtClean="0"/>
-              <a:t>Proper noun detection : Proper noun </a:t>
-            </a:r>
-            <a:r>
-              <a:rPr lang="en-GB" dirty="0" err="1" smtClean="0"/>
-              <a:t>olarak</a:t>
-            </a:r>
-            <a:r>
-              <a:rPr lang="en-GB" dirty="0" smtClean="0"/>
-              <a:t> </a:t>
-            </a:r>
-            <a:r>
-              <a:rPr lang="en-GB" dirty="0" err="1" smtClean="0"/>
-              <a:t>daha</a:t>
-            </a:r>
-            <a:r>
-              <a:rPr lang="en-GB" dirty="0" smtClean="0"/>
-              <a:t> once </a:t>
-            </a:r>
-            <a:r>
-              <a:rPr lang="en-GB" dirty="0" err="1" smtClean="0"/>
-              <a:t>kullanilmis</a:t>
-            </a:r>
-            <a:r>
-              <a:rPr lang="en-GB" dirty="0" smtClean="0"/>
-              <a:t> mi? </a:t>
-            </a:r>
-            <a:r>
-              <a:rPr lang="en-GB" dirty="0" err="1" smtClean="0"/>
-              <a:t>Ya</a:t>
-            </a:r>
-            <a:r>
-              <a:rPr lang="en-GB" dirty="0" smtClean="0"/>
-              <a:t> </a:t>
-            </a:r>
-            <a:r>
-              <a:rPr lang="en-GB" dirty="0" err="1" smtClean="0"/>
-              <a:t>da</a:t>
-            </a:r>
-            <a:r>
-              <a:rPr lang="en-GB" dirty="0" smtClean="0"/>
-              <a:t> annotated </a:t>
-            </a:r>
-            <a:r>
-              <a:rPr lang="en-GB" dirty="0" err="1" smtClean="0"/>
-              <a:t>olmayan</a:t>
-            </a:r>
-            <a:r>
-              <a:rPr lang="en-GB" dirty="0" smtClean="0"/>
-              <a:t> </a:t>
-            </a:r>
-            <a:r>
-              <a:rPr lang="en-GB" dirty="0" err="1" smtClean="0"/>
-              <a:t>bir</a:t>
-            </a:r>
-            <a:r>
-              <a:rPr lang="en-GB" dirty="0" smtClean="0"/>
-              <a:t> </a:t>
-            </a:r>
-            <a:r>
-              <a:rPr lang="en-GB" dirty="0" err="1" smtClean="0"/>
-              <a:t>textte</a:t>
-            </a:r>
-            <a:r>
-              <a:rPr lang="en-GB" dirty="0" smtClean="0"/>
-              <a:t>, hic </a:t>
-            </a:r>
-            <a:r>
-              <a:rPr lang="en-GB" dirty="0" err="1" smtClean="0"/>
-              <a:t>cumle</a:t>
-            </a:r>
-            <a:r>
-              <a:rPr lang="en-GB" dirty="0" smtClean="0"/>
-              <a:t> </a:t>
-            </a:r>
-            <a:r>
-              <a:rPr lang="en-GB" dirty="0" err="1" smtClean="0"/>
-              <a:t>ortasinda</a:t>
-            </a:r>
-            <a:r>
-              <a:rPr lang="en-GB" dirty="0" smtClean="0"/>
-              <a:t> </a:t>
-            </a:r>
-            <a:r>
-              <a:rPr lang="en-GB" dirty="0" err="1" smtClean="0"/>
-              <a:t>buyuk</a:t>
-            </a:r>
-            <a:r>
-              <a:rPr lang="en-GB" dirty="0" smtClean="0"/>
-              <a:t> </a:t>
-            </a:r>
-            <a:r>
-              <a:rPr lang="en-GB" dirty="0" err="1" smtClean="0"/>
-              <a:t>harfle</a:t>
-            </a:r>
-            <a:r>
-              <a:rPr lang="en-GB" dirty="0" smtClean="0"/>
-              <a:t> </a:t>
-            </a:r>
-            <a:r>
-              <a:rPr lang="en-GB" dirty="0" err="1" smtClean="0"/>
-              <a:t>baslatilmis</a:t>
-            </a:r>
-            <a:r>
-              <a:rPr lang="en-GB" dirty="0" smtClean="0"/>
-              <a:t> mi? </a:t>
-            </a:r>
-            <a:r>
-              <a:rPr lang="en-GB" dirty="0" err="1" smtClean="0"/>
-              <a:t>Veya</a:t>
-            </a:r>
-            <a:r>
-              <a:rPr lang="en-GB" dirty="0" smtClean="0"/>
-              <a:t> hic </a:t>
-            </a:r>
-            <a:r>
-              <a:rPr lang="en-GB" dirty="0" err="1" smtClean="0"/>
-              <a:t>kesme</a:t>
-            </a:r>
-            <a:r>
-              <a:rPr lang="en-GB" dirty="0" smtClean="0"/>
-              <a:t> </a:t>
-            </a:r>
-            <a:r>
-              <a:rPr lang="en-GB" dirty="0" err="1" smtClean="0"/>
-              <a:t>ile</a:t>
-            </a:r>
-            <a:r>
-              <a:rPr lang="en-GB" dirty="0" smtClean="0"/>
-              <a:t> </a:t>
-            </a:r>
-            <a:r>
-              <a:rPr lang="en-GB" dirty="0" err="1" smtClean="0"/>
-              <a:t>ayrilmis</a:t>
-            </a:r>
-            <a:r>
-              <a:rPr lang="en-GB" dirty="0" smtClean="0"/>
-              <a:t> mi?</a:t>
-            </a:r>
-          </a:p>
-          <a:p>
-            <a:pPr lvl="1"/>
-            <a:r>
-              <a:rPr lang="en-GB" dirty="0" smtClean="0"/>
-              <a:t>Pronoun resolution: “</a:t>
-            </a:r>
-            <a:r>
-              <a:rPr lang="en-GB" dirty="0" err="1" smtClean="0"/>
-              <a:t>Onu</a:t>
-            </a:r>
-            <a:r>
-              <a:rPr lang="en-GB" dirty="0" smtClean="0"/>
-              <a:t> </a:t>
-            </a:r>
-            <a:r>
-              <a:rPr lang="en-GB" dirty="0" err="1" smtClean="0"/>
-              <a:t>bana</a:t>
-            </a:r>
-            <a:r>
-              <a:rPr lang="en-GB" dirty="0" smtClean="0"/>
-              <a:t> </a:t>
-            </a:r>
-            <a:r>
-              <a:rPr lang="en-GB" dirty="0" err="1" smtClean="0"/>
-              <a:t>verdi</a:t>
-            </a:r>
-            <a:r>
-              <a:rPr lang="en-GB" dirty="0" smtClean="0"/>
-              <a:t>” </a:t>
-            </a:r>
-            <a:r>
-              <a:rPr lang="en-GB" dirty="0" smtClean="0">
-                <a:sym typeface="Wingdings" pitchFamily="2" charset="2"/>
-              </a:rPr>
-              <a:t> “o” </a:t>
-            </a:r>
-            <a:r>
-              <a:rPr lang="en-GB" dirty="0" err="1" smtClean="0">
-                <a:sym typeface="Wingdings" pitchFamily="2" charset="2"/>
-              </a:rPr>
-              <a:t>kim</a:t>
-            </a:r>
-            <a:r>
-              <a:rPr lang="en-GB" dirty="0" smtClean="0">
-                <a:sym typeface="Wingdings" pitchFamily="2" charset="2"/>
-              </a:rPr>
-              <a:t>?</a:t>
-            </a:r>
-            <a:endParaRPr lang="en-GB" dirty="0" smtClean="0"/>
-          </a:p>
-          <a:p>
-            <a:pPr lvl="1"/>
+              <a:t>Big picture</a:t>
+            </a:r>
             <a:endParaRPr lang="en-US" dirty="0"/>
           </a:p>
         </p:txBody>
@@ -36943,6 +36755,641 @@
 </file>
 
 <file path=ppt/slides/slide60.xml><?xml version="1.0" encoding="utf-8"?>
+<p:sld xmlns:a="http://schemas.openxmlformats.org/drawingml/2006/main" xmlns:r="http://schemas.openxmlformats.org/officeDocument/2006/relationships" xmlns:p="http://schemas.openxmlformats.org/presentationml/2006/main">
+  <p:cSld>
+    <p:spTree>
+      <p:nvGrpSpPr>
+        <p:cNvPr id="1" name=""/>
+        <p:cNvGrpSpPr/>
+        <p:nvPr/>
+      </p:nvGrpSpPr>
+      <p:grpSpPr>
+        <a:xfrm>
+          <a:off x="0" y="0"/>
+          <a:ext cx="0" cy="0"/>
+          <a:chOff x="0" y="0"/>
+          <a:chExt cx="0" cy="0"/>
+        </a:xfrm>
+      </p:grpSpPr>
+      <p:sp>
+        <p:nvSpPr>
+          <p:cNvPr id="2" name="Title 1"/>
+          <p:cNvSpPr>
+            <a:spLocks noGrp="1"/>
+          </p:cNvSpPr>
+          <p:nvPr>
+            <p:ph type="title"/>
+          </p:nvPr>
+        </p:nvSpPr>
+        <p:spPr/>
+        <p:txBody>
+          <a:bodyPr/>
+          <a:lstStyle/>
+          <a:p>
+            <a:endParaRPr lang="en-US"/>
+          </a:p>
+        </p:txBody>
+      </p:sp>
+      <p:sp>
+        <p:nvSpPr>
+          <p:cNvPr id="3" name="Content Placeholder 2"/>
+          <p:cNvSpPr>
+            <a:spLocks noGrp="1"/>
+          </p:cNvSpPr>
+          <p:nvPr>
+            <p:ph idx="1"/>
+          </p:nvPr>
+        </p:nvSpPr>
+        <p:spPr/>
+        <p:txBody>
+          <a:bodyPr>
+            <a:normAutofit fontScale="92500" lnSpcReduction="20000"/>
+          </a:bodyPr>
+          <a:lstStyle/>
+          <a:p>
+            <a:r>
+              <a:rPr lang="en-GB" dirty="0" err="1" smtClean="0"/>
+              <a:t>tscorpus</a:t>
+            </a:r>
+            <a:r>
+              <a:rPr lang="en-GB" dirty="0" smtClean="0"/>
+              <a:t> : </a:t>
+            </a:r>
+          </a:p>
+          <a:p>
+            <a:pPr lvl="1"/>
+            <a:r>
+              <a:rPr lang="en-GB" dirty="0" smtClean="0"/>
+              <a:t>“</a:t>
+            </a:r>
+            <a:r>
+              <a:rPr lang="en-GB" dirty="0" err="1" smtClean="0"/>
+              <a:t>Kalemini</a:t>
+            </a:r>
+            <a:r>
+              <a:rPr lang="en-GB" dirty="0" smtClean="0"/>
+              <a:t>” her </a:t>
+            </a:r>
+            <a:r>
+              <a:rPr lang="en-GB" dirty="0" err="1" smtClean="0"/>
+              <a:t>zaman</a:t>
+            </a:r>
+            <a:r>
+              <a:rPr lang="en-GB" dirty="0" smtClean="0"/>
+              <a:t> p3sg </a:t>
+            </a:r>
+            <a:r>
+              <a:rPr lang="en-GB" dirty="0" err="1" smtClean="0"/>
+              <a:t>olarak</a:t>
+            </a:r>
+            <a:r>
+              <a:rPr lang="en-GB" dirty="0" smtClean="0"/>
+              <a:t> </a:t>
+            </a:r>
+            <a:r>
+              <a:rPr lang="en-GB" dirty="0" err="1" smtClean="0"/>
+              <a:t>isaretlenmis</a:t>
+            </a:r>
+            <a:endParaRPr lang="en-GB" dirty="0" smtClean="0"/>
+          </a:p>
+          <a:p>
+            <a:pPr lvl="1"/>
+            <a:r>
+              <a:rPr lang="en-GB" dirty="0" smtClean="0"/>
+              <a:t>“</a:t>
+            </a:r>
+            <a:r>
+              <a:rPr lang="en-GB" dirty="0" err="1" smtClean="0"/>
+              <a:t>Onunla</a:t>
+            </a:r>
+            <a:r>
+              <a:rPr lang="en-GB" dirty="0" smtClean="0"/>
+              <a:t>” p2sg </a:t>
+            </a:r>
+            <a:r>
+              <a:rPr lang="en-GB" dirty="0" err="1" smtClean="0"/>
+              <a:t>olarak</a:t>
+            </a:r>
+            <a:r>
+              <a:rPr lang="en-GB" dirty="0" smtClean="0"/>
+              <a:t> </a:t>
+            </a:r>
+            <a:r>
+              <a:rPr lang="en-GB" dirty="0" err="1" smtClean="0"/>
+              <a:t>isaretlenmis</a:t>
+            </a:r>
+            <a:r>
+              <a:rPr lang="en-GB" dirty="0" smtClean="0"/>
+              <a:t> </a:t>
+            </a:r>
+            <a:r>
+              <a:rPr lang="en-GB" dirty="0" err="1" smtClean="0"/>
+              <a:t>vs</a:t>
+            </a:r>
+            <a:endParaRPr lang="en-GB" dirty="0" smtClean="0"/>
+          </a:p>
+          <a:p>
+            <a:pPr lvl="1"/>
+            <a:r>
+              <a:rPr lang="en-GB" dirty="0" smtClean="0"/>
+              <a:t>491M </a:t>
+            </a:r>
+            <a:r>
+              <a:rPr lang="en-GB" dirty="0" err="1" smtClean="0"/>
+              <a:t>kelime</a:t>
+            </a:r>
+            <a:r>
+              <a:rPr lang="en-GB" dirty="0" smtClean="0"/>
+              <a:t> </a:t>
+            </a:r>
+            <a:r>
+              <a:rPr lang="en-GB" dirty="0" err="1" smtClean="0"/>
+              <a:t>var</a:t>
+            </a:r>
+            <a:r>
+              <a:rPr lang="en-GB" dirty="0" smtClean="0"/>
+              <a:t> </a:t>
+            </a:r>
+            <a:r>
+              <a:rPr lang="en-GB" dirty="0" err="1" smtClean="0"/>
+              <a:t>ama</a:t>
+            </a:r>
+            <a:r>
+              <a:rPr lang="en-GB" dirty="0" smtClean="0"/>
+              <a:t> </a:t>
+            </a:r>
+            <a:r>
+              <a:rPr lang="en-GB" dirty="0" err="1" smtClean="0"/>
+              <a:t>cok</a:t>
+            </a:r>
+            <a:r>
+              <a:rPr lang="en-GB" dirty="0" smtClean="0"/>
+              <a:t> </a:t>
+            </a:r>
+            <a:r>
+              <a:rPr lang="en-GB" dirty="0" err="1" smtClean="0"/>
+              <a:t>yanlis</a:t>
+            </a:r>
+            <a:r>
+              <a:rPr lang="en-GB" dirty="0" smtClean="0"/>
+              <a:t>!</a:t>
+            </a:r>
+          </a:p>
+          <a:p>
+            <a:pPr lvl="2"/>
+            <a:r>
+              <a:rPr lang="en-GB" dirty="0" err="1" smtClean="0"/>
+              <a:t>Gecen</a:t>
+            </a:r>
+            <a:r>
+              <a:rPr lang="en-GB" dirty="0" smtClean="0"/>
+              <a:t> :p2sg</a:t>
+            </a:r>
+          </a:p>
+          <a:p>
+            <a:pPr lvl="2"/>
+            <a:r>
+              <a:rPr lang="en-GB" dirty="0" err="1" smtClean="0"/>
+              <a:t>Turkiyenin</a:t>
+            </a:r>
+            <a:r>
+              <a:rPr lang="en-GB" dirty="0" smtClean="0"/>
+              <a:t> : p2sg+Gen</a:t>
+            </a:r>
+          </a:p>
+          <a:p>
+            <a:pPr lvl="2"/>
+            <a:r>
+              <a:rPr lang="en-GB" dirty="0" smtClean="0"/>
+              <a:t>Proper </a:t>
+            </a:r>
+            <a:r>
+              <a:rPr lang="en-GB" dirty="0" err="1" smtClean="0"/>
+              <a:t>nounlar</a:t>
+            </a:r>
+            <a:r>
+              <a:rPr lang="en-GB" dirty="0" smtClean="0"/>
+              <a:t> </a:t>
+            </a:r>
+            <a:r>
+              <a:rPr lang="en-GB" dirty="0" err="1" smtClean="0"/>
+              <a:t>yok</a:t>
+            </a:r>
+            <a:r>
+              <a:rPr lang="en-GB" dirty="0" smtClean="0"/>
+              <a:t> </a:t>
+            </a:r>
+            <a:r>
+              <a:rPr lang="en-GB" dirty="0" err="1" smtClean="0"/>
+              <a:t>gibi</a:t>
+            </a:r>
+            <a:r>
+              <a:rPr lang="en-GB" dirty="0" smtClean="0"/>
+              <a:t> </a:t>
+            </a:r>
+            <a:r>
+              <a:rPr lang="en-GB" dirty="0" err="1" smtClean="0"/>
+              <a:t>bisey</a:t>
+            </a:r>
+            <a:r>
+              <a:rPr lang="en-GB" dirty="0" smtClean="0"/>
+              <a:t>!</a:t>
+            </a:r>
+          </a:p>
+          <a:p>
+            <a:r>
+              <a:rPr lang="en-GB" dirty="0" smtClean="0"/>
+              <a:t>Transformation </a:t>
+            </a:r>
+            <a:r>
+              <a:rPr lang="en-GB" dirty="0" err="1" smtClean="0"/>
+              <a:t>olayi</a:t>
+            </a:r>
+            <a:r>
+              <a:rPr lang="en-GB" dirty="0" smtClean="0"/>
+              <a:t>. </a:t>
+            </a:r>
+            <a:r>
+              <a:rPr lang="en-GB" dirty="0" err="1" smtClean="0"/>
+              <a:t>Corpusta</a:t>
+            </a:r>
+            <a:r>
+              <a:rPr lang="en-GB" dirty="0" smtClean="0"/>
+              <a:t> </a:t>
+            </a:r>
+            <a:r>
+              <a:rPr lang="en-GB" dirty="0" err="1" smtClean="0"/>
+              <a:t>bir</a:t>
+            </a:r>
+            <a:r>
+              <a:rPr lang="en-GB" dirty="0" smtClean="0"/>
+              <a:t> </a:t>
+            </a:r>
+            <a:r>
+              <a:rPr lang="en-GB" dirty="0" err="1" smtClean="0"/>
+              <a:t>hata</a:t>
+            </a:r>
+            <a:r>
+              <a:rPr lang="en-GB" dirty="0" smtClean="0"/>
+              <a:t> </a:t>
+            </a:r>
+            <a:r>
+              <a:rPr lang="en-GB" dirty="0" err="1" smtClean="0"/>
+              <a:t>bulunca</a:t>
+            </a:r>
+            <a:r>
+              <a:rPr lang="en-GB" dirty="0" smtClean="0"/>
+              <a:t>, </a:t>
+            </a:r>
+            <a:r>
+              <a:rPr lang="en-GB" dirty="0" err="1" smtClean="0"/>
+              <a:t>diger</a:t>
+            </a:r>
+            <a:r>
+              <a:rPr lang="en-GB" dirty="0" smtClean="0"/>
+              <a:t> </a:t>
+            </a:r>
+            <a:r>
+              <a:rPr lang="en-GB" dirty="0" err="1" smtClean="0"/>
+              <a:t>yerlerde</a:t>
+            </a:r>
+            <a:r>
+              <a:rPr lang="en-GB" dirty="0" smtClean="0"/>
+              <a:t> de </a:t>
+            </a:r>
+            <a:r>
+              <a:rPr lang="en-GB" dirty="0" err="1" smtClean="0"/>
+              <a:t>bunu</a:t>
+            </a:r>
+            <a:r>
+              <a:rPr lang="en-GB" dirty="0" smtClean="0"/>
+              <a:t> </a:t>
+            </a:r>
+            <a:r>
+              <a:rPr lang="en-GB" dirty="0" err="1" smtClean="0"/>
+              <a:t>duzeltme</a:t>
+            </a:r>
+            <a:r>
+              <a:rPr lang="en-GB" dirty="0" smtClean="0"/>
+              <a:t>! </a:t>
+            </a:r>
+            <a:r>
+              <a:rPr lang="en-GB" dirty="0" err="1" smtClean="0"/>
+              <a:t>Otomatik</a:t>
+            </a:r>
+            <a:r>
+              <a:rPr lang="en-GB" dirty="0" smtClean="0"/>
+              <a:t> </a:t>
+            </a:r>
+            <a:r>
+              <a:rPr lang="en-GB" dirty="0" err="1" smtClean="0"/>
+              <a:t>veya</a:t>
+            </a:r>
+            <a:r>
+              <a:rPr lang="en-GB" dirty="0" smtClean="0"/>
+              <a:t> supervised!</a:t>
+            </a:r>
+          </a:p>
+          <a:p>
+            <a:pPr marL="342900" lvl="1" indent="-342900">
+              <a:buFont typeface="Arial"/>
+              <a:buChar char="•"/>
+            </a:pPr>
+            <a:r>
+              <a:rPr lang="en-GB" dirty="0" smtClean="0"/>
+              <a:t>Terimler.docx </a:t>
+            </a:r>
+            <a:r>
+              <a:rPr lang="en-GB" dirty="0" err="1" smtClean="0"/>
+              <a:t>dosyasina</a:t>
+            </a:r>
+            <a:r>
+              <a:rPr lang="en-GB" dirty="0" smtClean="0"/>
+              <a:t> </a:t>
+            </a:r>
+            <a:r>
+              <a:rPr lang="en-GB" dirty="0" err="1" smtClean="0"/>
+              <a:t>bak</a:t>
+            </a:r>
+            <a:endParaRPr lang="en-GB" dirty="0" smtClean="0"/>
+          </a:p>
+          <a:p>
+            <a:endParaRPr lang="en-US" dirty="0"/>
+          </a:p>
+        </p:txBody>
+      </p:sp>
+    </p:spTree>
+  </p:cSld>
+  <p:clrMapOvr>
+    <a:masterClrMapping/>
+  </p:clrMapOvr>
+</p:sld>
+</file>
+
+<file path=ppt/slides/slide61.xml><?xml version="1.0" encoding="utf-8"?>
+<p:sld xmlns:a="http://schemas.openxmlformats.org/drawingml/2006/main" xmlns:r="http://schemas.openxmlformats.org/officeDocument/2006/relationships" xmlns:p="http://schemas.openxmlformats.org/presentationml/2006/main">
+  <p:cSld>
+    <p:spTree>
+      <p:nvGrpSpPr>
+        <p:cNvPr id="1" name=""/>
+        <p:cNvGrpSpPr/>
+        <p:nvPr/>
+      </p:nvGrpSpPr>
+      <p:grpSpPr>
+        <a:xfrm>
+          <a:off x="0" y="0"/>
+          <a:ext cx="0" cy="0"/>
+          <a:chOff x="0" y="0"/>
+          <a:chExt cx="0" cy="0"/>
+        </a:xfrm>
+      </p:grpSpPr>
+      <p:sp>
+        <p:nvSpPr>
+          <p:cNvPr id="2" name="Title 1"/>
+          <p:cNvSpPr>
+            <a:spLocks noGrp="1"/>
+          </p:cNvSpPr>
+          <p:nvPr>
+            <p:ph type="title"/>
+          </p:nvPr>
+        </p:nvSpPr>
+        <p:spPr/>
+        <p:txBody>
+          <a:bodyPr/>
+          <a:lstStyle/>
+          <a:p>
+            <a:endParaRPr lang="en-US"/>
+          </a:p>
+        </p:txBody>
+      </p:sp>
+      <p:sp>
+        <p:nvSpPr>
+          <p:cNvPr id="3" name="Content Placeholder 2"/>
+          <p:cNvSpPr>
+            <a:spLocks noGrp="1"/>
+          </p:cNvSpPr>
+          <p:nvPr>
+            <p:ph idx="1"/>
+          </p:nvPr>
+        </p:nvSpPr>
+        <p:spPr/>
+        <p:txBody>
+          <a:bodyPr/>
+          <a:lstStyle/>
+          <a:p>
+            <a:r>
+              <a:rPr lang="en-GB" dirty="0" smtClean="0"/>
+              <a:t>Advanced topics</a:t>
+            </a:r>
+          </a:p>
+          <a:p>
+            <a:pPr lvl="1"/>
+            <a:r>
+              <a:rPr lang="en-GB" dirty="0" smtClean="0"/>
+              <a:t>Proper noun detection : Proper noun </a:t>
+            </a:r>
+            <a:r>
+              <a:rPr lang="en-GB" dirty="0" err="1" smtClean="0"/>
+              <a:t>olarak</a:t>
+            </a:r>
+            <a:r>
+              <a:rPr lang="en-GB" dirty="0" smtClean="0"/>
+              <a:t> </a:t>
+            </a:r>
+            <a:r>
+              <a:rPr lang="en-GB" dirty="0" err="1" smtClean="0"/>
+              <a:t>daha</a:t>
+            </a:r>
+            <a:r>
+              <a:rPr lang="en-GB" dirty="0" smtClean="0"/>
+              <a:t> once </a:t>
+            </a:r>
+            <a:r>
+              <a:rPr lang="en-GB" dirty="0" err="1" smtClean="0"/>
+              <a:t>kullanilmis</a:t>
+            </a:r>
+            <a:r>
+              <a:rPr lang="en-GB" dirty="0" smtClean="0"/>
+              <a:t> mi? </a:t>
+            </a:r>
+            <a:r>
+              <a:rPr lang="en-GB" dirty="0" err="1" smtClean="0"/>
+              <a:t>Ya</a:t>
+            </a:r>
+            <a:r>
+              <a:rPr lang="en-GB" dirty="0" smtClean="0"/>
+              <a:t> </a:t>
+            </a:r>
+            <a:r>
+              <a:rPr lang="en-GB" dirty="0" err="1" smtClean="0"/>
+              <a:t>da</a:t>
+            </a:r>
+            <a:r>
+              <a:rPr lang="en-GB" dirty="0" smtClean="0"/>
+              <a:t> annotated </a:t>
+            </a:r>
+            <a:r>
+              <a:rPr lang="en-GB" dirty="0" err="1" smtClean="0"/>
+              <a:t>olmayan</a:t>
+            </a:r>
+            <a:r>
+              <a:rPr lang="en-GB" dirty="0" smtClean="0"/>
+              <a:t> </a:t>
+            </a:r>
+            <a:r>
+              <a:rPr lang="en-GB" dirty="0" err="1" smtClean="0"/>
+              <a:t>bir</a:t>
+            </a:r>
+            <a:r>
+              <a:rPr lang="en-GB" dirty="0" smtClean="0"/>
+              <a:t> </a:t>
+            </a:r>
+            <a:r>
+              <a:rPr lang="en-GB" dirty="0" err="1" smtClean="0"/>
+              <a:t>textte</a:t>
+            </a:r>
+            <a:r>
+              <a:rPr lang="en-GB" dirty="0" smtClean="0"/>
+              <a:t>, hic </a:t>
+            </a:r>
+            <a:r>
+              <a:rPr lang="en-GB" dirty="0" err="1" smtClean="0"/>
+              <a:t>cumle</a:t>
+            </a:r>
+            <a:r>
+              <a:rPr lang="en-GB" dirty="0" smtClean="0"/>
+              <a:t> </a:t>
+            </a:r>
+            <a:r>
+              <a:rPr lang="en-GB" dirty="0" err="1" smtClean="0"/>
+              <a:t>ortasinda</a:t>
+            </a:r>
+            <a:r>
+              <a:rPr lang="en-GB" dirty="0" smtClean="0"/>
+              <a:t> </a:t>
+            </a:r>
+            <a:r>
+              <a:rPr lang="en-GB" dirty="0" err="1" smtClean="0"/>
+              <a:t>buyuk</a:t>
+            </a:r>
+            <a:r>
+              <a:rPr lang="en-GB" dirty="0" smtClean="0"/>
+              <a:t> </a:t>
+            </a:r>
+            <a:r>
+              <a:rPr lang="en-GB" dirty="0" err="1" smtClean="0"/>
+              <a:t>harfle</a:t>
+            </a:r>
+            <a:r>
+              <a:rPr lang="en-GB" dirty="0" smtClean="0"/>
+              <a:t> </a:t>
+            </a:r>
+            <a:r>
+              <a:rPr lang="en-GB" dirty="0" err="1" smtClean="0"/>
+              <a:t>baslatilmis</a:t>
+            </a:r>
+            <a:r>
+              <a:rPr lang="en-GB" dirty="0" smtClean="0"/>
+              <a:t> mi? </a:t>
+            </a:r>
+            <a:r>
+              <a:rPr lang="en-GB" dirty="0" err="1" smtClean="0"/>
+              <a:t>Veya</a:t>
+            </a:r>
+            <a:r>
+              <a:rPr lang="en-GB" dirty="0" smtClean="0"/>
+              <a:t> hic </a:t>
+            </a:r>
+            <a:r>
+              <a:rPr lang="en-GB" dirty="0" err="1" smtClean="0"/>
+              <a:t>kesme</a:t>
+            </a:r>
+            <a:r>
+              <a:rPr lang="en-GB" dirty="0" smtClean="0"/>
+              <a:t> </a:t>
+            </a:r>
+            <a:r>
+              <a:rPr lang="en-GB" dirty="0" err="1" smtClean="0"/>
+              <a:t>ile</a:t>
+            </a:r>
+            <a:r>
+              <a:rPr lang="en-GB" dirty="0" smtClean="0"/>
+              <a:t> </a:t>
+            </a:r>
+            <a:r>
+              <a:rPr lang="en-GB" dirty="0" err="1" smtClean="0"/>
+              <a:t>ayrilmis</a:t>
+            </a:r>
+            <a:r>
+              <a:rPr lang="en-GB" dirty="0" smtClean="0"/>
+              <a:t> mi?</a:t>
+            </a:r>
+          </a:p>
+          <a:p>
+            <a:pPr lvl="1"/>
+            <a:r>
+              <a:rPr lang="en-GB" dirty="0" smtClean="0"/>
+              <a:t>Pronoun resolution: “</a:t>
+            </a:r>
+            <a:r>
+              <a:rPr lang="en-GB" dirty="0" err="1" smtClean="0"/>
+              <a:t>Onu</a:t>
+            </a:r>
+            <a:r>
+              <a:rPr lang="en-GB" dirty="0" smtClean="0"/>
+              <a:t> </a:t>
+            </a:r>
+            <a:r>
+              <a:rPr lang="en-GB" dirty="0" err="1" smtClean="0"/>
+              <a:t>bana</a:t>
+            </a:r>
+            <a:r>
+              <a:rPr lang="en-GB" dirty="0" smtClean="0"/>
+              <a:t> </a:t>
+            </a:r>
+            <a:r>
+              <a:rPr lang="en-GB" dirty="0" err="1" smtClean="0"/>
+              <a:t>verdi</a:t>
+            </a:r>
+            <a:r>
+              <a:rPr lang="en-GB" dirty="0" smtClean="0"/>
+              <a:t>” </a:t>
+            </a:r>
+            <a:r>
+              <a:rPr lang="en-GB" dirty="0" smtClean="0">
+                <a:sym typeface="Wingdings" pitchFamily="2" charset="2"/>
+              </a:rPr>
+              <a:t> “o” </a:t>
+            </a:r>
+            <a:r>
+              <a:rPr lang="en-GB" dirty="0" err="1" smtClean="0">
+                <a:sym typeface="Wingdings" pitchFamily="2" charset="2"/>
+              </a:rPr>
+              <a:t>kim</a:t>
+            </a:r>
+            <a:r>
+              <a:rPr lang="en-GB" dirty="0" smtClean="0">
+                <a:sym typeface="Wingdings" pitchFamily="2" charset="2"/>
+              </a:rPr>
+              <a:t>?</a:t>
+            </a:r>
+            <a:endParaRPr lang="en-GB" dirty="0" smtClean="0"/>
+          </a:p>
+          <a:p>
+            <a:pPr lvl="1"/>
+            <a:endParaRPr lang="en-US" dirty="0"/>
+          </a:p>
+        </p:txBody>
+      </p:sp>
+    </p:spTree>
+  </p:cSld>
+  <p:clrMapOvr>
+    <a:masterClrMapping/>
+  </p:clrMapOvr>
+</p:sld>
+</file>
+
+<file path=ppt/slides/slide62.xml><?xml version="1.0" encoding="utf-8"?>
 <p:sld xmlns:a="http://schemas.openxmlformats.org/drawingml/2006/main" xmlns:r="http://schemas.openxmlformats.org/officeDocument/2006/relationships" xmlns:p="http://schemas.openxmlformats.org/presentationml/2006/main">
   <p:cSld>
     <p:spTree>

</xml_diff>